<commit_message>
animacion y nuevas imagenes
</commit_message>
<xml_diff>
--- a/Censo Nacional de Población, Hogares y Viviendas.pptx
+++ b/Censo Nacional de Población, Hogares y Viviendas.pptx
@@ -10,13 +10,20 @@
     <p:sldId id="258" r:id="rId4"/>
     <p:sldId id="259" r:id="rId5"/>
     <p:sldId id="260" r:id="rId6"/>
-    <p:sldId id="261" r:id="rId7"/>
-    <p:sldId id="262" r:id="rId8"/>
-    <p:sldId id="263" r:id="rId9"/>
-    <p:sldId id="264" r:id="rId10"/>
-    <p:sldId id="265" r:id="rId11"/>
-    <p:sldId id="266" r:id="rId12"/>
-    <p:sldId id="267" r:id="rId13"/>
+    <p:sldId id="262" r:id="rId7"/>
+    <p:sldId id="263" r:id="rId8"/>
+    <p:sldId id="264" r:id="rId9"/>
+    <p:sldId id="265" r:id="rId10"/>
+    <p:sldId id="266" r:id="rId11"/>
+    <p:sldId id="273" r:id="rId12"/>
+    <p:sldId id="276" r:id="rId13"/>
+    <p:sldId id="274" r:id="rId14"/>
+    <p:sldId id="275" r:id="rId15"/>
+    <p:sldId id="272" r:id="rId16"/>
+    <p:sldId id="277" r:id="rId17"/>
+    <p:sldId id="278" r:id="rId18"/>
+    <p:sldId id="279" r:id="rId19"/>
+    <p:sldId id="267" r:id="rId20"/>
   </p:sldIdLst>
   <p:sldSz cx="12192000" cy="6858000"/>
   <p:notesSz cx="6858000" cy="9144000"/>
@@ -138,7 +145,7 @@
 <file path=ppt/revisionInfo.xml><?xml version="1.0" encoding="utf-8"?>
 <p1510:revInfo xmlns:a="http://schemas.openxmlformats.org/drawingml/2006/main" xmlns:r="http://schemas.openxmlformats.org/officeDocument/2006/relationships" xmlns:p1510="http://schemas.microsoft.com/office/powerpoint/2015/10/main">
   <p1510:revLst>
-    <p1510:client id="{0ACE6762-BEC4-424F-AA07-B2B8DE7B0D67}" v="140" dt="2020-07-09T00:43:41.298"/>
+    <p1510:client id="{0ACE6762-BEC4-424F-AA07-B2B8DE7B0D67}" v="171" dt="2020-07-13T21:59:53.812"/>
   </p1510:revLst>
 </p1510:revInfo>
 </file>
@@ -147,8 +154,8 @@
 <pc:chgInfo xmlns:a="http://schemas.openxmlformats.org/drawingml/2006/main" xmlns:r="http://schemas.openxmlformats.org/officeDocument/2006/relationships" xmlns:ac="http://schemas.microsoft.com/office/drawing/2013/main/command" xmlns:pc="http://schemas.microsoft.com/office/powerpoint/2013/main/command">
   <pc:docChgLst>
     <pc:chgData name="Hernan Alperin" userId="53934dd3a01d9526" providerId="LiveId" clId="{0ACE6762-BEC4-424F-AA07-B2B8DE7B0D67}"/>
-    <pc:docChg chg="undo custSel mod addSld modSld">
-      <pc:chgData name="Hernan Alperin" userId="53934dd3a01d9526" providerId="LiveId" clId="{0ACE6762-BEC4-424F-AA07-B2B8DE7B0D67}" dt="2020-07-09T00:43:41.298" v="609"/>
+    <pc:docChg chg="undo custSel mod addSld delSld modSld sldOrd">
+      <pc:chgData name="Hernan Alperin" userId="53934dd3a01d9526" providerId="LiveId" clId="{0ACE6762-BEC4-424F-AA07-B2B8DE7B0D67}" dt="2020-07-31T01:22:28.168" v="1102" actId="1076"/>
       <pc:docMkLst>
         <pc:docMk/>
       </pc:docMkLst>
@@ -768,7 +775,7 @@
         </pc:cxnChg>
       </pc:sldChg>
       <pc:sldChg chg="addSp delSp modSp mod setBg modAnim">
-        <pc:chgData name="Hernan Alperin" userId="53934dd3a01d9526" providerId="LiveId" clId="{0ACE6762-BEC4-424F-AA07-B2B8DE7B0D67}" dt="2020-07-08T21:44:28.619" v="532" actId="1076"/>
+        <pc:chgData name="Hernan Alperin" userId="53934dd3a01d9526" providerId="LiveId" clId="{0ACE6762-BEC4-424F-AA07-B2B8DE7B0D67}" dt="2020-07-13T21:59:53.812" v="837" actId="20577"/>
         <pc:sldMkLst>
           <pc:docMk/>
           <pc:sldMk cId="3177965585" sldId="257"/>
@@ -822,7 +829,7 @@
           </ac:spMkLst>
         </pc:spChg>
         <pc:spChg chg="mod">
-          <ac:chgData name="Hernan Alperin" userId="53934dd3a01d9526" providerId="LiveId" clId="{0ACE6762-BEC4-424F-AA07-B2B8DE7B0D67}" dt="2020-07-08T21:43:43.818" v="528" actId="1076"/>
+          <ac:chgData name="Hernan Alperin" userId="53934dd3a01d9526" providerId="LiveId" clId="{0ACE6762-BEC4-424F-AA07-B2B8DE7B0D67}" dt="2020-07-13T21:59:53.812" v="837" actId="20577"/>
           <ac:spMkLst>
             <pc:docMk/>
             <pc:sldMk cId="3177965585" sldId="257"/>
@@ -1099,8 +1106,8 @@
           </ac:spMkLst>
         </pc:spChg>
       </pc:sldChg>
-      <pc:sldChg chg="modSp">
-        <pc:chgData name="Hernan Alperin" userId="53934dd3a01d9526" providerId="LiveId" clId="{0ACE6762-BEC4-424F-AA07-B2B8DE7B0D67}" dt="2020-07-08T20:45:51.782" v="260"/>
+      <pc:sldChg chg="modSp del">
+        <pc:chgData name="Hernan Alperin" userId="53934dd3a01d9526" providerId="LiveId" clId="{0ACE6762-BEC4-424F-AA07-B2B8DE7B0D67}" dt="2020-07-30T23:45:47.138" v="838" actId="2696"/>
         <pc:sldMkLst>
           <pc:docMk/>
           <pc:sldMk cId="2013699600" sldId="261"/>
@@ -1192,13 +1199,13 @@
         </pc:spChg>
       </pc:sldChg>
       <pc:sldChg chg="modSp mod">
-        <pc:chgData name="Hernan Alperin" userId="53934dd3a01d9526" providerId="LiveId" clId="{0ACE6762-BEC4-424F-AA07-B2B8DE7B0D67}" dt="2020-07-08T21:40:37.973" v="490" actId="114"/>
+        <pc:chgData name="Hernan Alperin" userId="53934dd3a01d9526" providerId="LiveId" clId="{0ACE6762-BEC4-424F-AA07-B2B8DE7B0D67}" dt="2020-07-13T14:31:14.496" v="785" actId="114"/>
         <pc:sldMkLst>
           <pc:docMk/>
           <pc:sldMk cId="59448841" sldId="265"/>
         </pc:sldMkLst>
         <pc:spChg chg="mod">
-          <ac:chgData name="Hernan Alperin" userId="53934dd3a01d9526" providerId="LiveId" clId="{0ACE6762-BEC4-424F-AA07-B2B8DE7B0D67}" dt="2020-07-08T21:39:13.185" v="482" actId="27636"/>
+          <ac:chgData name="Hernan Alperin" userId="53934dd3a01d9526" providerId="LiveId" clId="{0ACE6762-BEC4-424F-AA07-B2B8DE7B0D67}" dt="2020-07-13T14:31:14.496" v="785" actId="114"/>
           <ac:spMkLst>
             <pc:docMk/>
             <pc:sldMk cId="59448841" sldId="265"/>
@@ -1206,7 +1213,7 @@
           </ac:spMkLst>
         </pc:spChg>
         <pc:spChg chg="mod">
-          <ac:chgData name="Hernan Alperin" userId="53934dd3a01d9526" providerId="LiveId" clId="{0ACE6762-BEC4-424F-AA07-B2B8DE7B0D67}" dt="2020-07-08T21:39:21.655" v="483" actId="2711"/>
+          <ac:chgData name="Hernan Alperin" userId="53934dd3a01d9526" providerId="LiveId" clId="{0ACE6762-BEC4-424F-AA07-B2B8DE7B0D67}" dt="2020-07-13T11:53:19.887" v="722" actId="1076"/>
           <ac:spMkLst>
             <pc:docMk/>
             <pc:sldMk cId="59448841" sldId="265"/>
@@ -1223,13 +1230,13 @@
         </pc:spChg>
       </pc:sldChg>
       <pc:sldChg chg="modSp mod">
-        <pc:chgData name="Hernan Alperin" userId="53934dd3a01d9526" providerId="LiveId" clId="{0ACE6762-BEC4-424F-AA07-B2B8DE7B0D67}" dt="2020-07-08T21:48:38.234" v="545" actId="2711"/>
+        <pc:chgData name="Hernan Alperin" userId="53934dd3a01d9526" providerId="LiveId" clId="{0ACE6762-BEC4-424F-AA07-B2B8DE7B0D67}" dt="2020-07-13T14:31:07.256" v="784" actId="114"/>
         <pc:sldMkLst>
           <pc:docMk/>
           <pc:sldMk cId="643338633" sldId="266"/>
         </pc:sldMkLst>
         <pc:spChg chg="mod">
-          <ac:chgData name="Hernan Alperin" userId="53934dd3a01d9526" providerId="LiveId" clId="{0ACE6762-BEC4-424F-AA07-B2B8DE7B0D67}" dt="2020-07-08T21:48:24.583" v="544" actId="2711"/>
+          <ac:chgData name="Hernan Alperin" userId="53934dd3a01d9526" providerId="LiveId" clId="{0ACE6762-BEC4-424F-AA07-B2B8DE7B0D67}" dt="2020-07-13T14:31:07.256" v="784" actId="114"/>
           <ac:spMkLst>
             <pc:docMk/>
             <pc:sldMk cId="643338633" sldId="266"/>
@@ -1245,7 +1252,7 @@
           </ac:spMkLst>
         </pc:spChg>
         <pc:spChg chg="mod">
-          <ac:chgData name="Hernan Alperin" userId="53934dd3a01d9526" providerId="LiveId" clId="{0ACE6762-BEC4-424F-AA07-B2B8DE7B0D67}" dt="2020-07-08T20:57:01.131" v="323"/>
+          <ac:chgData name="Hernan Alperin" userId="53934dd3a01d9526" providerId="LiveId" clId="{0ACE6762-BEC4-424F-AA07-B2B8DE7B0D67}" dt="2020-07-13T11:52:15.998" v="720" actId="1076"/>
           <ac:spMkLst>
             <pc:docMk/>
             <pc:sldMk cId="643338633" sldId="266"/>
@@ -1253,14 +1260,14 @@
           </ac:spMkLst>
         </pc:spChg>
       </pc:sldChg>
-      <pc:sldChg chg="addSp modSp new mod">
-        <pc:chgData name="Hernan Alperin" userId="53934dd3a01d9526" providerId="LiveId" clId="{0ACE6762-BEC4-424F-AA07-B2B8DE7B0D67}" dt="2020-07-09T00:43:41.298" v="609"/>
+      <pc:sldChg chg="addSp delSp modSp new mod">
+        <pc:chgData name="Hernan Alperin" userId="53934dd3a01d9526" providerId="LiveId" clId="{0ACE6762-BEC4-424F-AA07-B2B8DE7B0D67}" dt="2020-07-09T02:32:22.620" v="653" actId="1076"/>
         <pc:sldMkLst>
           <pc:docMk/>
           <pc:sldMk cId="3133358121" sldId="267"/>
         </pc:sldMkLst>
         <pc:spChg chg="mod">
-          <ac:chgData name="Hernan Alperin" userId="53934dd3a01d9526" providerId="LiveId" clId="{0ACE6762-BEC4-424F-AA07-B2B8DE7B0D67}" dt="2020-07-09T00:43:41.298" v="609"/>
+          <ac:chgData name="Hernan Alperin" userId="53934dd3a01d9526" providerId="LiveId" clId="{0ACE6762-BEC4-424F-AA07-B2B8DE7B0D67}" dt="2020-07-09T02:32:05.340" v="643" actId="368"/>
           <ac:spMkLst>
             <pc:docMk/>
             <pc:sldMk cId="3133358121" sldId="267"/>
@@ -1275,7 +1282,532 @@
             <ac:spMk id="3" creationId="{94B2457D-889F-4629-8DA1-06A3DFA168A3}"/>
           </ac:spMkLst>
         </pc:spChg>
+        <pc:picChg chg="del mod">
+          <ac:chgData name="Hernan Alperin" userId="53934dd3a01d9526" providerId="LiveId" clId="{0ACE6762-BEC4-424F-AA07-B2B8DE7B0D67}" dt="2020-07-09T02:25:02.145" v="630" actId="478"/>
+          <ac:picMkLst>
+            <pc:docMk/>
+            <pc:sldMk cId="3133358121" sldId="267"/>
+            <ac:picMk id="5" creationId="{B9BD60C3-2632-4C0C-8275-16A796C92ECB}"/>
+          </ac:picMkLst>
+        </pc:picChg>
+        <pc:picChg chg="del mod">
+          <ac:chgData name="Hernan Alperin" userId="53934dd3a01d9526" providerId="LiveId" clId="{0ACE6762-BEC4-424F-AA07-B2B8DE7B0D67}" dt="2020-07-09T02:32:19.987" v="652" actId="478"/>
+          <ac:picMkLst>
+            <pc:docMk/>
+            <pc:sldMk cId="3133358121" sldId="267"/>
+            <ac:picMk id="7" creationId="{40F39315-2C2C-4D29-AF33-69906F02FA77}"/>
+          </ac:picMkLst>
+        </pc:picChg>
+        <pc:picChg chg="mod">
+          <ac:chgData name="Hernan Alperin" userId="53934dd3a01d9526" providerId="LiveId" clId="{0ACE6762-BEC4-424F-AA07-B2B8DE7B0D67}" dt="2020-07-09T02:32:22.620" v="653" actId="1076"/>
+          <ac:picMkLst>
+            <pc:docMk/>
+            <pc:sldMk cId="3133358121" sldId="267"/>
+            <ac:picMk id="9" creationId="{999F2EA5-F51A-4561-93D6-1BDDB36B6830}"/>
+          </ac:picMkLst>
+        </pc:picChg>
       </pc:sldChg>
+      <pc:sldChg chg="new del">
+        <pc:chgData name="Hernan Alperin" userId="53934dd3a01d9526" providerId="LiveId" clId="{0ACE6762-BEC4-424F-AA07-B2B8DE7B0D67}" dt="2020-07-30T23:46:26.617" v="839" actId="2696"/>
+        <pc:sldMkLst>
+          <pc:docMk/>
+          <pc:sldMk cId="947570110" sldId="268"/>
+        </pc:sldMkLst>
+      </pc:sldChg>
+      <pc:sldChg chg="add del">
+        <pc:chgData name="Hernan Alperin" userId="53934dd3a01d9526" providerId="LiveId" clId="{0ACE6762-BEC4-424F-AA07-B2B8DE7B0D67}" dt="2020-07-09T08:45:44.450" v="658" actId="47"/>
+        <pc:sldMkLst>
+          <pc:docMk/>
+          <pc:sldMk cId="0" sldId="269"/>
+        </pc:sldMkLst>
+      </pc:sldChg>
+      <pc:sldChg chg="addSp delSp modSp new del mod">
+        <pc:chgData name="Hernan Alperin" userId="53934dd3a01d9526" providerId="LiveId" clId="{0ACE6762-BEC4-424F-AA07-B2B8DE7B0D67}" dt="2020-07-13T14:34:38.274" v="802" actId="47"/>
+        <pc:sldMkLst>
+          <pc:docMk/>
+          <pc:sldMk cId="2771617430" sldId="269"/>
+        </pc:sldMkLst>
+        <pc:spChg chg="mod">
+          <ac:chgData name="Hernan Alperin" userId="53934dd3a01d9526" providerId="LiveId" clId="{0ACE6762-BEC4-424F-AA07-B2B8DE7B0D67}" dt="2020-07-13T11:48:55.951" v="707" actId="20577"/>
+          <ac:spMkLst>
+            <pc:docMk/>
+            <pc:sldMk cId="2771617430" sldId="269"/>
+            <ac:spMk id="2" creationId="{E9294C88-B9A5-42C4-AEB1-329F5A9B9A24}"/>
+          </ac:spMkLst>
+        </pc:spChg>
+        <pc:spChg chg="add mod">
+          <ac:chgData name="Hernan Alperin" userId="53934dd3a01d9526" providerId="LiveId" clId="{0ACE6762-BEC4-424F-AA07-B2B8DE7B0D67}" dt="2020-07-13T14:30:07.825" v="782" actId="255"/>
+          <ac:spMkLst>
+            <pc:docMk/>
+            <pc:sldMk cId="2771617430" sldId="269"/>
+            <ac:spMk id="7" creationId="{A2B55C06-CAFB-4C94-B2C9-BA48B2730677}"/>
+          </ac:spMkLst>
+        </pc:spChg>
+        <pc:spChg chg="add mod">
+          <ac:chgData name="Hernan Alperin" userId="53934dd3a01d9526" providerId="LiveId" clId="{0ACE6762-BEC4-424F-AA07-B2B8DE7B0D67}" dt="2020-07-13T14:34:19.759" v="801"/>
+          <ac:spMkLst>
+            <pc:docMk/>
+            <pc:sldMk cId="2771617430" sldId="269"/>
+            <ac:spMk id="10" creationId="{DFBE4248-8C31-4CBD-B019-C38C7D164A0E}"/>
+          </ac:spMkLst>
+        </pc:spChg>
+        <pc:picChg chg="add del mod">
+          <ac:chgData name="Hernan Alperin" userId="53934dd3a01d9526" providerId="LiveId" clId="{0ACE6762-BEC4-424F-AA07-B2B8DE7B0D67}" dt="2020-07-13T11:51:19.755" v="719" actId="931"/>
+          <ac:picMkLst>
+            <pc:docMk/>
+            <pc:sldMk cId="2771617430" sldId="269"/>
+            <ac:picMk id="4" creationId="{24BB72BD-1EFD-49E9-A1B2-2E9616F3E444}"/>
+          </ac:picMkLst>
+        </pc:picChg>
+        <pc:picChg chg="add mod">
+          <ac:chgData name="Hernan Alperin" userId="53934dd3a01d9526" providerId="LiveId" clId="{0ACE6762-BEC4-424F-AA07-B2B8DE7B0D67}" dt="2020-07-13T14:29:31.297" v="778" actId="1076"/>
+          <ac:picMkLst>
+            <pc:docMk/>
+            <pc:sldMk cId="2771617430" sldId="269"/>
+            <ac:picMk id="6" creationId="{0CE668BE-1F04-4816-9E99-57EB2C7B607D}"/>
+          </ac:picMkLst>
+        </pc:picChg>
+        <pc:picChg chg="add mod">
+          <ac:chgData name="Hernan Alperin" userId="53934dd3a01d9526" providerId="LiveId" clId="{0ACE6762-BEC4-424F-AA07-B2B8DE7B0D67}" dt="2020-07-13T14:29:33.417" v="779" actId="1076"/>
+          <ac:picMkLst>
+            <pc:docMk/>
+            <pc:sldMk cId="2771617430" sldId="269"/>
+            <ac:picMk id="9" creationId="{C5D208AF-8571-43D5-B6F7-C52EEA124317}"/>
+          </ac:picMkLst>
+        </pc:picChg>
+      </pc:sldChg>
+      <pc:sldChg chg="new del">
+        <pc:chgData name="Hernan Alperin" userId="53934dd3a01d9526" providerId="LiveId" clId="{0ACE6762-BEC4-424F-AA07-B2B8DE7B0D67}" dt="2020-07-30T23:46:30.312" v="840" actId="2696"/>
+        <pc:sldMkLst>
+          <pc:docMk/>
+          <pc:sldMk cId="1019277122" sldId="270"/>
+        </pc:sldMkLst>
+      </pc:sldChg>
+      <pc:sldChg chg="modSp new del mod">
+        <pc:chgData name="Hernan Alperin" userId="53934dd3a01d9526" providerId="LiveId" clId="{0ACE6762-BEC4-424F-AA07-B2B8DE7B0D67}" dt="2020-07-13T11:54:34.056" v="736" actId="47"/>
+        <pc:sldMkLst>
+          <pc:docMk/>
+          <pc:sldMk cId="3576122065" sldId="270"/>
+        </pc:sldMkLst>
+        <pc:spChg chg="mod">
+          <ac:chgData name="Hernan Alperin" userId="53934dd3a01d9526" providerId="LiveId" clId="{0ACE6762-BEC4-424F-AA07-B2B8DE7B0D67}" dt="2020-07-13T11:54:05.661" v="735" actId="20577"/>
+          <ac:spMkLst>
+            <pc:docMk/>
+            <pc:sldMk cId="3576122065" sldId="270"/>
+            <ac:spMk id="2" creationId="{C146AD89-7F3B-4C64-82B4-7686B2E0B85E}"/>
+          </ac:spMkLst>
+        </pc:spChg>
+      </pc:sldChg>
+      <pc:sldChg chg="add del">
+        <pc:chgData name="Hernan Alperin" userId="53934dd3a01d9526" providerId="LiveId" clId="{0ACE6762-BEC4-424F-AA07-B2B8DE7B0D67}" dt="2020-07-13T14:34:52.072" v="803" actId="47"/>
+        <pc:sldMkLst>
+          <pc:docMk/>
+          <pc:sldMk cId="3087402434" sldId="271"/>
+        </pc:sldMkLst>
+      </pc:sldChg>
+      <pc:sldChg chg="modSp add mod">
+        <pc:chgData name="Hernan Alperin" userId="53934dd3a01d9526" providerId="LiveId" clId="{0ACE6762-BEC4-424F-AA07-B2B8DE7B0D67}" dt="2020-07-13T14:34:59.353" v="805" actId="20577"/>
+        <pc:sldMkLst>
+          <pc:docMk/>
+          <pc:sldMk cId="1630160372" sldId="272"/>
+        </pc:sldMkLst>
+        <pc:spChg chg="mod">
+          <ac:chgData name="Hernan Alperin" userId="53934dd3a01d9526" providerId="LiveId" clId="{0ACE6762-BEC4-424F-AA07-B2B8DE7B0D67}" dt="2020-07-13T14:34:59.353" v="805" actId="20577"/>
+          <ac:spMkLst>
+            <pc:docMk/>
+            <pc:sldMk cId="1630160372" sldId="272"/>
+            <ac:spMk id="2" creationId="{E9294C88-B9A5-42C4-AEB1-329F5A9B9A24}"/>
+          </ac:spMkLst>
+        </pc:spChg>
+      </pc:sldChg>
+      <pc:sldChg chg="addSp delSp modSp add mod ord">
+        <pc:chgData name="Hernan Alperin" userId="53934dd3a01d9526" providerId="LiveId" clId="{0ACE6762-BEC4-424F-AA07-B2B8DE7B0D67}" dt="2020-07-30T23:50:18.776" v="918" actId="14100"/>
+        <pc:sldMkLst>
+          <pc:docMk/>
+          <pc:sldMk cId="1806228873" sldId="273"/>
+        </pc:sldMkLst>
+        <pc:spChg chg="mod">
+          <ac:chgData name="Hernan Alperin" userId="53934dd3a01d9526" providerId="LiveId" clId="{0ACE6762-BEC4-424F-AA07-B2B8DE7B0D67}" dt="2020-07-30T23:48:36.508" v="904" actId="20577"/>
+          <ac:spMkLst>
+            <pc:docMk/>
+            <pc:sldMk cId="1806228873" sldId="273"/>
+            <ac:spMk id="2" creationId="{E9294C88-B9A5-42C4-AEB1-329F5A9B9A24}"/>
+          </ac:spMkLst>
+        </pc:spChg>
+        <pc:spChg chg="add del mod">
+          <ac:chgData name="Hernan Alperin" userId="53934dd3a01d9526" providerId="LiveId" clId="{0ACE6762-BEC4-424F-AA07-B2B8DE7B0D67}" dt="2020-07-30T23:50:13.955" v="917" actId="478"/>
+          <ac:spMkLst>
+            <pc:docMk/>
+            <pc:sldMk cId="1806228873" sldId="273"/>
+            <ac:spMk id="7" creationId="{A2B55C06-CAFB-4C94-B2C9-BA48B2730677}"/>
+          </ac:spMkLst>
+        </pc:spChg>
+        <pc:picChg chg="add mod">
+          <ac:chgData name="Hernan Alperin" userId="53934dd3a01d9526" providerId="LiveId" clId="{0ACE6762-BEC4-424F-AA07-B2B8DE7B0D67}" dt="2020-07-30T23:50:18.776" v="918" actId="14100"/>
+          <ac:picMkLst>
+            <pc:docMk/>
+            <pc:sldMk cId="1806228873" sldId="273"/>
+            <ac:picMk id="4" creationId="{2C4807DD-39C3-4BEF-A052-72037BA9E9E4}"/>
+          </ac:picMkLst>
+        </pc:picChg>
+        <pc:picChg chg="add del mod">
+          <ac:chgData name="Hernan Alperin" userId="53934dd3a01d9526" providerId="LiveId" clId="{0ACE6762-BEC4-424F-AA07-B2B8DE7B0D67}" dt="2020-07-13T14:35:48.629" v="810" actId="931"/>
+          <ac:picMkLst>
+            <pc:docMk/>
+            <pc:sldMk cId="1806228873" sldId="273"/>
+            <ac:picMk id="4" creationId="{64708A0D-75C4-42BB-8026-A849FDF2DC86}"/>
+          </ac:picMkLst>
+        </pc:picChg>
+        <pc:picChg chg="del">
+          <ac:chgData name="Hernan Alperin" userId="53934dd3a01d9526" providerId="LiveId" clId="{0ACE6762-BEC4-424F-AA07-B2B8DE7B0D67}" dt="2020-07-13T14:35:12.997" v="807" actId="478"/>
+          <ac:picMkLst>
+            <pc:docMk/>
+            <pc:sldMk cId="1806228873" sldId="273"/>
+            <ac:picMk id="6" creationId="{0CE668BE-1F04-4816-9E99-57EB2C7B607D}"/>
+          </ac:picMkLst>
+        </pc:picChg>
+        <pc:picChg chg="add del mod">
+          <ac:chgData name="Hernan Alperin" userId="53934dd3a01d9526" providerId="LiveId" clId="{0ACE6762-BEC4-424F-AA07-B2B8DE7B0D67}" dt="2020-07-13T14:37:17.210" v="815" actId="478"/>
+          <ac:picMkLst>
+            <pc:docMk/>
+            <pc:sldMk cId="1806228873" sldId="273"/>
+            <ac:picMk id="8" creationId="{35FB60B7-3E4C-4D59-8CB2-7AEF7E774F4A}"/>
+          </ac:picMkLst>
+        </pc:picChg>
+        <pc:picChg chg="del">
+          <ac:chgData name="Hernan Alperin" userId="53934dd3a01d9526" providerId="LiveId" clId="{0ACE6762-BEC4-424F-AA07-B2B8DE7B0D67}" dt="2020-07-13T14:35:16.427" v="808" actId="478"/>
+          <ac:picMkLst>
+            <pc:docMk/>
+            <pc:sldMk cId="1806228873" sldId="273"/>
+            <ac:picMk id="9" creationId="{C5D208AF-8571-43D5-B6F7-C52EEA124317}"/>
+          </ac:picMkLst>
+        </pc:picChg>
+      </pc:sldChg>
+      <pc:sldChg chg="addSp delSp modSp new mod">
+        <pc:chgData name="Hernan Alperin" userId="53934dd3a01d9526" providerId="LiveId" clId="{0ACE6762-BEC4-424F-AA07-B2B8DE7B0D67}" dt="2020-07-31T00:10:03.532" v="956" actId="1076"/>
+        <pc:sldMkLst>
+          <pc:docMk/>
+          <pc:sldMk cId="669697881" sldId="274"/>
+        </pc:sldMkLst>
+        <pc:spChg chg="add del mod">
+          <ac:chgData name="Hernan Alperin" userId="53934dd3a01d9526" providerId="LiveId" clId="{0ACE6762-BEC4-424F-AA07-B2B8DE7B0D67}" dt="2020-07-31T00:09:28.380" v="954" actId="478"/>
+          <ac:spMkLst>
+            <pc:docMk/>
+            <pc:sldMk cId="669697881" sldId="274"/>
+            <ac:spMk id="3" creationId="{57DD6C2F-17E6-4B7E-AF2D-01CA60545A19}"/>
+          </ac:spMkLst>
+        </pc:spChg>
+        <pc:picChg chg="add mod">
+          <ac:chgData name="Hernan Alperin" userId="53934dd3a01d9526" providerId="LiveId" clId="{0ACE6762-BEC4-424F-AA07-B2B8DE7B0D67}" dt="2020-07-31T00:10:03.532" v="956" actId="1076"/>
+          <ac:picMkLst>
+            <pc:docMk/>
+            <pc:sldMk cId="669697881" sldId="274"/>
+            <ac:picMk id="5" creationId="{A19DAF25-0E7F-4E68-B4C5-85BF6DBCDFED}"/>
+          </ac:picMkLst>
+        </pc:picChg>
+      </pc:sldChg>
+      <pc:sldChg chg="addSp modSp new mod">
+        <pc:chgData name="Hernan Alperin" userId="53934dd3a01d9526" providerId="LiveId" clId="{0ACE6762-BEC4-424F-AA07-B2B8DE7B0D67}" dt="2020-07-31T00:08:58.188" v="952" actId="1076"/>
+        <pc:sldMkLst>
+          <pc:docMk/>
+          <pc:sldMk cId="1023199581" sldId="275"/>
+        </pc:sldMkLst>
+        <pc:spChg chg="mod">
+          <ac:chgData name="Hernan Alperin" userId="53934dd3a01d9526" providerId="LiveId" clId="{0ACE6762-BEC4-424F-AA07-B2B8DE7B0D67}" dt="2020-07-31T00:07:57.676" v="950" actId="20577"/>
+          <ac:spMkLst>
+            <pc:docMk/>
+            <pc:sldMk cId="1023199581" sldId="275"/>
+            <ac:spMk id="2" creationId="{C44660EB-A13E-4292-89E5-0152B7008566}"/>
+          </ac:spMkLst>
+        </pc:spChg>
+        <pc:picChg chg="add mod">
+          <ac:chgData name="Hernan Alperin" userId="53934dd3a01d9526" providerId="LiveId" clId="{0ACE6762-BEC4-424F-AA07-B2B8DE7B0D67}" dt="2020-07-31T00:08:58.188" v="952" actId="1076"/>
+          <ac:picMkLst>
+            <pc:docMk/>
+            <pc:sldMk cId="1023199581" sldId="275"/>
+            <ac:picMk id="4" creationId="{E318C07B-BE3A-4078-B113-61DC8CB3A429}"/>
+          </ac:picMkLst>
+        </pc:picChg>
+      </pc:sldChg>
+      <pc:sldChg chg="addSp modSp new mod">
+        <pc:chgData name="Hernan Alperin" userId="53934dd3a01d9526" providerId="LiveId" clId="{0ACE6762-BEC4-424F-AA07-B2B8DE7B0D67}" dt="2020-07-31T00:12:33.414" v="960" actId="14100"/>
+        <pc:sldMkLst>
+          <pc:docMk/>
+          <pc:sldMk cId="3858762720" sldId="276"/>
+        </pc:sldMkLst>
+        <pc:picChg chg="add mod">
+          <ac:chgData name="Hernan Alperin" userId="53934dd3a01d9526" providerId="LiveId" clId="{0ACE6762-BEC4-424F-AA07-B2B8DE7B0D67}" dt="2020-07-31T00:12:33.414" v="960" actId="14100"/>
+          <ac:picMkLst>
+            <pc:docMk/>
+            <pc:sldMk cId="3858762720" sldId="276"/>
+            <ac:picMk id="4" creationId="{2955AD87-C223-462E-B236-5508A302022C}"/>
+          </ac:picMkLst>
+        </pc:picChg>
+      </pc:sldChg>
+      <pc:sldChg chg="addSp delSp modSp new mod">
+        <pc:chgData name="Hernan Alperin" userId="53934dd3a01d9526" providerId="LiveId" clId="{0ACE6762-BEC4-424F-AA07-B2B8DE7B0D67}" dt="2020-07-31T01:09:37.325" v="1045" actId="1076"/>
+        <pc:sldMkLst>
+          <pc:docMk/>
+          <pc:sldMk cId="3754461258" sldId="277"/>
+        </pc:sldMkLst>
+        <pc:spChg chg="mod">
+          <ac:chgData name="Hernan Alperin" userId="53934dd3a01d9526" providerId="LiveId" clId="{0ACE6762-BEC4-424F-AA07-B2B8DE7B0D67}" dt="2020-07-31T00:14:17.814" v="970" actId="20577"/>
+          <ac:spMkLst>
+            <pc:docMk/>
+            <pc:sldMk cId="3754461258" sldId="277"/>
+            <ac:spMk id="2" creationId="{26EDAC25-72E2-4615-ABC7-FC356637FA1E}"/>
+          </ac:spMkLst>
+        </pc:spChg>
+        <pc:picChg chg="add del mod">
+          <ac:chgData name="Hernan Alperin" userId="53934dd3a01d9526" providerId="LiveId" clId="{0ACE6762-BEC4-424F-AA07-B2B8DE7B0D67}" dt="2020-07-31T00:58:02.906" v="997" actId="478"/>
+          <ac:picMkLst>
+            <pc:docMk/>
+            <pc:sldMk cId="3754461258" sldId="277"/>
+            <ac:picMk id="4" creationId="{B864FFE0-5491-4526-BDF8-CC17436C4465}"/>
+          </ac:picMkLst>
+        </pc:picChg>
+        <pc:picChg chg="add del mod">
+          <ac:chgData name="Hernan Alperin" userId="53934dd3a01d9526" providerId="LiveId" clId="{0ACE6762-BEC4-424F-AA07-B2B8DE7B0D67}" dt="2020-07-31T00:57:54.836" v="993" actId="478"/>
+          <ac:picMkLst>
+            <pc:docMk/>
+            <pc:sldMk cId="3754461258" sldId="277"/>
+            <ac:picMk id="6" creationId="{342EC77C-278D-42D1-8357-AA0DAD5316BA}"/>
+          </ac:picMkLst>
+        </pc:picChg>
+        <pc:picChg chg="add del mod">
+          <ac:chgData name="Hernan Alperin" userId="53934dd3a01d9526" providerId="LiveId" clId="{0ACE6762-BEC4-424F-AA07-B2B8DE7B0D67}" dt="2020-07-31T00:57:58.914" v="996" actId="478"/>
+          <ac:picMkLst>
+            <pc:docMk/>
+            <pc:sldMk cId="3754461258" sldId="277"/>
+            <ac:picMk id="8" creationId="{82EB4501-9972-4515-BC1D-4C5E342C8961}"/>
+          </ac:picMkLst>
+        </pc:picChg>
+        <pc:picChg chg="add del mod">
+          <ac:chgData name="Hernan Alperin" userId="53934dd3a01d9526" providerId="LiveId" clId="{0ACE6762-BEC4-424F-AA07-B2B8DE7B0D67}" dt="2020-07-31T00:57:57.058" v="994" actId="478"/>
+          <ac:picMkLst>
+            <pc:docMk/>
+            <pc:sldMk cId="3754461258" sldId="277"/>
+            <ac:picMk id="10" creationId="{E273D80C-A94A-452E-B0E0-1A61C3C0B651}"/>
+          </ac:picMkLst>
+        </pc:picChg>
+        <pc:picChg chg="add del mod">
+          <ac:chgData name="Hernan Alperin" userId="53934dd3a01d9526" providerId="LiveId" clId="{0ACE6762-BEC4-424F-AA07-B2B8DE7B0D67}" dt="2020-07-31T00:17:00.880" v="989" actId="478"/>
+          <ac:picMkLst>
+            <pc:docMk/>
+            <pc:sldMk cId="3754461258" sldId="277"/>
+            <ac:picMk id="12" creationId="{67896CA4-6BBB-4FFA-9989-DD54EAD3614A}"/>
+          </ac:picMkLst>
+        </pc:picChg>
+        <pc:picChg chg="add del mod">
+          <ac:chgData name="Hernan Alperin" userId="53934dd3a01d9526" providerId="LiveId" clId="{0ACE6762-BEC4-424F-AA07-B2B8DE7B0D67}" dt="2020-07-31T00:57:57.971" v="995" actId="478"/>
+          <ac:picMkLst>
+            <pc:docMk/>
+            <pc:sldMk cId="3754461258" sldId="277"/>
+            <ac:picMk id="14" creationId="{FE1EC3B0-19CE-4B0C-935E-F032608F9344}"/>
+          </ac:picMkLst>
+        </pc:picChg>
+        <pc:picChg chg="add mod">
+          <ac:chgData name="Hernan Alperin" userId="53934dd3a01d9526" providerId="LiveId" clId="{0ACE6762-BEC4-424F-AA07-B2B8DE7B0D67}" dt="2020-07-31T01:09:23.331" v="1044" actId="1076"/>
+          <ac:picMkLst>
+            <pc:docMk/>
+            <pc:sldMk cId="3754461258" sldId="277"/>
+            <ac:picMk id="16" creationId="{B93513D4-E64B-4BA5-AC5D-D488339A3AB8}"/>
+          </ac:picMkLst>
+        </pc:picChg>
+        <pc:picChg chg="add mod">
+          <ac:chgData name="Hernan Alperin" userId="53934dd3a01d9526" providerId="LiveId" clId="{0ACE6762-BEC4-424F-AA07-B2B8DE7B0D67}" dt="2020-07-31T01:09:37.325" v="1045" actId="1076"/>
+          <ac:picMkLst>
+            <pc:docMk/>
+            <pc:sldMk cId="3754461258" sldId="277"/>
+            <ac:picMk id="18" creationId="{DD9F636F-7233-49FD-8225-F02D61C6676D}"/>
+          </ac:picMkLst>
+        </pc:picChg>
+        <pc:picChg chg="add mod">
+          <ac:chgData name="Hernan Alperin" userId="53934dd3a01d9526" providerId="LiveId" clId="{0ACE6762-BEC4-424F-AA07-B2B8DE7B0D67}" dt="2020-07-31T01:08:45.583" v="1038" actId="1076"/>
+          <ac:picMkLst>
+            <pc:docMk/>
+            <pc:sldMk cId="3754461258" sldId="277"/>
+            <ac:picMk id="20" creationId="{FC948AB6-CD17-4FA8-B543-51D2C92375F0}"/>
+          </ac:picMkLst>
+        </pc:picChg>
+        <pc:picChg chg="add mod">
+          <ac:chgData name="Hernan Alperin" userId="53934dd3a01d9526" providerId="LiveId" clId="{0ACE6762-BEC4-424F-AA07-B2B8DE7B0D67}" dt="2020-07-31T01:09:37.325" v="1045" actId="1076"/>
+          <ac:picMkLst>
+            <pc:docMk/>
+            <pc:sldMk cId="3754461258" sldId="277"/>
+            <ac:picMk id="22" creationId="{45962548-7547-4F6C-8738-0A251020D0C0}"/>
+          </ac:picMkLst>
+        </pc:picChg>
+        <pc:picChg chg="add mod">
+          <ac:chgData name="Hernan Alperin" userId="53934dd3a01d9526" providerId="LiveId" clId="{0ACE6762-BEC4-424F-AA07-B2B8DE7B0D67}" dt="2020-07-31T01:05:20.607" v="1032" actId="1076"/>
+          <ac:picMkLst>
+            <pc:docMk/>
+            <pc:sldMk cId="3754461258" sldId="277"/>
+            <ac:picMk id="24" creationId="{3171A390-01F6-40B6-81E7-A040C930DB5B}"/>
+          </ac:picMkLst>
+        </pc:picChg>
+        <pc:picChg chg="add mod">
+          <ac:chgData name="Hernan Alperin" userId="53934dd3a01d9526" providerId="LiveId" clId="{0ACE6762-BEC4-424F-AA07-B2B8DE7B0D67}" dt="2020-07-31T01:09:37.325" v="1045" actId="1076"/>
+          <ac:picMkLst>
+            <pc:docMk/>
+            <pc:sldMk cId="3754461258" sldId="277"/>
+            <ac:picMk id="26" creationId="{C918BAE0-B54F-4CE8-9433-9B655BC8C700}"/>
+          </ac:picMkLst>
+        </pc:picChg>
+        <pc:picChg chg="add mod">
+          <ac:chgData name="Hernan Alperin" userId="53934dd3a01d9526" providerId="LiveId" clId="{0ACE6762-BEC4-424F-AA07-B2B8DE7B0D67}" dt="2020-07-31T01:09:04.729" v="1041" actId="1076"/>
+          <ac:picMkLst>
+            <pc:docMk/>
+            <pc:sldMk cId="3754461258" sldId="277"/>
+            <ac:picMk id="28" creationId="{DA75D45A-A1E0-4F2C-B947-D2760A959888}"/>
+          </ac:picMkLst>
+        </pc:picChg>
+      </pc:sldChg>
+      <pc:sldChg chg="addSp modSp new mod">
+        <pc:chgData name="Hernan Alperin" userId="53934dd3a01d9526" providerId="LiveId" clId="{0ACE6762-BEC4-424F-AA07-B2B8DE7B0D67}" dt="2020-07-31T01:17:16.691" v="1063" actId="14100"/>
+        <pc:sldMkLst>
+          <pc:docMk/>
+          <pc:sldMk cId="2696548569" sldId="278"/>
+        </pc:sldMkLst>
+        <pc:spChg chg="mod">
+          <ac:chgData name="Hernan Alperin" userId="53934dd3a01d9526" providerId="LiveId" clId="{0ACE6762-BEC4-424F-AA07-B2B8DE7B0D67}" dt="2020-07-31T01:09:56.479" v="1055" actId="20577"/>
+          <ac:spMkLst>
+            <pc:docMk/>
+            <pc:sldMk cId="2696548569" sldId="278"/>
+            <ac:spMk id="2" creationId="{A21D58BB-8D5E-4C5D-A76A-4A7BB96700D8}"/>
+          </ac:spMkLst>
+        </pc:spChg>
+        <pc:picChg chg="add mod">
+          <ac:chgData name="Hernan Alperin" userId="53934dd3a01d9526" providerId="LiveId" clId="{0ACE6762-BEC4-424F-AA07-B2B8DE7B0D67}" dt="2020-07-31T01:16:43.087" v="1059" actId="1076"/>
+          <ac:picMkLst>
+            <pc:docMk/>
+            <pc:sldMk cId="2696548569" sldId="278"/>
+            <ac:picMk id="4" creationId="{916F44B5-ECA4-496F-82FD-77323EDC7C33}"/>
+          </ac:picMkLst>
+        </pc:picChg>
+        <pc:picChg chg="add mod">
+          <ac:chgData name="Hernan Alperin" userId="53934dd3a01d9526" providerId="LiveId" clId="{0ACE6762-BEC4-424F-AA07-B2B8DE7B0D67}" dt="2020-07-31T01:17:16.691" v="1063" actId="14100"/>
+          <ac:picMkLst>
+            <pc:docMk/>
+            <pc:sldMk cId="2696548569" sldId="278"/>
+            <ac:picMk id="6" creationId="{5EBCA068-4F62-4E40-A7D2-8C00B0B22AA6}"/>
+          </ac:picMkLst>
+        </pc:picChg>
+      </pc:sldChg>
+      <pc:sldChg chg="addSp modSp new mod">
+        <pc:chgData name="Hernan Alperin" userId="53934dd3a01d9526" providerId="LiveId" clId="{0ACE6762-BEC4-424F-AA07-B2B8DE7B0D67}" dt="2020-07-31T01:22:28.168" v="1102" actId="1076"/>
+        <pc:sldMkLst>
+          <pc:docMk/>
+          <pc:sldMk cId="2823912760" sldId="279"/>
+        </pc:sldMkLst>
+        <pc:spChg chg="mod">
+          <ac:chgData name="Hernan Alperin" userId="53934dd3a01d9526" providerId="LiveId" clId="{0ACE6762-BEC4-424F-AA07-B2B8DE7B0D67}" dt="2020-07-31T01:18:11.243" v="1075" actId="20577"/>
+          <ac:spMkLst>
+            <pc:docMk/>
+            <pc:sldMk cId="2823912760" sldId="279"/>
+            <ac:spMk id="2" creationId="{49EED29B-6ECB-4B01-84C4-D3C997C5AADD}"/>
+          </ac:spMkLst>
+        </pc:spChg>
+        <pc:picChg chg="add mod">
+          <ac:chgData name="Hernan Alperin" userId="53934dd3a01d9526" providerId="LiveId" clId="{0ACE6762-BEC4-424F-AA07-B2B8DE7B0D67}" dt="2020-07-31T01:18:26.083" v="1078" actId="1076"/>
+          <ac:picMkLst>
+            <pc:docMk/>
+            <pc:sldMk cId="2823912760" sldId="279"/>
+            <ac:picMk id="4" creationId="{32C5F542-73DB-4315-8715-57B0ECCAF031}"/>
+          </ac:picMkLst>
+        </pc:picChg>
+        <pc:picChg chg="add mod">
+          <ac:chgData name="Hernan Alperin" userId="53934dd3a01d9526" providerId="LiveId" clId="{0ACE6762-BEC4-424F-AA07-B2B8DE7B0D67}" dt="2020-07-31T01:22:26.416" v="1101" actId="1076"/>
+          <ac:picMkLst>
+            <pc:docMk/>
+            <pc:sldMk cId="2823912760" sldId="279"/>
+            <ac:picMk id="6" creationId="{D54334BE-8F6B-428F-A714-8B61871D05AC}"/>
+          </ac:picMkLst>
+        </pc:picChg>
+        <pc:picChg chg="add mod">
+          <ac:chgData name="Hernan Alperin" userId="53934dd3a01d9526" providerId="LiveId" clId="{0ACE6762-BEC4-424F-AA07-B2B8DE7B0D67}" dt="2020-07-31T01:21:52.756" v="1088" actId="14100"/>
+          <ac:picMkLst>
+            <pc:docMk/>
+            <pc:sldMk cId="2823912760" sldId="279"/>
+            <ac:picMk id="8" creationId="{75398FDC-2888-4FE3-8C80-DC4B57335734}"/>
+          </ac:picMkLst>
+        </pc:picChg>
+        <pc:picChg chg="add mod">
+          <ac:chgData name="Hernan Alperin" userId="53934dd3a01d9526" providerId="LiveId" clId="{0ACE6762-BEC4-424F-AA07-B2B8DE7B0D67}" dt="2020-07-31T01:22:28.168" v="1102" actId="1076"/>
+          <ac:picMkLst>
+            <pc:docMk/>
+            <pc:sldMk cId="2823912760" sldId="279"/>
+            <ac:picMk id="10" creationId="{5025DE8C-BF87-424D-977F-44348C371343}"/>
+          </ac:picMkLst>
+        </pc:picChg>
+        <pc:picChg chg="add mod">
+          <ac:chgData name="Hernan Alperin" userId="53934dd3a01d9526" providerId="LiveId" clId="{0ACE6762-BEC4-424F-AA07-B2B8DE7B0D67}" dt="2020-07-31T01:22:09.142" v="1096" actId="1076"/>
+          <ac:picMkLst>
+            <pc:docMk/>
+            <pc:sldMk cId="2823912760" sldId="279"/>
+            <ac:picMk id="12" creationId="{D55C5612-B20F-4111-8933-212E14807788}"/>
+          </ac:picMkLst>
+        </pc:picChg>
+        <pc:picChg chg="add mod">
+          <ac:chgData name="Hernan Alperin" userId="53934dd3a01d9526" providerId="LiveId" clId="{0ACE6762-BEC4-424F-AA07-B2B8DE7B0D67}" dt="2020-07-31T01:22:24.744" v="1100" actId="1076"/>
+          <ac:picMkLst>
+            <pc:docMk/>
+            <pc:sldMk cId="2823912760" sldId="279"/>
+            <ac:picMk id="14" creationId="{4E216C38-43CD-436D-8331-ABB603EB054E}"/>
+          </ac:picMkLst>
+        </pc:picChg>
+        <pc:picChg chg="add mod">
+          <ac:chgData name="Hernan Alperin" userId="53934dd3a01d9526" providerId="LiveId" clId="{0ACE6762-BEC4-424F-AA07-B2B8DE7B0D67}" dt="2020-07-31T01:22:10.990" v="1097" actId="1076"/>
+          <ac:picMkLst>
+            <pc:docMk/>
+            <pc:sldMk cId="2823912760" sldId="279"/>
+            <ac:picMk id="16" creationId="{6269558D-2FF3-4A24-B8C0-99CC919A7D87}"/>
+          </ac:picMkLst>
+        </pc:picChg>
+      </pc:sldChg>
+      <pc:sldChg chg="add del">
+        <pc:chgData name="Hernan Alperin" userId="53934dd3a01d9526" providerId="LiveId" clId="{0ACE6762-BEC4-424F-AA07-B2B8DE7B0D67}" dt="2020-07-09T08:45:42.414" v="657" actId="47"/>
+        <pc:sldMkLst>
+          <pc:docMk/>
+          <pc:sldMk cId="0" sldId="308"/>
+        </pc:sldMkLst>
+      </pc:sldChg>
+      <pc:sldChg chg="add del">
+        <pc:chgData name="Hernan Alperin" userId="53934dd3a01d9526" providerId="LiveId" clId="{0ACE6762-BEC4-424F-AA07-B2B8DE7B0D67}" dt="2020-07-09T08:45:42.414" v="657" actId="47"/>
+        <pc:sldMkLst>
+          <pc:docMk/>
+          <pc:sldMk cId="0" sldId="309"/>
+        </pc:sldMkLst>
+      </pc:sldChg>
+      <pc:sldChg chg="add del">
+        <pc:chgData name="Hernan Alperin" userId="53934dd3a01d9526" providerId="LiveId" clId="{0ACE6762-BEC4-424F-AA07-B2B8DE7B0D67}" dt="2020-07-09T08:45:42.414" v="657" actId="47"/>
+        <pc:sldMkLst>
+          <pc:docMk/>
+          <pc:sldMk cId="0" sldId="310"/>
+        </pc:sldMkLst>
+      </pc:sldChg>
+      <pc:sldChg chg="add del">
+        <pc:chgData name="Hernan Alperin" userId="53934dd3a01d9526" providerId="LiveId" clId="{0ACE6762-BEC4-424F-AA07-B2B8DE7B0D67}" dt="2020-07-09T08:45:42.414" v="657" actId="47"/>
+        <pc:sldMkLst>
+          <pc:docMk/>
+          <pc:sldMk cId="0" sldId="327"/>
+        </pc:sldMkLst>
+      </pc:sldChg>
+      <pc:sldMasterChg chg="delSldLayout">
+        <pc:chgData name="Hernan Alperin" userId="53934dd3a01d9526" providerId="LiveId" clId="{0ACE6762-BEC4-424F-AA07-B2B8DE7B0D67}" dt="2020-07-09T08:45:42.414" v="657" actId="47"/>
+        <pc:sldMasterMkLst>
+          <pc:docMk/>
+          <pc:sldMasterMk cId="2512678763" sldId="2147483708"/>
+        </pc:sldMasterMkLst>
+        <pc:sldLayoutChg chg="del">
+          <pc:chgData name="Hernan Alperin" userId="53934dd3a01d9526" providerId="LiveId" clId="{0ACE6762-BEC4-424F-AA07-B2B8DE7B0D67}" dt="2020-07-09T08:45:42.414" v="657" actId="47"/>
+          <pc:sldLayoutMkLst>
+            <pc:docMk/>
+            <pc:sldMasterMk cId="2512678763" sldId="2147483708"/>
+            <pc:sldLayoutMk cId="1286837748" sldId="2147483720"/>
+          </pc:sldLayoutMkLst>
+        </pc:sldLayoutChg>
+      </pc:sldMasterChg>
     </pc:docChg>
   </pc:docChgLst>
   <pc:docChgLst>
@@ -1904,7 +2436,7 @@
           <a:p>
             <a:fld id="{BB2F7DFF-5F1B-4566-B0D3-4B3A3737C997}" type="datetimeFigureOut">
               <a:rPr lang="es-AR" smtClean="0"/>
-              <a:t>8/7/2020</a:t>
+              <a:t>30/7/2020</a:t>
             </a:fld>
             <a:endParaRPr lang="es-AR"/>
           </a:p>
@@ -2074,7 +2606,7 @@
           <a:p>
             <a:fld id="{BB2F7DFF-5F1B-4566-B0D3-4B3A3737C997}" type="datetimeFigureOut">
               <a:rPr lang="es-AR" smtClean="0"/>
-              <a:t>8/7/2020</a:t>
+              <a:t>30/7/2020</a:t>
             </a:fld>
             <a:endParaRPr lang="es-AR"/>
           </a:p>
@@ -2254,7 +2786,7 @@
           <a:p>
             <a:fld id="{BB2F7DFF-5F1B-4566-B0D3-4B3A3737C997}" type="datetimeFigureOut">
               <a:rPr lang="es-AR" smtClean="0"/>
-              <a:t>8/7/2020</a:t>
+              <a:t>30/7/2020</a:t>
             </a:fld>
             <a:endParaRPr lang="es-AR"/>
           </a:p>
@@ -2424,7 +2956,7 @@
           <a:p>
             <a:fld id="{BB2F7DFF-5F1B-4566-B0D3-4B3A3737C997}" type="datetimeFigureOut">
               <a:rPr lang="es-AR" smtClean="0"/>
-              <a:t>8/7/2020</a:t>
+              <a:t>30/7/2020</a:t>
             </a:fld>
             <a:endParaRPr lang="es-AR"/>
           </a:p>
@@ -2670,7 +3202,7 @@
           <a:p>
             <a:fld id="{BB2F7DFF-5F1B-4566-B0D3-4B3A3737C997}" type="datetimeFigureOut">
               <a:rPr lang="es-AR" smtClean="0"/>
-              <a:t>8/7/2020</a:t>
+              <a:t>30/7/2020</a:t>
             </a:fld>
             <a:endParaRPr lang="es-AR"/>
           </a:p>
@@ -2902,7 +3434,7 @@
           <a:p>
             <a:fld id="{BB2F7DFF-5F1B-4566-B0D3-4B3A3737C997}" type="datetimeFigureOut">
               <a:rPr lang="es-AR" smtClean="0"/>
-              <a:t>8/7/2020</a:t>
+              <a:t>30/7/2020</a:t>
             </a:fld>
             <a:endParaRPr lang="es-AR"/>
           </a:p>
@@ -3269,7 +3801,7 @@
           <a:p>
             <a:fld id="{BB2F7DFF-5F1B-4566-B0D3-4B3A3737C997}" type="datetimeFigureOut">
               <a:rPr lang="es-AR" smtClean="0"/>
-              <a:t>8/7/2020</a:t>
+              <a:t>30/7/2020</a:t>
             </a:fld>
             <a:endParaRPr lang="es-AR"/>
           </a:p>
@@ -3387,7 +3919,7 @@
           <a:p>
             <a:fld id="{BB2F7DFF-5F1B-4566-B0D3-4B3A3737C997}" type="datetimeFigureOut">
               <a:rPr lang="es-AR" smtClean="0"/>
-              <a:t>8/7/2020</a:t>
+              <a:t>30/7/2020</a:t>
             </a:fld>
             <a:endParaRPr lang="es-AR"/>
           </a:p>
@@ -3482,7 +4014,7 @@
           <a:p>
             <a:fld id="{BB2F7DFF-5F1B-4566-B0D3-4B3A3737C997}" type="datetimeFigureOut">
               <a:rPr lang="es-AR" smtClean="0"/>
-              <a:t>8/7/2020</a:t>
+              <a:t>30/7/2020</a:t>
             </a:fld>
             <a:endParaRPr lang="es-AR"/>
           </a:p>
@@ -3759,7 +4291,7 @@
           <a:p>
             <a:fld id="{BB2F7DFF-5F1B-4566-B0D3-4B3A3737C997}" type="datetimeFigureOut">
               <a:rPr lang="es-AR" smtClean="0"/>
-              <a:t>8/7/2020</a:t>
+              <a:t>30/7/2020</a:t>
             </a:fld>
             <a:endParaRPr lang="es-AR"/>
           </a:p>
@@ -4016,7 +4548,7 @@
           <a:p>
             <a:fld id="{BB2F7DFF-5F1B-4566-B0D3-4B3A3737C997}" type="datetimeFigureOut">
               <a:rPr lang="es-AR" smtClean="0"/>
-              <a:t>8/7/2020</a:t>
+              <a:t>30/7/2020</a:t>
             </a:fld>
             <a:endParaRPr lang="es-AR"/>
           </a:p>
@@ -4229,7 +4761,7 @@
           <a:p>
             <a:fld id="{BB2F7DFF-5F1B-4566-B0D3-4B3A3737C997}" type="datetimeFigureOut">
               <a:rPr lang="es-AR" smtClean="0"/>
-              <a:t>8/7/2020</a:t>
+              <a:t>30/7/2020</a:t>
             </a:fld>
             <a:endParaRPr lang="es-AR"/>
           </a:p>
@@ -5277,826 +5809,6 @@
           <p:cNvPr id="2" name="Título 1">
             <a:extLst>
               <a:ext uri="{FF2B5EF4-FFF2-40B4-BE49-F238E27FC236}">
-                <a16:creationId xmlns:a16="http://schemas.microsoft.com/office/drawing/2014/main" id="{3F9640A5-903A-45E6-8F6A-4F99470764CA}"/>
-              </a:ext>
-            </a:extLst>
-          </p:cNvPr>
-          <p:cNvSpPr>
-            <a:spLocks noGrp="1"/>
-          </p:cNvSpPr>
-          <p:nvPr>
-            <p:ph type="title"/>
-          </p:nvPr>
-        </p:nvSpPr>
-        <p:spPr>
-          <a:xfrm>
-            <a:off x="226815" y="450744"/>
-            <a:ext cx="5720735" cy="1325563"/>
-          </a:xfrm>
-        </p:spPr>
-        <p:txBody>
-          <a:bodyPr>
-            <a:normAutofit/>
-          </a:bodyPr>
-          <a:lstStyle/>
-          <a:p>
-            <a:pPr algn="ctr"/>
-            <a:r>
-              <a:rPr lang="es-AR" sz="5400" b="1" i="1" dirty="0">
-                <a:latin typeface="Segoe Print" panose="02000600000000000000" pitchFamily="2" charset="0"/>
-              </a:rPr>
-              <a:t>Tipos de Radios</a:t>
-            </a:r>
-            <a:endParaRPr lang="es-AR" sz="5400" b="1" i="1" dirty="0">
-              <a:latin typeface="Segoe Script" panose="030B0504020000000003" pitchFamily="66" charset="0"/>
-            </a:endParaRPr>
-          </a:p>
-        </p:txBody>
-      </p:sp>
-      <p:sp>
-        <p:nvSpPr>
-          <p:cNvPr id="3" name="CuadroTexto 2">
-            <a:extLst>
-              <a:ext uri="{FF2B5EF4-FFF2-40B4-BE49-F238E27FC236}">
-                <a16:creationId xmlns:a16="http://schemas.microsoft.com/office/drawing/2014/main" id="{5A9A0437-608D-495B-B722-C8295D7A3926}"/>
-              </a:ext>
-            </a:extLst>
-          </p:cNvPr>
-          <p:cNvSpPr txBox="1"/>
-          <p:nvPr/>
-        </p:nvSpPr>
-        <p:spPr>
-          <a:xfrm>
-            <a:off x="5947550" y="1597194"/>
-            <a:ext cx="5202372" cy="1384995"/>
-          </a:xfrm>
-          <a:prstGeom prst="rect">
-            <a:avLst/>
-          </a:prstGeom>
-          <a:noFill/>
-        </p:spPr>
-        <p:txBody>
-          <a:bodyPr wrap="square" rtlCol="0">
-            <a:spAutoFit/>
-          </a:bodyPr>
-          <a:lstStyle/>
-          <a:p>
-            <a:r>
-              <a:rPr lang="es-AR" sz="2800" i="1" dirty="0">
-                <a:latin typeface="Segoe Print" panose="02000600000000000000" pitchFamily="2" charset="0"/>
-              </a:rPr>
-              <a:t>Según distribución de viviendas</a:t>
-            </a:r>
-            <a:br>
-              <a:rPr lang="es-AR" sz="2800" i="1" dirty="0">
-                <a:latin typeface="Segoe Print" panose="02000600000000000000" pitchFamily="2" charset="0"/>
-              </a:rPr>
-            </a:br>
-            <a:r>
-              <a:rPr lang="es-AR" sz="2800" i="1" dirty="0">
-                <a:latin typeface="Segoe Print" panose="02000600000000000000" pitchFamily="2" charset="0"/>
-              </a:rPr>
-              <a:t>dada una carga deseada.</a:t>
-            </a:r>
-          </a:p>
-        </p:txBody>
-      </p:sp>
-      <p:sp>
-        <p:nvSpPr>
-          <p:cNvPr id="4" name="Rectángulo: esquinas redondeadas 3">
-            <a:extLst>
-              <a:ext uri="{FF2B5EF4-FFF2-40B4-BE49-F238E27FC236}">
-                <a16:creationId xmlns:a16="http://schemas.microsoft.com/office/drawing/2014/main" id="{88630322-1F4C-437E-81EE-6FCFFBB08546}"/>
-              </a:ext>
-            </a:extLst>
-          </p:cNvPr>
-          <p:cNvSpPr/>
-          <p:nvPr/>
-        </p:nvSpPr>
-        <p:spPr>
-          <a:xfrm>
-            <a:off x="608250" y="3565582"/>
-            <a:ext cx="7498080" cy="2841674"/>
-          </a:xfrm>
-          <a:custGeom>
-            <a:avLst/>
-            <a:gdLst>
-              <a:gd name="connsiteX0" fmla="*/ 0 w 7498080"/>
-              <a:gd name="connsiteY0" fmla="*/ 473622 h 2841674"/>
-              <a:gd name="connsiteX1" fmla="*/ 473622 w 7498080"/>
-              <a:gd name="connsiteY1" fmla="*/ 0 h 2841674"/>
-              <a:gd name="connsiteX2" fmla="*/ 1134661 w 7498080"/>
-              <a:gd name="connsiteY2" fmla="*/ 0 h 2841674"/>
-              <a:gd name="connsiteX3" fmla="*/ 1730191 w 7498080"/>
-              <a:gd name="connsiteY3" fmla="*/ 0 h 2841674"/>
-              <a:gd name="connsiteX4" fmla="*/ 2260214 w 7498080"/>
-              <a:gd name="connsiteY4" fmla="*/ 0 h 2841674"/>
-              <a:gd name="connsiteX5" fmla="*/ 2921253 w 7498080"/>
-              <a:gd name="connsiteY5" fmla="*/ 0 h 2841674"/>
-              <a:gd name="connsiteX6" fmla="*/ 3320258 w 7498080"/>
-              <a:gd name="connsiteY6" fmla="*/ 0 h 2841674"/>
-              <a:gd name="connsiteX7" fmla="*/ 3784772 w 7498080"/>
-              <a:gd name="connsiteY7" fmla="*/ 0 h 2841674"/>
-              <a:gd name="connsiteX8" fmla="*/ 4380302 w 7498080"/>
-              <a:gd name="connsiteY8" fmla="*/ 0 h 2841674"/>
-              <a:gd name="connsiteX9" fmla="*/ 4844816 w 7498080"/>
-              <a:gd name="connsiteY9" fmla="*/ 0 h 2841674"/>
-              <a:gd name="connsiteX10" fmla="*/ 5374838 w 7498080"/>
-              <a:gd name="connsiteY10" fmla="*/ 0 h 2841674"/>
-              <a:gd name="connsiteX11" fmla="*/ 5839352 w 7498080"/>
-              <a:gd name="connsiteY11" fmla="*/ 0 h 2841674"/>
-              <a:gd name="connsiteX12" fmla="*/ 6500391 w 7498080"/>
-              <a:gd name="connsiteY12" fmla="*/ 0 h 2841674"/>
-              <a:gd name="connsiteX13" fmla="*/ 7024458 w 7498080"/>
-              <a:gd name="connsiteY13" fmla="*/ 0 h 2841674"/>
-              <a:gd name="connsiteX14" fmla="*/ 7498080 w 7498080"/>
-              <a:gd name="connsiteY14" fmla="*/ 473622 h 2841674"/>
-              <a:gd name="connsiteX15" fmla="*/ 7498080 w 7498080"/>
-              <a:gd name="connsiteY15" fmla="*/ 890397 h 2841674"/>
-              <a:gd name="connsiteX16" fmla="*/ 7498080 w 7498080"/>
-              <a:gd name="connsiteY16" fmla="*/ 1364004 h 2841674"/>
-              <a:gd name="connsiteX17" fmla="*/ 7498080 w 7498080"/>
-              <a:gd name="connsiteY17" fmla="*/ 1780779 h 2841674"/>
-              <a:gd name="connsiteX18" fmla="*/ 7498080 w 7498080"/>
-              <a:gd name="connsiteY18" fmla="*/ 2368052 h 2841674"/>
-              <a:gd name="connsiteX19" fmla="*/ 7024458 w 7498080"/>
-              <a:gd name="connsiteY19" fmla="*/ 2841674 h 2841674"/>
-              <a:gd name="connsiteX20" fmla="*/ 6559944 w 7498080"/>
-              <a:gd name="connsiteY20" fmla="*/ 2841674 h 2841674"/>
-              <a:gd name="connsiteX21" fmla="*/ 6029922 w 7498080"/>
-              <a:gd name="connsiteY21" fmla="*/ 2841674 h 2841674"/>
-              <a:gd name="connsiteX22" fmla="*/ 5434391 w 7498080"/>
-              <a:gd name="connsiteY22" fmla="*/ 2841674 h 2841674"/>
-              <a:gd name="connsiteX23" fmla="*/ 4773353 w 7498080"/>
-              <a:gd name="connsiteY23" fmla="*/ 2841674 h 2841674"/>
-              <a:gd name="connsiteX24" fmla="*/ 4243330 w 7498080"/>
-              <a:gd name="connsiteY24" fmla="*/ 2841674 h 2841674"/>
-              <a:gd name="connsiteX25" fmla="*/ 3778817 w 7498080"/>
-              <a:gd name="connsiteY25" fmla="*/ 2841674 h 2841674"/>
-              <a:gd name="connsiteX26" fmla="*/ 3314303 w 7498080"/>
-              <a:gd name="connsiteY26" fmla="*/ 2841674 h 2841674"/>
-              <a:gd name="connsiteX27" fmla="*/ 2915297 w 7498080"/>
-              <a:gd name="connsiteY27" fmla="*/ 2841674 h 2841674"/>
-              <a:gd name="connsiteX28" fmla="*/ 2450783 w 7498080"/>
-              <a:gd name="connsiteY28" fmla="*/ 2841674 h 2841674"/>
-              <a:gd name="connsiteX29" fmla="*/ 1789745 w 7498080"/>
-              <a:gd name="connsiteY29" fmla="*/ 2841674 h 2841674"/>
-              <a:gd name="connsiteX30" fmla="*/ 1128706 w 7498080"/>
-              <a:gd name="connsiteY30" fmla="*/ 2841674 h 2841674"/>
-              <a:gd name="connsiteX31" fmla="*/ 473622 w 7498080"/>
-              <a:gd name="connsiteY31" fmla="*/ 2841674 h 2841674"/>
-              <a:gd name="connsiteX32" fmla="*/ 0 w 7498080"/>
-              <a:gd name="connsiteY32" fmla="*/ 2368052 h 2841674"/>
-              <a:gd name="connsiteX33" fmla="*/ 0 w 7498080"/>
-              <a:gd name="connsiteY33" fmla="*/ 1875500 h 2841674"/>
-              <a:gd name="connsiteX34" fmla="*/ 0 w 7498080"/>
-              <a:gd name="connsiteY34" fmla="*/ 1401893 h 2841674"/>
-              <a:gd name="connsiteX35" fmla="*/ 0 w 7498080"/>
-              <a:gd name="connsiteY35" fmla="*/ 985118 h 2841674"/>
-              <a:gd name="connsiteX36" fmla="*/ 0 w 7498080"/>
-              <a:gd name="connsiteY36" fmla="*/ 473622 h 2841674"/>
-            </a:gdLst>
-            <a:ahLst/>
-            <a:cxnLst>
-              <a:cxn ang="0">
-                <a:pos x="connsiteX0" y="connsiteY0"/>
-              </a:cxn>
-              <a:cxn ang="0">
-                <a:pos x="connsiteX1" y="connsiteY1"/>
-              </a:cxn>
-              <a:cxn ang="0">
-                <a:pos x="connsiteX2" y="connsiteY2"/>
-              </a:cxn>
-              <a:cxn ang="0">
-                <a:pos x="connsiteX3" y="connsiteY3"/>
-              </a:cxn>
-              <a:cxn ang="0">
-                <a:pos x="connsiteX4" y="connsiteY4"/>
-              </a:cxn>
-              <a:cxn ang="0">
-                <a:pos x="connsiteX5" y="connsiteY5"/>
-              </a:cxn>
-              <a:cxn ang="0">
-                <a:pos x="connsiteX6" y="connsiteY6"/>
-              </a:cxn>
-              <a:cxn ang="0">
-                <a:pos x="connsiteX7" y="connsiteY7"/>
-              </a:cxn>
-              <a:cxn ang="0">
-                <a:pos x="connsiteX8" y="connsiteY8"/>
-              </a:cxn>
-              <a:cxn ang="0">
-                <a:pos x="connsiteX9" y="connsiteY9"/>
-              </a:cxn>
-              <a:cxn ang="0">
-                <a:pos x="connsiteX10" y="connsiteY10"/>
-              </a:cxn>
-              <a:cxn ang="0">
-                <a:pos x="connsiteX11" y="connsiteY11"/>
-              </a:cxn>
-              <a:cxn ang="0">
-                <a:pos x="connsiteX12" y="connsiteY12"/>
-              </a:cxn>
-              <a:cxn ang="0">
-                <a:pos x="connsiteX13" y="connsiteY13"/>
-              </a:cxn>
-              <a:cxn ang="0">
-                <a:pos x="connsiteX14" y="connsiteY14"/>
-              </a:cxn>
-              <a:cxn ang="0">
-                <a:pos x="connsiteX15" y="connsiteY15"/>
-              </a:cxn>
-              <a:cxn ang="0">
-                <a:pos x="connsiteX16" y="connsiteY16"/>
-              </a:cxn>
-              <a:cxn ang="0">
-                <a:pos x="connsiteX17" y="connsiteY17"/>
-              </a:cxn>
-              <a:cxn ang="0">
-                <a:pos x="connsiteX18" y="connsiteY18"/>
-              </a:cxn>
-              <a:cxn ang="0">
-                <a:pos x="connsiteX19" y="connsiteY19"/>
-              </a:cxn>
-              <a:cxn ang="0">
-                <a:pos x="connsiteX20" y="connsiteY20"/>
-              </a:cxn>
-              <a:cxn ang="0">
-                <a:pos x="connsiteX21" y="connsiteY21"/>
-              </a:cxn>
-              <a:cxn ang="0">
-                <a:pos x="connsiteX22" y="connsiteY22"/>
-              </a:cxn>
-              <a:cxn ang="0">
-                <a:pos x="connsiteX23" y="connsiteY23"/>
-              </a:cxn>
-              <a:cxn ang="0">
-                <a:pos x="connsiteX24" y="connsiteY24"/>
-              </a:cxn>
-              <a:cxn ang="0">
-                <a:pos x="connsiteX25" y="connsiteY25"/>
-              </a:cxn>
-              <a:cxn ang="0">
-                <a:pos x="connsiteX26" y="connsiteY26"/>
-              </a:cxn>
-              <a:cxn ang="0">
-                <a:pos x="connsiteX27" y="connsiteY27"/>
-              </a:cxn>
-              <a:cxn ang="0">
-                <a:pos x="connsiteX28" y="connsiteY28"/>
-              </a:cxn>
-              <a:cxn ang="0">
-                <a:pos x="connsiteX29" y="connsiteY29"/>
-              </a:cxn>
-              <a:cxn ang="0">
-                <a:pos x="connsiteX30" y="connsiteY30"/>
-              </a:cxn>
-              <a:cxn ang="0">
-                <a:pos x="connsiteX31" y="connsiteY31"/>
-              </a:cxn>
-              <a:cxn ang="0">
-                <a:pos x="connsiteX32" y="connsiteY32"/>
-              </a:cxn>
-              <a:cxn ang="0">
-                <a:pos x="connsiteX33" y="connsiteY33"/>
-              </a:cxn>
-              <a:cxn ang="0">
-                <a:pos x="connsiteX34" y="connsiteY34"/>
-              </a:cxn>
-              <a:cxn ang="0">
-                <a:pos x="connsiteX35" y="connsiteY35"/>
-              </a:cxn>
-              <a:cxn ang="0">
-                <a:pos x="connsiteX36" y="connsiteY36"/>
-              </a:cxn>
-            </a:cxnLst>
-            <a:rect l="l" t="t" r="r" b="b"/>
-            <a:pathLst>
-              <a:path w="7498080" h="2841674" fill="none" extrusionOk="0">
-                <a:moveTo>
-                  <a:pt x="0" y="473622"/>
-                </a:moveTo>
-                <a:cubicBezTo>
-                  <a:pt x="38937" y="167040"/>
-                  <a:pt x="220279" y="-41260"/>
-                  <a:pt x="473622" y="0"/>
-                </a:cubicBezTo>
-                <a:cubicBezTo>
-                  <a:pt x="764155" y="-57616"/>
-                  <a:pt x="970367" y="46203"/>
-                  <a:pt x="1134661" y="0"/>
-                </a:cubicBezTo>
-                <a:cubicBezTo>
-                  <a:pt x="1298955" y="-46203"/>
-                  <a:pt x="1513677" y="70263"/>
-                  <a:pt x="1730191" y="0"/>
-                </a:cubicBezTo>
-                <a:cubicBezTo>
-                  <a:pt x="1946705" y="-70263"/>
-                  <a:pt x="2081045" y="10745"/>
-                  <a:pt x="2260214" y="0"/>
-                </a:cubicBezTo>
-                <a:cubicBezTo>
-                  <a:pt x="2439383" y="-10745"/>
-                  <a:pt x="2701347" y="23279"/>
-                  <a:pt x="2921253" y="0"/>
-                </a:cubicBezTo>
-                <a:cubicBezTo>
-                  <a:pt x="3141159" y="-23279"/>
-                  <a:pt x="3188188" y="20776"/>
-                  <a:pt x="3320258" y="0"/>
-                </a:cubicBezTo>
-                <a:cubicBezTo>
-                  <a:pt x="3452329" y="-20776"/>
-                  <a:pt x="3606351" y="36134"/>
-                  <a:pt x="3784772" y="0"/>
-                </a:cubicBezTo>
-                <a:cubicBezTo>
-                  <a:pt x="3963193" y="-36134"/>
-                  <a:pt x="4190527" y="6182"/>
-                  <a:pt x="4380302" y="0"/>
-                </a:cubicBezTo>
-                <a:cubicBezTo>
-                  <a:pt x="4570077" y="-6182"/>
-                  <a:pt x="4716500" y="7504"/>
-                  <a:pt x="4844816" y="0"/>
-                </a:cubicBezTo>
-                <a:cubicBezTo>
-                  <a:pt x="4973132" y="-7504"/>
-                  <a:pt x="5160078" y="47674"/>
-                  <a:pt x="5374838" y="0"/>
-                </a:cubicBezTo>
-                <a:cubicBezTo>
-                  <a:pt x="5589598" y="-47674"/>
-                  <a:pt x="5655889" y="4731"/>
-                  <a:pt x="5839352" y="0"/>
-                </a:cubicBezTo>
-                <a:cubicBezTo>
-                  <a:pt x="6022815" y="-4731"/>
-                  <a:pt x="6217972" y="12533"/>
-                  <a:pt x="6500391" y="0"/>
-                </a:cubicBezTo>
-                <a:cubicBezTo>
-                  <a:pt x="6782810" y="-12533"/>
-                  <a:pt x="6851124" y="18487"/>
-                  <a:pt x="7024458" y="0"/>
-                </a:cubicBezTo>
-                <a:cubicBezTo>
-                  <a:pt x="7282594" y="9488"/>
-                  <a:pt x="7525705" y="196804"/>
-                  <a:pt x="7498080" y="473622"/>
-                </a:cubicBezTo>
-                <a:cubicBezTo>
-                  <a:pt x="7499009" y="606687"/>
-                  <a:pt x="7459571" y="753336"/>
-                  <a:pt x="7498080" y="890397"/>
-                </a:cubicBezTo>
-                <a:cubicBezTo>
-                  <a:pt x="7536589" y="1027458"/>
-                  <a:pt x="7458316" y="1155393"/>
-                  <a:pt x="7498080" y="1364004"/>
-                </a:cubicBezTo>
-                <a:cubicBezTo>
-                  <a:pt x="7537844" y="1572615"/>
-                  <a:pt x="7487424" y="1655875"/>
-                  <a:pt x="7498080" y="1780779"/>
-                </a:cubicBezTo>
-                <a:cubicBezTo>
-                  <a:pt x="7508736" y="1905684"/>
-                  <a:pt x="7450497" y="2092794"/>
-                  <a:pt x="7498080" y="2368052"/>
-                </a:cubicBezTo>
-                <a:cubicBezTo>
-                  <a:pt x="7502145" y="2639467"/>
-                  <a:pt x="7280719" y="2839693"/>
-                  <a:pt x="7024458" y="2841674"/>
-                </a:cubicBezTo>
-                <a:cubicBezTo>
-                  <a:pt x="6817265" y="2851440"/>
-                  <a:pt x="6681567" y="2811562"/>
-                  <a:pt x="6559944" y="2841674"/>
-                </a:cubicBezTo>
-                <a:cubicBezTo>
-                  <a:pt x="6438321" y="2871786"/>
-                  <a:pt x="6141344" y="2839360"/>
-                  <a:pt x="6029922" y="2841674"/>
-                </a:cubicBezTo>
-                <a:cubicBezTo>
-                  <a:pt x="5918500" y="2843988"/>
-                  <a:pt x="5716467" y="2776185"/>
-                  <a:pt x="5434391" y="2841674"/>
-                </a:cubicBezTo>
-                <a:cubicBezTo>
-                  <a:pt x="5152315" y="2907163"/>
-                  <a:pt x="5053601" y="2839432"/>
-                  <a:pt x="4773353" y="2841674"/>
-                </a:cubicBezTo>
-                <a:cubicBezTo>
-                  <a:pt x="4493105" y="2843916"/>
-                  <a:pt x="4379474" y="2815957"/>
-                  <a:pt x="4243330" y="2841674"/>
-                </a:cubicBezTo>
-                <a:cubicBezTo>
-                  <a:pt x="4107186" y="2867391"/>
-                  <a:pt x="3876000" y="2813300"/>
-                  <a:pt x="3778817" y="2841674"/>
-                </a:cubicBezTo>
-                <a:cubicBezTo>
-                  <a:pt x="3681634" y="2870048"/>
-                  <a:pt x="3475978" y="2805797"/>
-                  <a:pt x="3314303" y="2841674"/>
-                </a:cubicBezTo>
-                <a:cubicBezTo>
-                  <a:pt x="3152628" y="2877551"/>
-                  <a:pt x="3084048" y="2836167"/>
-                  <a:pt x="2915297" y="2841674"/>
-                </a:cubicBezTo>
-                <a:cubicBezTo>
-                  <a:pt x="2746546" y="2847181"/>
-                  <a:pt x="2667107" y="2834218"/>
-                  <a:pt x="2450783" y="2841674"/>
-                </a:cubicBezTo>
-                <a:cubicBezTo>
-                  <a:pt x="2234459" y="2849130"/>
-                  <a:pt x="2112324" y="2826997"/>
-                  <a:pt x="1789745" y="2841674"/>
-                </a:cubicBezTo>
-                <a:cubicBezTo>
-                  <a:pt x="1467166" y="2856351"/>
-                  <a:pt x="1262375" y="2837060"/>
-                  <a:pt x="1128706" y="2841674"/>
-                </a:cubicBezTo>
-                <a:cubicBezTo>
-                  <a:pt x="995037" y="2846288"/>
-                  <a:pt x="790249" y="2766547"/>
-                  <a:pt x="473622" y="2841674"/>
-                </a:cubicBezTo>
-                <a:cubicBezTo>
-                  <a:pt x="254796" y="2797851"/>
-                  <a:pt x="5442" y="2623474"/>
-                  <a:pt x="0" y="2368052"/>
-                </a:cubicBezTo>
-                <a:cubicBezTo>
-                  <a:pt x="-31243" y="2146398"/>
-                  <a:pt x="36807" y="1981405"/>
-                  <a:pt x="0" y="1875500"/>
-                </a:cubicBezTo>
-                <a:cubicBezTo>
-                  <a:pt x="-36807" y="1769595"/>
-                  <a:pt x="55094" y="1626275"/>
-                  <a:pt x="0" y="1401893"/>
-                </a:cubicBezTo>
-                <a:cubicBezTo>
-                  <a:pt x="-55094" y="1177511"/>
-                  <a:pt x="20148" y="1088729"/>
-                  <a:pt x="0" y="985118"/>
-                </a:cubicBezTo>
-                <a:cubicBezTo>
-                  <a:pt x="-20148" y="881508"/>
-                  <a:pt x="43708" y="579178"/>
-                  <a:pt x="0" y="473622"/>
-                </a:cubicBezTo>
-                <a:close/>
-              </a:path>
-              <a:path w="7498080" h="2841674" stroke="0" extrusionOk="0">
-                <a:moveTo>
-                  <a:pt x="0" y="473622"/>
-                </a:moveTo>
-                <a:cubicBezTo>
-                  <a:pt x="24624" y="283457"/>
-                  <a:pt x="148952" y="-17882"/>
-                  <a:pt x="473622" y="0"/>
-                </a:cubicBezTo>
-                <a:cubicBezTo>
-                  <a:pt x="599206" y="-53255"/>
-                  <a:pt x="830935" y="42738"/>
-                  <a:pt x="938136" y="0"/>
-                </a:cubicBezTo>
-                <a:cubicBezTo>
-                  <a:pt x="1045337" y="-42738"/>
-                  <a:pt x="1451872" y="37831"/>
-                  <a:pt x="1599175" y="0"/>
-                </a:cubicBezTo>
-                <a:cubicBezTo>
-                  <a:pt x="1746478" y="-37831"/>
-                  <a:pt x="1937137" y="35184"/>
-                  <a:pt x="2194705" y="0"/>
-                </a:cubicBezTo>
-                <a:cubicBezTo>
-                  <a:pt x="2452273" y="-35184"/>
-                  <a:pt x="2599748" y="16445"/>
-                  <a:pt x="2724727" y="0"/>
-                </a:cubicBezTo>
-                <a:cubicBezTo>
-                  <a:pt x="2849706" y="-16445"/>
-                  <a:pt x="3080184" y="32036"/>
-                  <a:pt x="3254750" y="0"/>
-                </a:cubicBezTo>
-                <a:cubicBezTo>
-                  <a:pt x="3429316" y="-32036"/>
-                  <a:pt x="3582808" y="54826"/>
-                  <a:pt x="3719263" y="0"/>
-                </a:cubicBezTo>
-                <a:cubicBezTo>
-                  <a:pt x="3855718" y="-54826"/>
-                  <a:pt x="4158485" y="25737"/>
-                  <a:pt x="4380302" y="0"/>
-                </a:cubicBezTo>
-                <a:cubicBezTo>
-                  <a:pt x="4602119" y="-25737"/>
-                  <a:pt x="4783922" y="54750"/>
-                  <a:pt x="5041341" y="0"/>
-                </a:cubicBezTo>
-                <a:cubicBezTo>
-                  <a:pt x="5298760" y="-54750"/>
-                  <a:pt x="5301971" y="53319"/>
-                  <a:pt x="5505855" y="0"/>
-                </a:cubicBezTo>
-                <a:cubicBezTo>
-                  <a:pt x="5709739" y="-53319"/>
-                  <a:pt x="5914748" y="59925"/>
-                  <a:pt x="6035877" y="0"/>
-                </a:cubicBezTo>
-                <a:cubicBezTo>
-                  <a:pt x="6157006" y="-59925"/>
-                  <a:pt x="6651700" y="11212"/>
-                  <a:pt x="7024458" y="0"/>
-                </a:cubicBezTo>
-                <a:cubicBezTo>
-                  <a:pt x="7246075" y="4542"/>
-                  <a:pt x="7495419" y="196167"/>
-                  <a:pt x="7498080" y="473622"/>
-                </a:cubicBezTo>
-                <a:cubicBezTo>
-                  <a:pt x="7500491" y="690440"/>
-                  <a:pt x="7470507" y="789645"/>
-                  <a:pt x="7498080" y="909341"/>
-                </a:cubicBezTo>
-                <a:cubicBezTo>
-                  <a:pt x="7525653" y="1029037"/>
-                  <a:pt x="7449163" y="1236954"/>
-                  <a:pt x="7498080" y="1326116"/>
-                </a:cubicBezTo>
-                <a:cubicBezTo>
-                  <a:pt x="7546997" y="1415279"/>
-                  <a:pt x="7485451" y="1602565"/>
-                  <a:pt x="7498080" y="1742890"/>
-                </a:cubicBezTo>
-                <a:cubicBezTo>
-                  <a:pt x="7510709" y="1883215"/>
-                  <a:pt x="7471261" y="2171925"/>
-                  <a:pt x="7498080" y="2368052"/>
-                </a:cubicBezTo>
-                <a:cubicBezTo>
-                  <a:pt x="7491233" y="2625289"/>
-                  <a:pt x="7300145" y="2853102"/>
-                  <a:pt x="7024458" y="2841674"/>
-                </a:cubicBezTo>
-                <a:cubicBezTo>
-                  <a:pt x="6854776" y="2859721"/>
-                  <a:pt x="6708159" y="2817657"/>
-                  <a:pt x="6625453" y="2841674"/>
-                </a:cubicBezTo>
-                <a:cubicBezTo>
-                  <a:pt x="6542748" y="2865691"/>
-                  <a:pt x="6289264" y="2819102"/>
-                  <a:pt x="6095430" y="2841674"/>
-                </a:cubicBezTo>
-                <a:cubicBezTo>
-                  <a:pt x="5901596" y="2864246"/>
-                  <a:pt x="5701681" y="2806533"/>
-                  <a:pt x="5565408" y="2841674"/>
-                </a:cubicBezTo>
-                <a:cubicBezTo>
-                  <a:pt x="5429135" y="2876815"/>
-                  <a:pt x="5173002" y="2832096"/>
-                  <a:pt x="4969878" y="2841674"/>
-                </a:cubicBezTo>
-                <a:cubicBezTo>
-                  <a:pt x="4766754" y="2851252"/>
-                  <a:pt x="4661770" y="2771682"/>
-                  <a:pt x="4374347" y="2841674"/>
-                </a:cubicBezTo>
-                <a:cubicBezTo>
-                  <a:pt x="4086924" y="2911666"/>
-                  <a:pt x="4090390" y="2800514"/>
-                  <a:pt x="3909833" y="2841674"/>
-                </a:cubicBezTo>
-                <a:cubicBezTo>
-                  <a:pt x="3729276" y="2882834"/>
-                  <a:pt x="3530876" y="2806482"/>
-                  <a:pt x="3183286" y="2841674"/>
-                </a:cubicBezTo>
-                <a:cubicBezTo>
-                  <a:pt x="2835696" y="2876866"/>
-                  <a:pt x="2823892" y="2799101"/>
-                  <a:pt x="2718772" y="2841674"/>
-                </a:cubicBezTo>
-                <a:cubicBezTo>
-                  <a:pt x="2613652" y="2884247"/>
-                  <a:pt x="2217237" y="2778699"/>
-                  <a:pt x="2057733" y="2841674"/>
-                </a:cubicBezTo>
-                <a:cubicBezTo>
-                  <a:pt x="1898229" y="2904649"/>
-                  <a:pt x="1806720" y="2789543"/>
-                  <a:pt x="1593219" y="2841674"/>
-                </a:cubicBezTo>
-                <a:cubicBezTo>
-                  <a:pt x="1379718" y="2893805"/>
-                  <a:pt x="1354724" y="2807853"/>
-                  <a:pt x="1194214" y="2841674"/>
-                </a:cubicBezTo>
-                <a:cubicBezTo>
-                  <a:pt x="1033705" y="2875495"/>
-                  <a:pt x="642331" y="2788179"/>
-                  <a:pt x="473622" y="2841674"/>
-                </a:cubicBezTo>
-                <a:cubicBezTo>
-                  <a:pt x="261430" y="2806669"/>
-                  <a:pt x="9248" y="2567672"/>
-                  <a:pt x="0" y="2368052"/>
-                </a:cubicBezTo>
-                <a:cubicBezTo>
-                  <a:pt x="-44685" y="2159981"/>
-                  <a:pt x="14919" y="2111148"/>
-                  <a:pt x="0" y="1951277"/>
-                </a:cubicBezTo>
-                <a:cubicBezTo>
-                  <a:pt x="-14919" y="1791407"/>
-                  <a:pt x="20787" y="1595700"/>
-                  <a:pt x="0" y="1477670"/>
-                </a:cubicBezTo>
-                <a:cubicBezTo>
-                  <a:pt x="-20787" y="1359640"/>
-                  <a:pt x="17323" y="1232108"/>
-                  <a:pt x="0" y="1041951"/>
-                </a:cubicBezTo>
-                <a:cubicBezTo>
-                  <a:pt x="-17323" y="851794"/>
-                  <a:pt x="38344" y="730308"/>
-                  <a:pt x="0" y="473622"/>
-                </a:cubicBezTo>
-                <a:close/>
-              </a:path>
-            </a:pathLst>
-          </a:custGeom>
-          <a:solidFill>
-            <a:schemeClr val="bg1"/>
-          </a:solidFill>
-          <a:ln w="19050">
-            <a:solidFill>
-              <a:schemeClr val="tx1"/>
-            </a:solidFill>
-            <a:extLst>
-              <a:ext uri="{C807C97D-BFC1-408E-A445-0C87EB9F89A2}">
-                <ask:lineSketchStyleProps xmlns:ask="http://schemas.microsoft.com/office/drawing/2018/sketchyshapes" sd="2847000804">
-                  <a:prstGeom prst="roundRect">
-                    <a:avLst/>
-                  </a:prstGeom>
-                  <ask:type>
-                    <ask:lineSketchScribble/>
-                  </ask:type>
-                </ask:lineSketchStyleProps>
-              </a:ext>
-            </a:extLst>
-          </a:ln>
-        </p:spPr>
-        <p:style>
-          <a:lnRef idx="2">
-            <a:schemeClr val="accent1">
-              <a:shade val="50000"/>
-            </a:schemeClr>
-          </a:lnRef>
-          <a:fillRef idx="1">
-            <a:schemeClr val="accent1"/>
-          </a:fillRef>
-          <a:effectRef idx="0">
-            <a:schemeClr val="accent1"/>
-          </a:effectRef>
-          <a:fontRef idx="minor">
-            <a:schemeClr val="lt1"/>
-          </a:fontRef>
-        </p:style>
-        <p:txBody>
-          <a:bodyPr rtlCol="0" anchor="ctr"/>
-          <a:lstStyle/>
-          <a:p>
-            <a:pPr marL="457200" indent="-457200">
-              <a:buFont typeface="+mj-lt"/>
-              <a:buAutoNum type="arabicPeriod"/>
-            </a:pPr>
-            <a:r>
-              <a:rPr lang="es-AR" sz="2400" dirty="0">
-                <a:solidFill>
-                  <a:schemeClr val="tx1"/>
-                </a:solidFill>
-                <a:latin typeface="Segoe Print" panose="02000600000000000000" pitchFamily="2" charset="0"/>
-              </a:rPr>
-              <a:t>Esparcidos: todos los lados con pocas viviendas.</a:t>
-            </a:r>
-          </a:p>
-          <a:p>
-            <a:pPr marL="457200" indent="-457200">
-              <a:buFont typeface="+mj-lt"/>
-              <a:buAutoNum type="arabicPeriod"/>
-            </a:pPr>
-            <a:r>
-              <a:rPr lang="es-AR" sz="2400" dirty="0">
-                <a:solidFill>
-                  <a:schemeClr val="tx1"/>
-                </a:solidFill>
-                <a:latin typeface="Segoe Print" panose="02000600000000000000" pitchFamily="2" charset="0"/>
-              </a:rPr>
-              <a:t>Densos: todas las manzanas con muchas viviendas.</a:t>
-            </a:r>
-          </a:p>
-          <a:p>
-            <a:pPr marL="457200" indent="-457200">
-              <a:buFont typeface="+mj-lt"/>
-              <a:buAutoNum type="arabicPeriod"/>
-            </a:pPr>
-            <a:r>
-              <a:rPr lang="es-AR" sz="2400" dirty="0">
-                <a:solidFill>
-                  <a:schemeClr val="tx1"/>
-                </a:solidFill>
-                <a:latin typeface="Segoe Print" panose="02000600000000000000" pitchFamily="2" charset="0"/>
-              </a:rPr>
-              <a:t>Combinados: situaciones intermedias</a:t>
-            </a:r>
-            <a:br>
-              <a:rPr lang="es-AR" sz="2400" dirty="0">
-                <a:solidFill>
-                  <a:schemeClr val="tx1"/>
-                </a:solidFill>
-                <a:latin typeface="Segoe Print" panose="02000600000000000000" pitchFamily="2" charset="0"/>
-              </a:rPr>
-            </a:br>
-            <a:r>
-              <a:rPr lang="es-AR" sz="2400" dirty="0">
-                <a:solidFill>
-                  <a:schemeClr val="tx1"/>
-                </a:solidFill>
-                <a:latin typeface="Segoe Print" panose="02000600000000000000" pitchFamily="2" charset="0"/>
-              </a:rPr>
-              <a:t>algunas manzanas con pocas viviendas</a:t>
-            </a:r>
-            <a:br>
-              <a:rPr lang="es-AR" sz="2400" dirty="0">
-                <a:solidFill>
-                  <a:schemeClr val="tx1"/>
-                </a:solidFill>
-                <a:latin typeface="Segoe Print" panose="02000600000000000000" pitchFamily="2" charset="0"/>
-              </a:rPr>
-            </a:br>
-            <a:r>
-              <a:rPr lang="es-AR" sz="2400" dirty="0">
-                <a:solidFill>
-                  <a:schemeClr val="tx1"/>
-                </a:solidFill>
-                <a:latin typeface="Segoe Print" panose="02000600000000000000" pitchFamily="2" charset="0"/>
-              </a:rPr>
-              <a:t>o algunos lados con muchas viviendas. </a:t>
-            </a:r>
-          </a:p>
-        </p:txBody>
-      </p:sp>
-    </p:spTree>
-    <p:extLst>
-      <p:ext uri="{BB962C8B-B14F-4D97-AF65-F5344CB8AC3E}">
-        <p14:creationId xmlns:p14="http://schemas.microsoft.com/office/powerpoint/2010/main" val="59448841"/>
-      </p:ext>
-    </p:extLst>
-  </p:cSld>
-  <p:clrMapOvr>
-    <a:masterClrMapping/>
-  </p:clrMapOvr>
-</p:sld>
-</file>
-
-<file path=ppt/slides/slide11.xml><?xml version="1.0" encoding="utf-8"?>
-<p:sld xmlns:a="http://schemas.openxmlformats.org/drawingml/2006/main" xmlns:r="http://schemas.openxmlformats.org/officeDocument/2006/relationships" xmlns:p="http://schemas.openxmlformats.org/presentationml/2006/main">
-  <p:cSld>
-    <p:spTree>
-      <p:nvGrpSpPr>
-        <p:cNvPr id="1" name=""/>
-        <p:cNvGrpSpPr/>
-        <p:nvPr/>
-      </p:nvGrpSpPr>
-      <p:grpSpPr>
-        <a:xfrm>
-          <a:off x="0" y="0"/>
-          <a:ext cx="0" cy="0"/>
-          <a:chOff x="0" y="0"/>
-          <a:chExt cx="0" cy="0"/>
-        </a:xfrm>
-      </p:grpSpPr>
-      <p:sp>
-        <p:nvSpPr>
-          <p:cNvPr id="2" name="Título 1">
-            <a:extLst>
-              <a:ext uri="{FF2B5EF4-FFF2-40B4-BE49-F238E27FC236}">
                 <a16:creationId xmlns:a16="http://schemas.microsoft.com/office/drawing/2014/main" id="{97468D9B-3A92-40E5-9233-0525BD947993}"/>
               </a:ext>
             </a:extLst>
@@ -6122,10 +5834,16 @@
           <a:p>
             <a:pPr algn="ctr"/>
             <a:r>
+              <a:rPr lang="es-AR" sz="5400" b="1" dirty="0">
+                <a:latin typeface="Segoe Print" panose="02000600000000000000" pitchFamily="2" charset="0"/>
+              </a:rPr>
+              <a:t>Algoritmos o Métodos</a:t>
+            </a:r>
+            <a:r>
               <a:rPr lang="es-AR" sz="5400" i="1" dirty="0">
                 <a:latin typeface="Segoe Print" panose="02000600000000000000" pitchFamily="2" charset="0"/>
               </a:rPr>
-              <a:t>Algoritmos o Métodos.</a:t>
+              <a:t>.</a:t>
             </a:r>
           </a:p>
         </p:txBody>
@@ -6192,7 +5910,7 @@
         </p:nvSpPr>
         <p:spPr>
           <a:xfrm>
-            <a:off x="3895119" y="3128125"/>
+            <a:off x="4372197" y="2676055"/>
             <a:ext cx="7287065" cy="3369847"/>
           </a:xfrm>
           <a:custGeom>
@@ -6393,7 +6111,7 @@
                 <a:solidFill>
                   <a:schemeClr val="tx1"/>
                 </a:solidFill>
-                <a:latin typeface="Segoe Script" panose="030B0504020000000003" pitchFamily="66" charset="0"/>
+                <a:latin typeface="Segoe Print" panose="02000600000000000000" pitchFamily="2" charset="0"/>
               </a:rPr>
               <a:t>Conteos:</a:t>
             </a:r>
@@ -6402,7 +6120,7 @@
                 <a:solidFill>
                   <a:schemeClr val="tx1"/>
                 </a:solidFill>
-                <a:latin typeface="Segoe Script" panose="030B0504020000000003" pitchFamily="66" charset="0"/>
+                <a:latin typeface="Segoe Print" panose="02000600000000000000" pitchFamily="2" charset="0"/>
               </a:rPr>
             </a:br>
             <a:r>
@@ -6410,7 +6128,7 @@
                 <a:solidFill>
                   <a:schemeClr val="tx1"/>
                 </a:solidFill>
-                <a:latin typeface="Segoe Script" panose="030B0504020000000003" pitchFamily="66" charset="0"/>
+                <a:latin typeface="Segoe Print" panose="02000600000000000000" pitchFamily="2" charset="0"/>
               </a:rPr>
               <a:t>lados o manzanas completas</a:t>
             </a:r>
@@ -6425,7 +6143,7 @@
                 <a:solidFill>
                   <a:schemeClr val="tx1"/>
                 </a:solidFill>
-                <a:latin typeface="Segoe Script" panose="030B0504020000000003" pitchFamily="66" charset="0"/>
+                <a:latin typeface="Segoe Print" panose="02000600000000000000" pitchFamily="2" charset="0"/>
               </a:rPr>
               <a:t>Listados: direcciones, pisos</a:t>
             </a:r>
@@ -6434,7 +6152,7 @@
                 <a:solidFill>
                   <a:schemeClr val="tx1"/>
                 </a:solidFill>
-                <a:latin typeface="Segoe Script" panose="030B0504020000000003" pitchFamily="66" charset="0"/>
+                <a:latin typeface="Segoe Print" panose="02000600000000000000" pitchFamily="2" charset="0"/>
               </a:rPr>
             </a:br>
             <a:r>
@@ -6442,7 +6160,7 @@
                 <a:solidFill>
                   <a:schemeClr val="tx1"/>
                 </a:solidFill>
-                <a:latin typeface="Segoe Script" panose="030B0504020000000003" pitchFamily="66" charset="0"/>
+                <a:latin typeface="Segoe Print" panose="02000600000000000000" pitchFamily="2" charset="0"/>
               </a:rPr>
               <a:t>(no puede haber más de 1 segmento por piso)</a:t>
             </a:r>
@@ -6451,7 +6169,7 @@
                 <a:solidFill>
                   <a:schemeClr val="tx1"/>
                 </a:solidFill>
-                <a:latin typeface="Segoe Script" panose="030B0504020000000003" pitchFamily="66" charset="0"/>
+                <a:latin typeface="Segoe Print" panose="02000600000000000000" pitchFamily="2" charset="0"/>
               </a:rPr>
             </a:br>
             <a:r>
@@ -6459,7 +6177,7 @@
                 <a:solidFill>
                   <a:schemeClr val="tx1"/>
                 </a:solidFill>
-                <a:latin typeface="Segoe Script" panose="030B0504020000000003" pitchFamily="66" charset="0"/>
+                <a:latin typeface="Segoe Print" panose="02000600000000000000" pitchFamily="2" charset="0"/>
               </a:rPr>
               <a:t>recorridos o manzanas independientes</a:t>
             </a:r>
@@ -6474,7 +6192,7 @@
                 <a:solidFill>
                   <a:schemeClr val="tx1"/>
                 </a:solidFill>
-                <a:latin typeface="Segoe Script" panose="030B0504020000000003" pitchFamily="66" charset="0"/>
+                <a:latin typeface="Segoe Print" panose="02000600000000000000" pitchFamily="2" charset="0"/>
               </a:rPr>
               <a:t>Varias combinaciones de ambos.</a:t>
             </a:r>
@@ -6494,7 +6212,1320 @@
 </p:sld>
 </file>
 
+<file path=ppt/slides/slide11.xml><?xml version="1.0" encoding="utf-8"?>
+<p:sld xmlns:a="http://schemas.openxmlformats.org/drawingml/2006/main" xmlns:r="http://schemas.openxmlformats.org/officeDocument/2006/relationships" xmlns:p="http://schemas.openxmlformats.org/presentationml/2006/main">
+  <p:cSld>
+    <p:spTree>
+      <p:nvGrpSpPr>
+        <p:cNvPr id="1" name=""/>
+        <p:cNvGrpSpPr/>
+        <p:nvPr/>
+      </p:nvGrpSpPr>
+      <p:grpSpPr>
+        <a:xfrm>
+          <a:off x="0" y="0"/>
+          <a:ext cx="0" cy="0"/>
+          <a:chOff x="0" y="0"/>
+          <a:chExt cx="0" cy="0"/>
+        </a:xfrm>
+      </p:grpSpPr>
+      <p:sp>
+        <p:nvSpPr>
+          <p:cNvPr id="2" name="Título 1">
+            <a:extLst>
+              <a:ext uri="{FF2B5EF4-FFF2-40B4-BE49-F238E27FC236}">
+                <a16:creationId xmlns:a16="http://schemas.microsoft.com/office/drawing/2014/main" id="{E9294C88-B9A5-42C4-AEB1-329F5A9B9A24}"/>
+              </a:ext>
+            </a:extLst>
+          </p:cNvPr>
+          <p:cNvSpPr>
+            <a:spLocks noGrp="1"/>
+          </p:cNvSpPr>
+          <p:nvPr>
+            <p:ph type="title"/>
+          </p:nvPr>
+        </p:nvSpPr>
+        <p:spPr/>
+        <p:txBody>
+          <a:bodyPr/>
+          <a:lstStyle/>
+          <a:p>
+            <a:r>
+              <a:rPr lang="es-AR" dirty="0">
+                <a:latin typeface="Segoe Print" panose="02000600000000000000" pitchFamily="2" charset="0"/>
+              </a:rPr>
+              <a:t>1. Conteos: </a:t>
+            </a:r>
+            <a:br>
+              <a:rPr lang="es-AR" dirty="0">
+                <a:latin typeface="Segoe Print" panose="02000600000000000000" pitchFamily="2" charset="0"/>
+              </a:rPr>
+            </a:br>
+            <a:r>
+              <a:rPr lang="es-AR" dirty="0">
+                <a:latin typeface="Segoe Print" panose="02000600000000000000" pitchFamily="2" charset="0"/>
+              </a:rPr>
+              <a:t>Segmentaciones posibles</a:t>
+            </a:r>
+          </a:p>
+        </p:txBody>
+      </p:sp>
+      <p:pic>
+        <p:nvPicPr>
+          <p:cNvPr id="4" name="Imagen 3">
+            <a:extLst>
+              <a:ext uri="{FF2B5EF4-FFF2-40B4-BE49-F238E27FC236}">
+                <a16:creationId xmlns:a16="http://schemas.microsoft.com/office/drawing/2014/main" id="{2C4807DD-39C3-4BEF-A052-72037BA9E9E4}"/>
+              </a:ext>
+            </a:extLst>
+          </p:cNvPr>
+          <p:cNvPicPr>
+            <a:picLocks noChangeAspect="1"/>
+          </p:cNvPicPr>
+          <p:nvPr/>
+        </p:nvPicPr>
+        <p:blipFill>
+          <a:blip r:embed="rId2">
+            <a:extLst>
+              <a:ext uri="{28A0092B-C50C-407E-A947-70E740481C1C}">
+                <a14:useLocalDpi xmlns:a14="http://schemas.microsoft.com/office/drawing/2010/main" val="0"/>
+              </a:ext>
+            </a:extLst>
+          </a:blip>
+          <a:stretch>
+            <a:fillRect/>
+          </a:stretch>
+        </p:blipFill>
+        <p:spPr>
+          <a:xfrm>
+            <a:off x="4381499" y="2047875"/>
+            <a:ext cx="5769665" cy="4647786"/>
+          </a:xfrm>
+          <a:prstGeom prst="rect">
+            <a:avLst/>
+          </a:prstGeom>
+        </p:spPr>
+      </p:pic>
+    </p:spTree>
+    <p:extLst>
+      <p:ext uri="{BB962C8B-B14F-4D97-AF65-F5344CB8AC3E}">
+        <p14:creationId xmlns:p14="http://schemas.microsoft.com/office/powerpoint/2010/main" val="1806228873"/>
+      </p:ext>
+    </p:extLst>
+  </p:cSld>
+  <p:clrMapOvr>
+    <a:masterClrMapping/>
+  </p:clrMapOvr>
+</p:sld>
+</file>
+
 <file path=ppt/slides/slide12.xml><?xml version="1.0" encoding="utf-8"?>
+<p:sld xmlns:a="http://schemas.openxmlformats.org/drawingml/2006/main" xmlns:r="http://schemas.openxmlformats.org/officeDocument/2006/relationships" xmlns:p="http://schemas.openxmlformats.org/presentationml/2006/main">
+  <p:cSld>
+    <p:spTree>
+      <p:nvGrpSpPr>
+        <p:cNvPr id="1" name=""/>
+        <p:cNvGrpSpPr/>
+        <p:nvPr/>
+      </p:nvGrpSpPr>
+      <p:grpSpPr>
+        <a:xfrm>
+          <a:off x="0" y="0"/>
+          <a:ext cx="0" cy="0"/>
+          <a:chOff x="0" y="0"/>
+          <a:chExt cx="0" cy="0"/>
+        </a:xfrm>
+      </p:grpSpPr>
+      <p:sp>
+        <p:nvSpPr>
+          <p:cNvPr id="2" name="Título 1">
+            <a:extLst>
+              <a:ext uri="{FF2B5EF4-FFF2-40B4-BE49-F238E27FC236}">
+                <a16:creationId xmlns:a16="http://schemas.microsoft.com/office/drawing/2014/main" id="{25C0853D-8F91-4C11-8656-DDF489661565}"/>
+              </a:ext>
+            </a:extLst>
+          </p:cNvPr>
+          <p:cNvSpPr>
+            <a:spLocks noGrp="1"/>
+          </p:cNvSpPr>
+          <p:nvPr>
+            <p:ph type="title"/>
+          </p:nvPr>
+        </p:nvSpPr>
+        <p:spPr/>
+        <p:txBody>
+          <a:bodyPr/>
+          <a:lstStyle/>
+          <a:p>
+            <a:endParaRPr lang="es-AR"/>
+          </a:p>
+        </p:txBody>
+      </p:sp>
+      <p:pic>
+        <p:nvPicPr>
+          <p:cNvPr id="4" name="Imagen 3">
+            <a:extLst>
+              <a:ext uri="{FF2B5EF4-FFF2-40B4-BE49-F238E27FC236}">
+                <a16:creationId xmlns:a16="http://schemas.microsoft.com/office/drawing/2014/main" id="{2955AD87-C223-462E-B236-5508A302022C}"/>
+              </a:ext>
+            </a:extLst>
+          </p:cNvPr>
+          <p:cNvPicPr>
+            <a:picLocks noChangeAspect="1"/>
+          </p:cNvPicPr>
+          <p:nvPr/>
+        </p:nvPicPr>
+        <p:blipFill>
+          <a:blip r:embed="rId2">
+            <a:extLst>
+              <a:ext uri="{28A0092B-C50C-407E-A947-70E740481C1C}">
+                <a14:useLocalDpi xmlns:a14="http://schemas.microsoft.com/office/drawing/2010/main" val="0"/>
+              </a:ext>
+            </a:extLst>
+          </a:blip>
+          <a:stretch>
+            <a:fillRect/>
+          </a:stretch>
+        </p:blipFill>
+        <p:spPr>
+          <a:xfrm>
+            <a:off x="2855428" y="1687375"/>
+            <a:ext cx="6712641" cy="5112675"/>
+          </a:xfrm>
+          <a:prstGeom prst="rect">
+            <a:avLst/>
+          </a:prstGeom>
+        </p:spPr>
+      </p:pic>
+    </p:spTree>
+    <p:extLst>
+      <p:ext uri="{BB962C8B-B14F-4D97-AF65-F5344CB8AC3E}">
+        <p14:creationId xmlns:p14="http://schemas.microsoft.com/office/powerpoint/2010/main" val="3858762720"/>
+      </p:ext>
+    </p:extLst>
+  </p:cSld>
+  <p:clrMapOvr>
+    <a:masterClrMapping/>
+  </p:clrMapOvr>
+</p:sld>
+</file>
+
+<file path=ppt/slides/slide13.xml><?xml version="1.0" encoding="utf-8"?>
+<p:sld xmlns:a="http://schemas.openxmlformats.org/drawingml/2006/main" xmlns:r="http://schemas.openxmlformats.org/officeDocument/2006/relationships" xmlns:p="http://schemas.openxmlformats.org/presentationml/2006/main">
+  <p:cSld>
+    <p:spTree>
+      <p:nvGrpSpPr>
+        <p:cNvPr id="1" name=""/>
+        <p:cNvGrpSpPr/>
+        <p:nvPr/>
+      </p:nvGrpSpPr>
+      <p:grpSpPr>
+        <a:xfrm>
+          <a:off x="0" y="0"/>
+          <a:ext cx="0" cy="0"/>
+          <a:chOff x="0" y="0"/>
+          <a:chExt cx="0" cy="0"/>
+        </a:xfrm>
+      </p:grpSpPr>
+      <p:sp>
+        <p:nvSpPr>
+          <p:cNvPr id="2" name="Título 1">
+            <a:extLst>
+              <a:ext uri="{FF2B5EF4-FFF2-40B4-BE49-F238E27FC236}">
+                <a16:creationId xmlns:a16="http://schemas.microsoft.com/office/drawing/2014/main" id="{ECEE162C-7D81-4FDD-B718-14327B57EE7D}"/>
+              </a:ext>
+            </a:extLst>
+          </p:cNvPr>
+          <p:cNvSpPr>
+            <a:spLocks noGrp="1"/>
+          </p:cNvSpPr>
+          <p:nvPr>
+            <p:ph type="title"/>
+          </p:nvPr>
+        </p:nvSpPr>
+        <p:spPr/>
+        <p:txBody>
+          <a:bodyPr/>
+          <a:lstStyle/>
+          <a:p>
+            <a:endParaRPr lang="es-AR"/>
+          </a:p>
+        </p:txBody>
+      </p:sp>
+      <p:pic>
+        <p:nvPicPr>
+          <p:cNvPr id="5" name="Imagen 4">
+            <a:extLst>
+              <a:ext uri="{FF2B5EF4-FFF2-40B4-BE49-F238E27FC236}">
+                <a16:creationId xmlns:a16="http://schemas.microsoft.com/office/drawing/2014/main" id="{A19DAF25-0E7F-4E68-B4C5-85BF6DBCDFED}"/>
+              </a:ext>
+            </a:extLst>
+          </p:cNvPr>
+          <p:cNvPicPr>
+            <a:picLocks noChangeAspect="1"/>
+          </p:cNvPicPr>
+          <p:nvPr/>
+        </p:nvPicPr>
+        <p:blipFill>
+          <a:blip r:embed="rId2">
+            <a:extLst>
+              <a:ext uri="{28A0092B-C50C-407E-A947-70E740481C1C}">
+                <a14:useLocalDpi xmlns:a14="http://schemas.microsoft.com/office/drawing/2010/main" val="0"/>
+              </a:ext>
+            </a:extLst>
+          </a:blip>
+          <a:stretch>
+            <a:fillRect/>
+          </a:stretch>
+        </p:blipFill>
+        <p:spPr>
+          <a:xfrm>
+            <a:off x="2975589" y="2056101"/>
+            <a:ext cx="7619048" cy="5714286"/>
+          </a:xfrm>
+          <a:prstGeom prst="rect">
+            <a:avLst/>
+          </a:prstGeom>
+        </p:spPr>
+      </p:pic>
+    </p:spTree>
+    <p:extLst>
+      <p:ext uri="{BB962C8B-B14F-4D97-AF65-F5344CB8AC3E}">
+        <p14:creationId xmlns:p14="http://schemas.microsoft.com/office/powerpoint/2010/main" val="669697881"/>
+      </p:ext>
+    </p:extLst>
+  </p:cSld>
+  <p:clrMapOvr>
+    <a:masterClrMapping/>
+  </p:clrMapOvr>
+</p:sld>
+</file>
+
+<file path=ppt/slides/slide14.xml><?xml version="1.0" encoding="utf-8"?>
+<p:sld xmlns:a="http://schemas.openxmlformats.org/drawingml/2006/main" xmlns:r="http://schemas.openxmlformats.org/officeDocument/2006/relationships" xmlns:p="http://schemas.openxmlformats.org/presentationml/2006/main">
+  <p:cSld>
+    <p:spTree>
+      <p:nvGrpSpPr>
+        <p:cNvPr id="1" name=""/>
+        <p:cNvGrpSpPr/>
+        <p:nvPr/>
+      </p:nvGrpSpPr>
+      <p:grpSpPr>
+        <a:xfrm>
+          <a:off x="0" y="0"/>
+          <a:ext cx="0" cy="0"/>
+          <a:chOff x="0" y="0"/>
+          <a:chExt cx="0" cy="0"/>
+        </a:xfrm>
+      </p:grpSpPr>
+      <p:sp>
+        <p:nvSpPr>
+          <p:cNvPr id="2" name="Título 1">
+            <a:extLst>
+              <a:ext uri="{FF2B5EF4-FFF2-40B4-BE49-F238E27FC236}">
+                <a16:creationId xmlns:a16="http://schemas.microsoft.com/office/drawing/2014/main" id="{C44660EB-A13E-4292-89E5-0152B7008566}"/>
+              </a:ext>
+            </a:extLst>
+          </p:cNvPr>
+          <p:cNvSpPr>
+            <a:spLocks noGrp="1"/>
+          </p:cNvSpPr>
+          <p:nvPr>
+            <p:ph type="title"/>
+          </p:nvPr>
+        </p:nvSpPr>
+        <p:spPr/>
+        <p:txBody>
+          <a:bodyPr/>
+          <a:lstStyle/>
+          <a:p>
+            <a:r>
+              <a:rPr lang="es-AR" dirty="0"/>
+              <a:t>2. Listados</a:t>
+            </a:r>
+          </a:p>
+        </p:txBody>
+      </p:sp>
+      <p:pic>
+        <p:nvPicPr>
+          <p:cNvPr id="4" name="Imagen 3">
+            <a:extLst>
+              <a:ext uri="{FF2B5EF4-FFF2-40B4-BE49-F238E27FC236}">
+                <a16:creationId xmlns:a16="http://schemas.microsoft.com/office/drawing/2014/main" id="{E318C07B-BE3A-4078-B113-61DC8CB3A429}"/>
+              </a:ext>
+            </a:extLst>
+          </p:cNvPr>
+          <p:cNvPicPr>
+            <a:picLocks noChangeAspect="1"/>
+          </p:cNvPicPr>
+          <p:nvPr/>
+        </p:nvPicPr>
+        <p:blipFill>
+          <a:blip r:embed="rId2">
+            <a:extLst>
+              <a:ext uri="{28A0092B-C50C-407E-A947-70E740481C1C}">
+                <a14:useLocalDpi xmlns:a14="http://schemas.microsoft.com/office/drawing/2010/main" val="0"/>
+              </a:ext>
+            </a:extLst>
+          </a:blip>
+          <a:stretch>
+            <a:fillRect/>
+          </a:stretch>
+        </p:blipFill>
+        <p:spPr>
+          <a:xfrm>
+            <a:off x="2737050" y="1393492"/>
+            <a:ext cx="7619048" cy="5714286"/>
+          </a:xfrm>
+          <a:prstGeom prst="rect">
+            <a:avLst/>
+          </a:prstGeom>
+        </p:spPr>
+      </p:pic>
+    </p:spTree>
+    <p:extLst>
+      <p:ext uri="{BB962C8B-B14F-4D97-AF65-F5344CB8AC3E}">
+        <p14:creationId xmlns:p14="http://schemas.microsoft.com/office/powerpoint/2010/main" val="1023199581"/>
+      </p:ext>
+    </p:extLst>
+  </p:cSld>
+  <p:clrMapOvr>
+    <a:masterClrMapping/>
+  </p:clrMapOvr>
+</p:sld>
+</file>
+
+<file path=ppt/slides/slide15.xml><?xml version="1.0" encoding="utf-8"?>
+<p:sld xmlns:a="http://schemas.openxmlformats.org/drawingml/2006/main" xmlns:r="http://schemas.openxmlformats.org/officeDocument/2006/relationships" xmlns:p="http://schemas.openxmlformats.org/presentationml/2006/main">
+  <p:cSld>
+    <p:spTree>
+      <p:nvGrpSpPr>
+        <p:cNvPr id="1" name=""/>
+        <p:cNvGrpSpPr/>
+        <p:nvPr/>
+      </p:nvGrpSpPr>
+      <p:grpSpPr>
+        <a:xfrm>
+          <a:off x="0" y="0"/>
+          <a:ext cx="0" cy="0"/>
+          <a:chOff x="0" y="0"/>
+          <a:chExt cx="0" cy="0"/>
+        </a:xfrm>
+      </p:grpSpPr>
+      <p:sp>
+        <p:nvSpPr>
+          <p:cNvPr id="2" name="Título 1">
+            <a:extLst>
+              <a:ext uri="{FF2B5EF4-FFF2-40B4-BE49-F238E27FC236}">
+                <a16:creationId xmlns:a16="http://schemas.microsoft.com/office/drawing/2014/main" id="{E9294C88-B9A5-42C4-AEB1-329F5A9B9A24}"/>
+              </a:ext>
+            </a:extLst>
+          </p:cNvPr>
+          <p:cNvSpPr>
+            <a:spLocks noGrp="1"/>
+          </p:cNvSpPr>
+          <p:nvPr>
+            <p:ph type="title"/>
+          </p:nvPr>
+        </p:nvSpPr>
+        <p:spPr/>
+        <p:txBody>
+          <a:bodyPr/>
+          <a:lstStyle/>
+          <a:p>
+            <a:r>
+              <a:rPr lang="es-AR" dirty="0">
+                <a:latin typeface="Segoe Print" panose="02000600000000000000" pitchFamily="2" charset="0"/>
+              </a:rPr>
+              <a:t>1. Conteos: manzanas completas</a:t>
+            </a:r>
+          </a:p>
+        </p:txBody>
+      </p:sp>
+      <p:pic>
+        <p:nvPicPr>
+          <p:cNvPr id="6" name="Imagen 5">
+            <a:extLst>
+              <a:ext uri="{FF2B5EF4-FFF2-40B4-BE49-F238E27FC236}">
+                <a16:creationId xmlns:a16="http://schemas.microsoft.com/office/drawing/2014/main" id="{0CE668BE-1F04-4816-9E99-57EB2C7B607D}"/>
+              </a:ext>
+            </a:extLst>
+          </p:cNvPr>
+          <p:cNvPicPr>
+            <a:picLocks noChangeAspect="1"/>
+          </p:cNvPicPr>
+          <p:nvPr/>
+        </p:nvPicPr>
+        <p:blipFill>
+          <a:blip r:embed="rId2">
+            <a:extLst>
+              <a:ext uri="{28A0092B-C50C-407E-A947-70E740481C1C}">
+                <a14:useLocalDpi xmlns:a14="http://schemas.microsoft.com/office/drawing/2010/main" val="0"/>
+              </a:ext>
+            </a:extLst>
+          </a:blip>
+          <a:stretch>
+            <a:fillRect/>
+          </a:stretch>
+        </p:blipFill>
+        <p:spPr>
+          <a:xfrm>
+            <a:off x="180177" y="1690688"/>
+            <a:ext cx="7663661" cy="3691330"/>
+          </a:xfrm>
+          <a:prstGeom prst="rect">
+            <a:avLst/>
+          </a:prstGeom>
+        </p:spPr>
+      </p:pic>
+      <p:sp>
+        <p:nvSpPr>
+          <p:cNvPr id="7" name="CuadroTexto 6">
+            <a:extLst>
+              <a:ext uri="{FF2B5EF4-FFF2-40B4-BE49-F238E27FC236}">
+                <a16:creationId xmlns:a16="http://schemas.microsoft.com/office/drawing/2014/main" id="{A2B55C06-CAFB-4C94-B2C9-BA48B2730677}"/>
+              </a:ext>
+            </a:extLst>
+          </p:cNvPr>
+          <p:cNvSpPr txBox="1"/>
+          <p:nvPr/>
+        </p:nvSpPr>
+        <p:spPr>
+          <a:xfrm>
+            <a:off x="585788" y="5462976"/>
+            <a:ext cx="3347391" cy="1077218"/>
+          </a:xfrm>
+          <a:prstGeom prst="rect">
+            <a:avLst/>
+          </a:prstGeom>
+          <a:noFill/>
+        </p:spPr>
+        <p:txBody>
+          <a:bodyPr wrap="none" rtlCol="0">
+            <a:spAutoFit/>
+          </a:bodyPr>
+          <a:lstStyle/>
+          <a:p>
+            <a:r>
+              <a:rPr lang="es-AR" sz="3200" dirty="0">
+                <a:latin typeface="Segoe Print" panose="02000600000000000000" pitchFamily="2" charset="0"/>
+              </a:rPr>
+              <a:t>Carga deseada </a:t>
+            </a:r>
+            <a:br>
+              <a:rPr lang="es-AR" sz="3200" dirty="0">
+                <a:latin typeface="Segoe Print" panose="02000600000000000000" pitchFamily="2" charset="0"/>
+              </a:rPr>
+            </a:br>
+            <a:r>
+              <a:rPr lang="es-AR" sz="3200" dirty="0">
+                <a:latin typeface="Segoe Print" panose="02000600000000000000" pitchFamily="2" charset="0"/>
+              </a:rPr>
+              <a:t>20 viviendas</a:t>
+            </a:r>
+          </a:p>
+        </p:txBody>
+      </p:sp>
+      <p:pic>
+        <p:nvPicPr>
+          <p:cNvPr id="9" name="Imagen 8">
+            <a:extLst>
+              <a:ext uri="{FF2B5EF4-FFF2-40B4-BE49-F238E27FC236}">
+                <a16:creationId xmlns:a16="http://schemas.microsoft.com/office/drawing/2014/main" id="{C5D208AF-8571-43D5-B6F7-C52EEA124317}"/>
+              </a:ext>
+            </a:extLst>
+          </p:cNvPr>
+          <p:cNvPicPr>
+            <a:picLocks noChangeAspect="1"/>
+          </p:cNvPicPr>
+          <p:nvPr/>
+        </p:nvPicPr>
+        <p:blipFill>
+          <a:blip r:embed="rId3">
+            <a:extLst>
+              <a:ext uri="{28A0092B-C50C-407E-A947-70E740481C1C}">
+                <a14:useLocalDpi xmlns:a14="http://schemas.microsoft.com/office/drawing/2010/main" val="0"/>
+              </a:ext>
+            </a:extLst>
+          </a:blip>
+          <a:stretch>
+            <a:fillRect/>
+          </a:stretch>
+        </p:blipFill>
+        <p:spPr>
+          <a:xfrm>
+            <a:off x="5044078" y="1609730"/>
+            <a:ext cx="7999819" cy="3853246"/>
+          </a:xfrm>
+          <a:prstGeom prst="rect">
+            <a:avLst/>
+          </a:prstGeom>
+        </p:spPr>
+      </p:pic>
+    </p:spTree>
+    <p:extLst>
+      <p:ext uri="{BB962C8B-B14F-4D97-AF65-F5344CB8AC3E}">
+        <p14:creationId xmlns:p14="http://schemas.microsoft.com/office/powerpoint/2010/main" val="1630160372"/>
+      </p:ext>
+    </p:extLst>
+  </p:cSld>
+  <p:clrMapOvr>
+    <a:masterClrMapping/>
+  </p:clrMapOvr>
+</p:sld>
+</file>
+
+<file path=ppt/slides/slide16.xml><?xml version="1.0" encoding="utf-8"?>
+<p:sld xmlns:a="http://schemas.openxmlformats.org/drawingml/2006/main" xmlns:r="http://schemas.openxmlformats.org/officeDocument/2006/relationships" xmlns:p="http://schemas.openxmlformats.org/presentationml/2006/main">
+  <p:cSld>
+    <p:spTree>
+      <p:nvGrpSpPr>
+        <p:cNvPr id="1" name=""/>
+        <p:cNvGrpSpPr/>
+        <p:nvPr/>
+      </p:nvGrpSpPr>
+      <p:grpSpPr>
+        <a:xfrm>
+          <a:off x="0" y="0"/>
+          <a:ext cx="0" cy="0"/>
+          <a:chOff x="0" y="0"/>
+          <a:chExt cx="0" cy="0"/>
+        </a:xfrm>
+      </p:grpSpPr>
+      <p:sp>
+        <p:nvSpPr>
+          <p:cNvPr id="2" name="Título 1">
+            <a:extLst>
+              <a:ext uri="{FF2B5EF4-FFF2-40B4-BE49-F238E27FC236}">
+                <a16:creationId xmlns:a16="http://schemas.microsoft.com/office/drawing/2014/main" id="{26EDAC25-72E2-4615-ABC7-FC356637FA1E}"/>
+              </a:ext>
+            </a:extLst>
+          </p:cNvPr>
+          <p:cNvSpPr>
+            <a:spLocks noGrp="1"/>
+          </p:cNvSpPr>
+          <p:nvPr>
+            <p:ph type="title"/>
+          </p:nvPr>
+        </p:nvSpPr>
+        <p:spPr/>
+        <p:txBody>
+          <a:bodyPr/>
+          <a:lstStyle/>
+          <a:p>
+            <a:r>
+              <a:rPr lang="es-AR" dirty="0"/>
+              <a:t>extraer</a:t>
+            </a:r>
+          </a:p>
+        </p:txBody>
+      </p:sp>
+      <p:pic>
+        <p:nvPicPr>
+          <p:cNvPr id="16" name="Imagen 15">
+            <a:extLst>
+              <a:ext uri="{FF2B5EF4-FFF2-40B4-BE49-F238E27FC236}">
+                <a16:creationId xmlns:a16="http://schemas.microsoft.com/office/drawing/2014/main" id="{B93513D4-E64B-4BA5-AC5D-D488339A3AB8}"/>
+              </a:ext>
+            </a:extLst>
+          </p:cNvPr>
+          <p:cNvPicPr>
+            <a:picLocks noChangeAspect="1"/>
+          </p:cNvPicPr>
+          <p:nvPr/>
+        </p:nvPicPr>
+        <p:blipFill>
+          <a:blip r:embed="rId2">
+            <a:extLst>
+              <a:ext uri="{28A0092B-C50C-407E-A947-70E740481C1C}">
+                <a14:useLocalDpi xmlns:a14="http://schemas.microsoft.com/office/drawing/2010/main" val="0"/>
+              </a:ext>
+            </a:extLst>
+          </a:blip>
+          <a:stretch>
+            <a:fillRect/>
+          </a:stretch>
+        </p:blipFill>
+        <p:spPr>
+          <a:xfrm>
+            <a:off x="534284" y="2234735"/>
+            <a:ext cx="2916184" cy="2787871"/>
+          </a:xfrm>
+          <a:prstGeom prst="rect">
+            <a:avLst/>
+          </a:prstGeom>
+        </p:spPr>
+      </p:pic>
+      <p:pic>
+        <p:nvPicPr>
+          <p:cNvPr id="18" name="Imagen 17">
+            <a:extLst>
+              <a:ext uri="{FF2B5EF4-FFF2-40B4-BE49-F238E27FC236}">
+                <a16:creationId xmlns:a16="http://schemas.microsoft.com/office/drawing/2014/main" id="{DD9F636F-7233-49FD-8225-F02D61C6676D}"/>
+              </a:ext>
+            </a:extLst>
+          </p:cNvPr>
+          <p:cNvPicPr>
+            <a:picLocks noChangeAspect="1"/>
+          </p:cNvPicPr>
+          <p:nvPr/>
+        </p:nvPicPr>
+        <p:blipFill>
+          <a:blip r:embed="rId3">
+            <a:extLst>
+              <a:ext uri="{28A0092B-C50C-407E-A947-70E740481C1C}">
+                <a14:useLocalDpi xmlns:a14="http://schemas.microsoft.com/office/drawing/2010/main" val="0"/>
+              </a:ext>
+            </a:extLst>
+          </a:blip>
+          <a:stretch>
+            <a:fillRect/>
+          </a:stretch>
+        </p:blipFill>
+        <p:spPr>
+          <a:xfrm>
+            <a:off x="4470641" y="81158"/>
+            <a:ext cx="2155336" cy="2060501"/>
+          </a:xfrm>
+          <a:prstGeom prst="rect">
+            <a:avLst/>
+          </a:prstGeom>
+        </p:spPr>
+      </p:pic>
+      <p:pic>
+        <p:nvPicPr>
+          <p:cNvPr id="20" name="Imagen 19">
+            <a:extLst>
+              <a:ext uri="{FF2B5EF4-FFF2-40B4-BE49-F238E27FC236}">
+                <a16:creationId xmlns:a16="http://schemas.microsoft.com/office/drawing/2014/main" id="{FC948AB6-CD17-4FA8-B543-51D2C92375F0}"/>
+              </a:ext>
+            </a:extLst>
+          </p:cNvPr>
+          <p:cNvPicPr>
+            <a:picLocks noChangeAspect="1"/>
+          </p:cNvPicPr>
+          <p:nvPr/>
+        </p:nvPicPr>
+        <p:blipFill>
+          <a:blip r:embed="rId4">
+            <a:extLst>
+              <a:ext uri="{28A0092B-C50C-407E-A947-70E740481C1C}">
+                <a14:useLocalDpi xmlns:a14="http://schemas.microsoft.com/office/drawing/2010/main" val="0"/>
+              </a:ext>
+            </a:extLst>
+          </a:blip>
+          <a:stretch>
+            <a:fillRect/>
+          </a:stretch>
+        </p:blipFill>
+        <p:spPr>
+          <a:xfrm>
+            <a:off x="8163558" y="147433"/>
+            <a:ext cx="2155336" cy="2060501"/>
+          </a:xfrm>
+          <a:prstGeom prst="rect">
+            <a:avLst/>
+          </a:prstGeom>
+        </p:spPr>
+      </p:pic>
+      <p:pic>
+        <p:nvPicPr>
+          <p:cNvPr id="22" name="Imagen 21">
+            <a:extLst>
+              <a:ext uri="{FF2B5EF4-FFF2-40B4-BE49-F238E27FC236}">
+                <a16:creationId xmlns:a16="http://schemas.microsoft.com/office/drawing/2014/main" id="{45962548-7547-4F6C-8738-0A251020D0C0}"/>
+              </a:ext>
+            </a:extLst>
+          </p:cNvPr>
+          <p:cNvPicPr>
+            <a:picLocks noChangeAspect="1"/>
+          </p:cNvPicPr>
+          <p:nvPr/>
+        </p:nvPicPr>
+        <p:blipFill>
+          <a:blip r:embed="rId5">
+            <a:extLst>
+              <a:ext uri="{28A0092B-C50C-407E-A947-70E740481C1C}">
+                <a14:useLocalDpi xmlns:a14="http://schemas.microsoft.com/office/drawing/2010/main" val="0"/>
+              </a:ext>
+            </a:extLst>
+          </a:blip>
+          <a:stretch>
+            <a:fillRect/>
+          </a:stretch>
+        </p:blipFill>
+        <p:spPr>
+          <a:xfrm>
+            <a:off x="4470641" y="2539490"/>
+            <a:ext cx="2195423" cy="2098824"/>
+          </a:xfrm>
+          <a:prstGeom prst="rect">
+            <a:avLst/>
+          </a:prstGeom>
+        </p:spPr>
+      </p:pic>
+      <p:pic>
+        <p:nvPicPr>
+          <p:cNvPr id="24" name="Imagen 23">
+            <a:extLst>
+              <a:ext uri="{FF2B5EF4-FFF2-40B4-BE49-F238E27FC236}">
+                <a16:creationId xmlns:a16="http://schemas.microsoft.com/office/drawing/2014/main" id="{3171A390-01F6-40B6-81E7-A040C930DB5B}"/>
+              </a:ext>
+            </a:extLst>
+          </p:cNvPr>
+          <p:cNvPicPr>
+            <a:picLocks noChangeAspect="1"/>
+          </p:cNvPicPr>
+          <p:nvPr/>
+        </p:nvPicPr>
+        <p:blipFill>
+          <a:blip r:embed="rId6">
+            <a:extLst>
+              <a:ext uri="{28A0092B-C50C-407E-A947-70E740481C1C}">
+                <a14:useLocalDpi xmlns:a14="http://schemas.microsoft.com/office/drawing/2010/main" val="0"/>
+              </a:ext>
+            </a:extLst>
+          </a:blip>
+          <a:stretch>
+            <a:fillRect/>
+          </a:stretch>
+        </p:blipFill>
+        <p:spPr>
+          <a:xfrm>
+            <a:off x="8176920" y="2579259"/>
+            <a:ext cx="2195423" cy="2098824"/>
+          </a:xfrm>
+          <a:prstGeom prst="rect">
+            <a:avLst/>
+          </a:prstGeom>
+        </p:spPr>
+      </p:pic>
+      <p:pic>
+        <p:nvPicPr>
+          <p:cNvPr id="26" name="Imagen 25">
+            <a:extLst>
+              <a:ext uri="{FF2B5EF4-FFF2-40B4-BE49-F238E27FC236}">
+                <a16:creationId xmlns:a16="http://schemas.microsoft.com/office/drawing/2014/main" id="{C918BAE0-B54F-4CE8-9433-9B655BC8C700}"/>
+              </a:ext>
+            </a:extLst>
+          </p:cNvPr>
+          <p:cNvPicPr>
+            <a:picLocks noChangeAspect="1"/>
+          </p:cNvPicPr>
+          <p:nvPr/>
+        </p:nvPicPr>
+        <p:blipFill>
+          <a:blip r:embed="rId7">
+            <a:extLst>
+              <a:ext uri="{28A0092B-C50C-407E-A947-70E740481C1C}">
+                <a14:useLocalDpi xmlns:a14="http://schemas.microsoft.com/office/drawing/2010/main" val="0"/>
+              </a:ext>
+            </a:extLst>
+          </a:blip>
+          <a:stretch>
+            <a:fillRect/>
+          </a:stretch>
+        </p:blipFill>
+        <p:spPr>
+          <a:xfrm>
+            <a:off x="4484003" y="4719405"/>
+            <a:ext cx="2195424" cy="2098825"/>
+          </a:xfrm>
+          <a:prstGeom prst="rect">
+            <a:avLst/>
+          </a:prstGeom>
+        </p:spPr>
+      </p:pic>
+      <p:pic>
+        <p:nvPicPr>
+          <p:cNvPr id="28" name="Imagen 27">
+            <a:extLst>
+              <a:ext uri="{FF2B5EF4-FFF2-40B4-BE49-F238E27FC236}">
+                <a16:creationId xmlns:a16="http://schemas.microsoft.com/office/drawing/2014/main" id="{DA75D45A-A1E0-4F2C-B947-D2760A959888}"/>
+              </a:ext>
+            </a:extLst>
+          </p:cNvPr>
+          <p:cNvPicPr>
+            <a:picLocks noChangeAspect="1"/>
+          </p:cNvPicPr>
+          <p:nvPr/>
+        </p:nvPicPr>
+        <p:blipFill>
+          <a:blip r:embed="rId8">
+            <a:extLst>
+              <a:ext uri="{28A0092B-C50C-407E-A947-70E740481C1C}">
+                <a14:useLocalDpi xmlns:a14="http://schemas.microsoft.com/office/drawing/2010/main" val="0"/>
+              </a:ext>
+            </a:extLst>
+          </a:blip>
+          <a:stretch>
+            <a:fillRect/>
+          </a:stretch>
+        </p:blipFill>
+        <p:spPr>
+          <a:xfrm>
+            <a:off x="8217007" y="4757729"/>
+            <a:ext cx="2155336" cy="2060501"/>
+          </a:xfrm>
+          <a:prstGeom prst="rect">
+            <a:avLst/>
+          </a:prstGeom>
+        </p:spPr>
+      </p:pic>
+    </p:spTree>
+    <p:extLst>
+      <p:ext uri="{BB962C8B-B14F-4D97-AF65-F5344CB8AC3E}">
+        <p14:creationId xmlns:p14="http://schemas.microsoft.com/office/powerpoint/2010/main" val="3754461258"/>
+      </p:ext>
+    </p:extLst>
+  </p:cSld>
+  <p:clrMapOvr>
+    <a:masterClrMapping/>
+  </p:clrMapOvr>
+</p:sld>
+</file>
+
+<file path=ppt/slides/slide17.xml><?xml version="1.0" encoding="utf-8"?>
+<p:sld xmlns:a="http://schemas.openxmlformats.org/drawingml/2006/main" xmlns:r="http://schemas.openxmlformats.org/officeDocument/2006/relationships" xmlns:p="http://schemas.openxmlformats.org/presentationml/2006/main">
+  <p:cSld>
+    <p:spTree>
+      <p:nvGrpSpPr>
+        <p:cNvPr id="1" name=""/>
+        <p:cNvGrpSpPr/>
+        <p:nvPr/>
+      </p:nvGrpSpPr>
+      <p:grpSpPr>
+        <a:xfrm>
+          <a:off x="0" y="0"/>
+          <a:ext cx="0" cy="0"/>
+          <a:chOff x="0" y="0"/>
+          <a:chExt cx="0" cy="0"/>
+        </a:xfrm>
+      </p:grpSpPr>
+      <p:sp>
+        <p:nvSpPr>
+          <p:cNvPr id="2" name="Título 1">
+            <a:extLst>
+              <a:ext uri="{FF2B5EF4-FFF2-40B4-BE49-F238E27FC236}">
+                <a16:creationId xmlns:a16="http://schemas.microsoft.com/office/drawing/2014/main" id="{A21D58BB-8D5E-4C5D-A76A-4A7BB96700D8}"/>
+              </a:ext>
+            </a:extLst>
+          </p:cNvPr>
+          <p:cNvSpPr>
+            <a:spLocks noGrp="1"/>
+          </p:cNvSpPr>
+          <p:nvPr>
+            <p:ph type="title"/>
+          </p:nvPr>
+        </p:nvSpPr>
+        <p:spPr/>
+        <p:txBody>
+          <a:bodyPr/>
+          <a:lstStyle/>
+          <a:p>
+            <a:r>
+              <a:rPr lang="es-AR" dirty="0"/>
+              <a:t>Transferir</a:t>
+            </a:r>
+          </a:p>
+        </p:txBody>
+      </p:sp>
+      <p:pic>
+        <p:nvPicPr>
+          <p:cNvPr id="4" name="Imagen 3">
+            <a:extLst>
+              <a:ext uri="{FF2B5EF4-FFF2-40B4-BE49-F238E27FC236}">
+                <a16:creationId xmlns:a16="http://schemas.microsoft.com/office/drawing/2014/main" id="{916F44B5-ECA4-496F-82FD-77323EDC7C33}"/>
+              </a:ext>
+            </a:extLst>
+          </p:cNvPr>
+          <p:cNvPicPr>
+            <a:picLocks noChangeAspect="1"/>
+          </p:cNvPicPr>
+          <p:nvPr/>
+        </p:nvPicPr>
+        <p:blipFill>
+          <a:blip r:embed="rId2">
+            <a:extLst>
+              <a:ext uri="{28A0092B-C50C-407E-A947-70E740481C1C}">
+                <a14:useLocalDpi xmlns:a14="http://schemas.microsoft.com/office/drawing/2010/main" val="0"/>
+              </a:ext>
+            </a:extLst>
+          </a:blip>
+          <a:stretch>
+            <a:fillRect/>
+          </a:stretch>
+        </p:blipFill>
+        <p:spPr>
+          <a:xfrm>
+            <a:off x="838200" y="1994387"/>
+            <a:ext cx="3001281" cy="2869225"/>
+          </a:xfrm>
+          <a:prstGeom prst="rect">
+            <a:avLst/>
+          </a:prstGeom>
+        </p:spPr>
+      </p:pic>
+      <p:pic>
+        <p:nvPicPr>
+          <p:cNvPr id="6" name="Imagen 5">
+            <a:extLst>
+              <a:ext uri="{FF2B5EF4-FFF2-40B4-BE49-F238E27FC236}">
+                <a16:creationId xmlns:a16="http://schemas.microsoft.com/office/drawing/2014/main" id="{5EBCA068-4F62-4E40-A7D2-8C00B0B22AA6}"/>
+              </a:ext>
+            </a:extLst>
+          </p:cNvPr>
+          <p:cNvPicPr>
+            <a:picLocks noChangeAspect="1"/>
+          </p:cNvPicPr>
+          <p:nvPr/>
+        </p:nvPicPr>
+        <p:blipFill>
+          <a:blip r:embed="rId3">
+            <a:extLst>
+              <a:ext uri="{28A0092B-C50C-407E-A947-70E740481C1C}">
+                <a14:useLocalDpi xmlns:a14="http://schemas.microsoft.com/office/drawing/2010/main" val="0"/>
+              </a:ext>
+            </a:extLst>
+          </a:blip>
+          <a:stretch>
+            <a:fillRect/>
+          </a:stretch>
+        </p:blipFill>
+        <p:spPr>
+          <a:xfrm>
+            <a:off x="5197375" y="408751"/>
+            <a:ext cx="3001282" cy="2869226"/>
+          </a:xfrm>
+          <a:prstGeom prst="rect">
+            <a:avLst/>
+          </a:prstGeom>
+        </p:spPr>
+      </p:pic>
+    </p:spTree>
+    <p:extLst>
+      <p:ext uri="{BB962C8B-B14F-4D97-AF65-F5344CB8AC3E}">
+        <p14:creationId xmlns:p14="http://schemas.microsoft.com/office/powerpoint/2010/main" val="2696548569"/>
+      </p:ext>
+    </p:extLst>
+  </p:cSld>
+  <p:clrMapOvr>
+    <a:masterClrMapping/>
+  </p:clrMapOvr>
+</p:sld>
+</file>
+
+<file path=ppt/slides/slide18.xml><?xml version="1.0" encoding="utf-8"?>
+<p:sld xmlns:a="http://schemas.openxmlformats.org/drawingml/2006/main" xmlns:r="http://schemas.openxmlformats.org/officeDocument/2006/relationships" xmlns:p="http://schemas.openxmlformats.org/presentationml/2006/main">
+  <p:cSld>
+    <p:spTree>
+      <p:nvGrpSpPr>
+        <p:cNvPr id="1" name=""/>
+        <p:cNvGrpSpPr/>
+        <p:nvPr/>
+      </p:nvGrpSpPr>
+      <p:grpSpPr>
+        <a:xfrm>
+          <a:off x="0" y="0"/>
+          <a:ext cx="0" cy="0"/>
+          <a:chOff x="0" y="0"/>
+          <a:chExt cx="0" cy="0"/>
+        </a:xfrm>
+      </p:grpSpPr>
+      <p:sp>
+        <p:nvSpPr>
+          <p:cNvPr id="2" name="Título 1">
+            <a:extLst>
+              <a:ext uri="{FF2B5EF4-FFF2-40B4-BE49-F238E27FC236}">
+                <a16:creationId xmlns:a16="http://schemas.microsoft.com/office/drawing/2014/main" id="{49EED29B-6ECB-4B01-84C4-D3C997C5AADD}"/>
+              </a:ext>
+            </a:extLst>
+          </p:cNvPr>
+          <p:cNvSpPr>
+            <a:spLocks noGrp="1"/>
+          </p:cNvSpPr>
+          <p:nvPr>
+            <p:ph type="title"/>
+          </p:nvPr>
+        </p:nvSpPr>
+        <p:spPr/>
+        <p:txBody>
+          <a:bodyPr/>
+          <a:lstStyle/>
+          <a:p>
+            <a:r>
+              <a:rPr lang="es-AR" dirty="0"/>
+              <a:t>Fusionar</a:t>
+            </a:r>
+          </a:p>
+        </p:txBody>
+      </p:sp>
+      <p:pic>
+        <p:nvPicPr>
+          <p:cNvPr id="4" name="Imagen 3">
+            <a:extLst>
+              <a:ext uri="{FF2B5EF4-FFF2-40B4-BE49-F238E27FC236}">
+                <a16:creationId xmlns:a16="http://schemas.microsoft.com/office/drawing/2014/main" id="{32C5F542-73DB-4315-8715-57B0ECCAF031}"/>
+              </a:ext>
+            </a:extLst>
+          </p:cNvPr>
+          <p:cNvPicPr>
+            <a:picLocks noChangeAspect="1"/>
+          </p:cNvPicPr>
+          <p:nvPr/>
+        </p:nvPicPr>
+        <p:blipFill>
+          <a:blip r:embed="rId2">
+            <a:extLst>
+              <a:ext uri="{28A0092B-C50C-407E-A947-70E740481C1C}">
+                <a14:useLocalDpi xmlns:a14="http://schemas.microsoft.com/office/drawing/2010/main" val="0"/>
+              </a:ext>
+            </a:extLst>
+          </a:blip>
+          <a:stretch>
+            <a:fillRect/>
+          </a:stretch>
+        </p:blipFill>
+        <p:spPr>
+          <a:xfrm>
+            <a:off x="838200" y="2103437"/>
+            <a:ext cx="2380952" cy="2276190"/>
+          </a:xfrm>
+          <a:prstGeom prst="rect">
+            <a:avLst/>
+          </a:prstGeom>
+        </p:spPr>
+      </p:pic>
+      <p:pic>
+        <p:nvPicPr>
+          <p:cNvPr id="6" name="Imagen 5">
+            <a:extLst>
+              <a:ext uri="{FF2B5EF4-FFF2-40B4-BE49-F238E27FC236}">
+                <a16:creationId xmlns:a16="http://schemas.microsoft.com/office/drawing/2014/main" id="{D54334BE-8F6B-428F-A714-8B61871D05AC}"/>
+              </a:ext>
+            </a:extLst>
+          </p:cNvPr>
+          <p:cNvPicPr>
+            <a:picLocks noChangeAspect="1"/>
+          </p:cNvPicPr>
+          <p:nvPr/>
+        </p:nvPicPr>
+        <p:blipFill>
+          <a:blip r:embed="rId3">
+            <a:extLst>
+              <a:ext uri="{28A0092B-C50C-407E-A947-70E740481C1C}">
+                <a14:useLocalDpi xmlns:a14="http://schemas.microsoft.com/office/drawing/2010/main" val="0"/>
+              </a:ext>
+            </a:extLst>
+          </a:blip>
+          <a:stretch>
+            <a:fillRect/>
+          </a:stretch>
+        </p:blipFill>
+        <p:spPr>
+          <a:xfrm>
+            <a:off x="8679719" y="2391218"/>
+            <a:ext cx="2171091" cy="2075563"/>
+          </a:xfrm>
+          <a:prstGeom prst="rect">
+            <a:avLst/>
+          </a:prstGeom>
+        </p:spPr>
+      </p:pic>
+      <p:pic>
+        <p:nvPicPr>
+          <p:cNvPr id="8" name="Imagen 7">
+            <a:extLst>
+              <a:ext uri="{FF2B5EF4-FFF2-40B4-BE49-F238E27FC236}">
+                <a16:creationId xmlns:a16="http://schemas.microsoft.com/office/drawing/2014/main" id="{75398FDC-2888-4FE3-8C80-DC4B57335734}"/>
+              </a:ext>
+            </a:extLst>
+          </p:cNvPr>
+          <p:cNvPicPr>
+            <a:picLocks noChangeAspect="1"/>
+          </p:cNvPicPr>
+          <p:nvPr/>
+        </p:nvPicPr>
+        <p:blipFill>
+          <a:blip r:embed="rId4">
+            <a:extLst>
+              <a:ext uri="{28A0092B-C50C-407E-A947-70E740481C1C}">
+                <a14:useLocalDpi xmlns:a14="http://schemas.microsoft.com/office/drawing/2010/main" val="0"/>
+              </a:ext>
+            </a:extLst>
+          </a:blip>
+          <a:stretch>
+            <a:fillRect/>
+          </a:stretch>
+        </p:blipFill>
+        <p:spPr>
+          <a:xfrm>
+            <a:off x="8934020" y="4883555"/>
+            <a:ext cx="1916790" cy="1832451"/>
+          </a:xfrm>
+          <a:prstGeom prst="rect">
+            <a:avLst/>
+          </a:prstGeom>
+        </p:spPr>
+      </p:pic>
+      <p:pic>
+        <p:nvPicPr>
+          <p:cNvPr id="10" name="Imagen 9">
+            <a:extLst>
+              <a:ext uri="{FF2B5EF4-FFF2-40B4-BE49-F238E27FC236}">
+                <a16:creationId xmlns:a16="http://schemas.microsoft.com/office/drawing/2014/main" id="{5025DE8C-BF87-424D-977F-44348C371343}"/>
+              </a:ext>
+            </a:extLst>
+          </p:cNvPr>
+          <p:cNvPicPr>
+            <a:picLocks noChangeAspect="1"/>
+          </p:cNvPicPr>
+          <p:nvPr/>
+        </p:nvPicPr>
+        <p:blipFill>
+          <a:blip r:embed="rId5">
+            <a:extLst>
+              <a:ext uri="{28A0092B-C50C-407E-A947-70E740481C1C}">
+                <a14:useLocalDpi xmlns:a14="http://schemas.microsoft.com/office/drawing/2010/main" val="0"/>
+              </a:ext>
+            </a:extLst>
+          </a:blip>
+          <a:stretch>
+            <a:fillRect/>
+          </a:stretch>
+        </p:blipFill>
+        <p:spPr>
+          <a:xfrm>
+            <a:off x="8679719" y="349138"/>
+            <a:ext cx="1916790" cy="1832451"/>
+          </a:xfrm>
+          <a:prstGeom prst="rect">
+            <a:avLst/>
+          </a:prstGeom>
+        </p:spPr>
+      </p:pic>
+      <p:pic>
+        <p:nvPicPr>
+          <p:cNvPr id="12" name="Imagen 11">
+            <a:extLst>
+              <a:ext uri="{FF2B5EF4-FFF2-40B4-BE49-F238E27FC236}">
+                <a16:creationId xmlns:a16="http://schemas.microsoft.com/office/drawing/2014/main" id="{D55C5612-B20F-4111-8933-212E14807788}"/>
+              </a:ext>
+            </a:extLst>
+          </p:cNvPr>
+          <p:cNvPicPr>
+            <a:picLocks noChangeAspect="1"/>
+          </p:cNvPicPr>
+          <p:nvPr/>
+        </p:nvPicPr>
+        <p:blipFill>
+          <a:blip r:embed="rId6">
+            <a:extLst>
+              <a:ext uri="{28A0092B-C50C-407E-A947-70E740481C1C}">
+                <a14:useLocalDpi xmlns:a14="http://schemas.microsoft.com/office/drawing/2010/main" val="0"/>
+              </a:ext>
+            </a:extLst>
+          </a:blip>
+          <a:stretch>
+            <a:fillRect/>
+          </a:stretch>
+        </p:blipFill>
+        <p:spPr>
+          <a:xfrm>
+            <a:off x="4909408" y="2330209"/>
+            <a:ext cx="2171091" cy="2075563"/>
+          </a:xfrm>
+          <a:prstGeom prst="rect">
+            <a:avLst/>
+          </a:prstGeom>
+        </p:spPr>
+      </p:pic>
+      <p:pic>
+        <p:nvPicPr>
+          <p:cNvPr id="14" name="Imagen 13">
+            <a:extLst>
+              <a:ext uri="{FF2B5EF4-FFF2-40B4-BE49-F238E27FC236}">
+                <a16:creationId xmlns:a16="http://schemas.microsoft.com/office/drawing/2014/main" id="{4E216C38-43CD-436D-8331-ABB603EB054E}"/>
+              </a:ext>
+            </a:extLst>
+          </p:cNvPr>
+          <p:cNvPicPr>
+            <a:picLocks noChangeAspect="1"/>
+          </p:cNvPicPr>
+          <p:nvPr/>
+        </p:nvPicPr>
+        <p:blipFill>
+          <a:blip r:embed="rId7">
+            <a:extLst>
+              <a:ext uri="{28A0092B-C50C-407E-A947-70E740481C1C}">
+                <a14:useLocalDpi xmlns:a14="http://schemas.microsoft.com/office/drawing/2010/main" val="0"/>
+              </a:ext>
+            </a:extLst>
+          </a:blip>
+          <a:stretch>
+            <a:fillRect/>
+          </a:stretch>
+        </p:blipFill>
+        <p:spPr>
+          <a:xfrm>
+            <a:off x="4909408" y="4630729"/>
+            <a:ext cx="2171091" cy="2075563"/>
+          </a:xfrm>
+          <a:prstGeom prst="rect">
+            <a:avLst/>
+          </a:prstGeom>
+        </p:spPr>
+      </p:pic>
+      <p:pic>
+        <p:nvPicPr>
+          <p:cNvPr id="16" name="Imagen 15">
+            <a:extLst>
+              <a:ext uri="{FF2B5EF4-FFF2-40B4-BE49-F238E27FC236}">
+                <a16:creationId xmlns:a16="http://schemas.microsoft.com/office/drawing/2014/main" id="{6269558D-2FF3-4A24-B8C0-99CC919A7D87}"/>
+              </a:ext>
+            </a:extLst>
+          </p:cNvPr>
+          <p:cNvPicPr>
+            <a:picLocks noChangeAspect="1"/>
+          </p:cNvPicPr>
+          <p:nvPr/>
+        </p:nvPicPr>
+        <p:blipFill>
+          <a:blip r:embed="rId8">
+            <a:extLst>
+              <a:ext uri="{28A0092B-C50C-407E-A947-70E740481C1C}">
+                <a14:useLocalDpi xmlns:a14="http://schemas.microsoft.com/office/drawing/2010/main" val="0"/>
+              </a:ext>
+            </a:extLst>
+          </a:blip>
+          <a:stretch>
+            <a:fillRect/>
+          </a:stretch>
+        </p:blipFill>
+        <p:spPr>
+          <a:xfrm>
+            <a:off x="4909408" y="258066"/>
+            <a:ext cx="1916791" cy="1832452"/>
+          </a:xfrm>
+          <a:prstGeom prst="rect">
+            <a:avLst/>
+          </a:prstGeom>
+        </p:spPr>
+      </p:pic>
+    </p:spTree>
+    <p:extLst>
+      <p:ext uri="{BB962C8B-B14F-4D97-AF65-F5344CB8AC3E}">
+        <p14:creationId xmlns:p14="http://schemas.microsoft.com/office/powerpoint/2010/main" val="2823912760"/>
+      </p:ext>
+    </p:extLst>
+  </p:cSld>
+  <p:clrMapOvr>
+    <a:masterClrMapping/>
+  </p:clrMapOvr>
+</p:sld>
+</file>
+
+<file path=ppt/slides/slide19.xml><?xml version="1.0" encoding="utf-8"?>
 <p:sld xmlns:a="http://schemas.openxmlformats.org/drawingml/2006/main" xmlns:r="http://schemas.openxmlformats.org/officeDocument/2006/relationships" xmlns:p="http://schemas.openxmlformats.org/presentationml/2006/main">
   <p:cSld>
     <p:spTree>
@@ -6529,7 +7560,9 @@
         </p:nvSpPr>
         <p:spPr/>
         <p:txBody>
-          <a:bodyPr/>
+          <a:bodyPr>
+            <a:normAutofit/>
+          </a:bodyPr>
           <a:lstStyle/>
           <a:p>
             <a:endParaRPr lang="es-AR" dirty="0"/>
@@ -6568,6 +7601,46 @@
           </a:p>
         </p:txBody>
       </p:sp>
+      <p:pic>
+        <p:nvPicPr>
+          <p:cNvPr id="9" name="Imagen 8">
+            <a:extLst>
+              <a:ext uri="{FF2B5EF4-FFF2-40B4-BE49-F238E27FC236}">
+                <a16:creationId xmlns:a16="http://schemas.microsoft.com/office/drawing/2014/main" id="{999F2EA5-F51A-4561-93D6-1BDDB36B6830}"/>
+              </a:ext>
+            </a:extLst>
+          </p:cNvPr>
+          <p:cNvPicPr>
+            <a:picLocks noChangeAspect="1"/>
+          </p:cNvPicPr>
+          <p:nvPr>
+            <p:custDataLst>
+              <p:tags r:id="rId1"/>
+            </p:custDataLst>
+          </p:nvPr>
+        </p:nvPicPr>
+        <p:blipFill>
+          <a:blip r:embed="rId3">
+            <a:extLst>
+              <a:ext uri="{28A0092B-C50C-407E-A947-70E740481C1C}">
+                <a14:useLocalDpi xmlns:a14="http://schemas.microsoft.com/office/drawing/2010/main" val="0"/>
+              </a:ext>
+            </a:extLst>
+          </a:blip>
+          <a:stretch>
+            <a:fillRect/>
+          </a:stretch>
+        </p:blipFill>
+        <p:spPr>
+          <a:xfrm>
+            <a:off x="3528368" y="3252112"/>
+            <a:ext cx="4220862" cy="2112424"/>
+          </a:xfrm>
+          <a:prstGeom prst="rect">
+            <a:avLst/>
+          </a:prstGeom>
+        </p:spPr>
+      </p:pic>
     </p:spTree>
     <p:extLst>
       <p:ext uri="{BB962C8B-B14F-4D97-AF65-F5344CB8AC3E}">
@@ -7691,17 +8764,32 @@
                 </a:solidFill>
                 <a:latin typeface="Segoe Script" panose="030B0504020000000003" pitchFamily="66" charset="0"/>
               </a:rPr>
-              <a:t>Generar mapas, recorridos, formularios</a:t>
+              <a:t>Generar mapas, recorridos</a:t>
             </a:r>
             <a:r>
-              <a:rPr lang="es-AR" sz="2400" dirty="0">
+              <a:rPr lang="es-AR" sz="2400" b="1">
                 <a:solidFill>
                   <a:schemeClr val="tx1"/>
                 </a:solidFill>
                 <a:latin typeface="Segoe Script" panose="030B0504020000000003" pitchFamily="66" charset="0"/>
               </a:rPr>
-              <a:t>. </a:t>
+              <a:t>, planillas.</a:t>
             </a:r>
+            <a:r>
+              <a:rPr lang="es-AR" sz="2400">
+                <a:solidFill>
+                  <a:schemeClr val="tx1"/>
+                </a:solidFill>
+                <a:latin typeface="Segoe Script" panose="030B0504020000000003" pitchFamily="66" charset="0"/>
+              </a:rPr>
+              <a:t> </a:t>
+            </a:r>
+            <a:endParaRPr lang="es-AR" sz="2400" dirty="0">
+              <a:solidFill>
+                <a:schemeClr val="tx1"/>
+              </a:solidFill>
+              <a:latin typeface="Segoe Script" panose="030B0504020000000003" pitchFamily="66" charset="0"/>
+            </a:endParaRPr>
           </a:p>
         </p:txBody>
       </p:sp>
@@ -10351,61 +11439,6 @@
           <p:cNvPr id="2" name="Título 1">
             <a:extLst>
               <a:ext uri="{FF2B5EF4-FFF2-40B4-BE49-F238E27FC236}">
-                <a16:creationId xmlns:a16="http://schemas.microsoft.com/office/drawing/2014/main" id="{5DF3062B-DEF6-43CC-8EA2-1CDEE96544CA}"/>
-              </a:ext>
-            </a:extLst>
-          </p:cNvPr>
-          <p:cNvSpPr>
-            <a:spLocks noGrp="1"/>
-          </p:cNvSpPr>
-          <p:nvPr>
-            <p:ph type="title"/>
-          </p:nvPr>
-        </p:nvSpPr>
-        <p:spPr/>
-        <p:txBody>
-          <a:bodyPr/>
-          <a:lstStyle/>
-          <a:p>
-            <a:endParaRPr lang="es-AR"/>
-          </a:p>
-        </p:txBody>
-      </p:sp>
-    </p:spTree>
-    <p:extLst>
-      <p:ext uri="{BB962C8B-B14F-4D97-AF65-F5344CB8AC3E}">
-        <p14:creationId xmlns:p14="http://schemas.microsoft.com/office/powerpoint/2010/main" val="2013699600"/>
-      </p:ext>
-    </p:extLst>
-  </p:cSld>
-  <p:clrMapOvr>
-    <a:masterClrMapping/>
-  </p:clrMapOvr>
-</p:sld>
-</file>
-
-<file path=ppt/slides/slide7.xml><?xml version="1.0" encoding="utf-8"?>
-<p:sld xmlns:a="http://schemas.openxmlformats.org/drawingml/2006/main" xmlns:r="http://schemas.openxmlformats.org/officeDocument/2006/relationships" xmlns:p="http://schemas.openxmlformats.org/presentationml/2006/main">
-  <p:cSld>
-    <p:spTree>
-      <p:nvGrpSpPr>
-        <p:cNvPr id="1" name=""/>
-        <p:cNvGrpSpPr/>
-        <p:nvPr/>
-      </p:nvGrpSpPr>
-      <p:grpSpPr>
-        <a:xfrm>
-          <a:off x="0" y="0"/>
-          <a:ext cx="0" cy="0"/>
-          <a:chOff x="0" y="0"/>
-          <a:chExt cx="0" cy="0"/>
-        </a:xfrm>
-      </p:grpSpPr>
-      <p:sp>
-        <p:nvSpPr>
-          <p:cNvPr id="2" name="Título 1">
-            <a:extLst>
-              <a:ext uri="{FF2B5EF4-FFF2-40B4-BE49-F238E27FC236}">
                 <a16:creationId xmlns:a16="http://schemas.microsoft.com/office/drawing/2014/main" id="{7D328287-46F2-4C2A-915C-CF8849C4E797}"/>
               </a:ext>
             </a:extLst>
@@ -11440,7 +12473,7 @@
 </p:sld>
 </file>
 
-<file path=ppt/slides/slide8.xml><?xml version="1.0" encoding="utf-8"?>
+<file path=ppt/slides/slide7.xml><?xml version="1.0" encoding="utf-8"?>
 <p:sld xmlns:a="http://schemas.openxmlformats.org/drawingml/2006/main" xmlns:r="http://schemas.openxmlformats.org/officeDocument/2006/relationships" xmlns:p="http://schemas.openxmlformats.org/presentationml/2006/main">
   <p:cSld>
     <p:spTree>
@@ -11508,7 +12541,7 @@
 </p:sld>
 </file>
 
-<file path=ppt/slides/slide9.xml><?xml version="1.0" encoding="utf-8"?>
+<file path=ppt/slides/slide8.xml><?xml version="1.0" encoding="utf-8"?>
 <p:sld xmlns:a="http://schemas.openxmlformats.org/drawingml/2006/main" xmlns:r="http://schemas.openxmlformats.org/officeDocument/2006/relationships" xmlns:p="http://schemas.openxmlformats.org/presentationml/2006/main">
   <p:cSld>
     <p:spTree>
@@ -12539,6 +13572,845 @@
     </p:bldLst>
   </p:timing>
 </p:sld>
+</file>
+
+<file path=ppt/slides/slide9.xml><?xml version="1.0" encoding="utf-8"?>
+<p:sld xmlns:a="http://schemas.openxmlformats.org/drawingml/2006/main" xmlns:r="http://schemas.openxmlformats.org/officeDocument/2006/relationships" xmlns:p="http://schemas.openxmlformats.org/presentationml/2006/main">
+  <p:cSld>
+    <p:spTree>
+      <p:nvGrpSpPr>
+        <p:cNvPr id="1" name=""/>
+        <p:cNvGrpSpPr/>
+        <p:nvPr/>
+      </p:nvGrpSpPr>
+      <p:grpSpPr>
+        <a:xfrm>
+          <a:off x="0" y="0"/>
+          <a:ext cx="0" cy="0"/>
+          <a:chOff x="0" y="0"/>
+          <a:chExt cx="0" cy="0"/>
+        </a:xfrm>
+      </p:grpSpPr>
+      <p:sp>
+        <p:nvSpPr>
+          <p:cNvPr id="2" name="Título 1">
+            <a:extLst>
+              <a:ext uri="{FF2B5EF4-FFF2-40B4-BE49-F238E27FC236}">
+                <a16:creationId xmlns:a16="http://schemas.microsoft.com/office/drawing/2014/main" id="{3F9640A5-903A-45E6-8F6A-4F99470764CA}"/>
+              </a:ext>
+            </a:extLst>
+          </p:cNvPr>
+          <p:cNvSpPr>
+            <a:spLocks noGrp="1"/>
+          </p:cNvSpPr>
+          <p:nvPr>
+            <p:ph type="title"/>
+          </p:nvPr>
+        </p:nvSpPr>
+        <p:spPr>
+          <a:xfrm>
+            <a:off x="226815" y="450744"/>
+            <a:ext cx="5720735" cy="1325563"/>
+          </a:xfrm>
+        </p:spPr>
+        <p:txBody>
+          <a:bodyPr>
+            <a:normAutofit/>
+          </a:bodyPr>
+          <a:lstStyle/>
+          <a:p>
+            <a:pPr algn="ctr"/>
+            <a:r>
+              <a:rPr lang="es-AR" sz="5400" b="1" dirty="0">
+                <a:latin typeface="Segoe Print" panose="02000600000000000000" pitchFamily="2" charset="0"/>
+              </a:rPr>
+              <a:t>Tipos de Radios</a:t>
+            </a:r>
+            <a:endParaRPr lang="es-AR" sz="5400" b="1" dirty="0">
+              <a:latin typeface="Segoe Script" panose="030B0504020000000003" pitchFamily="66" charset="0"/>
+            </a:endParaRPr>
+          </a:p>
+        </p:txBody>
+      </p:sp>
+      <p:sp>
+        <p:nvSpPr>
+          <p:cNvPr id="3" name="CuadroTexto 2">
+            <a:extLst>
+              <a:ext uri="{FF2B5EF4-FFF2-40B4-BE49-F238E27FC236}">
+                <a16:creationId xmlns:a16="http://schemas.microsoft.com/office/drawing/2014/main" id="{5A9A0437-608D-495B-B722-C8295D7A3926}"/>
+              </a:ext>
+            </a:extLst>
+          </p:cNvPr>
+          <p:cNvSpPr txBox="1"/>
+          <p:nvPr/>
+        </p:nvSpPr>
+        <p:spPr>
+          <a:xfrm>
+            <a:off x="4357290" y="1901994"/>
+            <a:ext cx="7108009" cy="954107"/>
+          </a:xfrm>
+          <a:prstGeom prst="rect">
+            <a:avLst/>
+          </a:prstGeom>
+          <a:noFill/>
+        </p:spPr>
+        <p:txBody>
+          <a:bodyPr wrap="square" rtlCol="0">
+            <a:spAutoFit/>
+          </a:bodyPr>
+          <a:lstStyle/>
+          <a:p>
+            <a:r>
+              <a:rPr lang="es-AR" sz="2800" i="1" dirty="0">
+                <a:latin typeface="Segoe Print" panose="02000600000000000000" pitchFamily="2" charset="0"/>
+              </a:rPr>
+              <a:t>Según distribución de viviendas</a:t>
+            </a:r>
+            <a:br>
+              <a:rPr lang="es-AR" sz="2800" i="1" dirty="0">
+                <a:latin typeface="Segoe Print" panose="02000600000000000000" pitchFamily="2" charset="0"/>
+              </a:rPr>
+            </a:br>
+            <a:r>
+              <a:rPr lang="es-AR" sz="2800" i="1" dirty="0">
+                <a:latin typeface="Segoe Print" panose="02000600000000000000" pitchFamily="2" charset="0"/>
+              </a:rPr>
+              <a:t>dada una carga deseada.</a:t>
+            </a:r>
+          </a:p>
+        </p:txBody>
+      </p:sp>
+      <p:sp>
+        <p:nvSpPr>
+          <p:cNvPr id="4" name="Rectángulo: esquinas redondeadas 3">
+            <a:extLst>
+              <a:ext uri="{FF2B5EF4-FFF2-40B4-BE49-F238E27FC236}">
+                <a16:creationId xmlns:a16="http://schemas.microsoft.com/office/drawing/2014/main" id="{88630322-1F4C-437E-81EE-6FCFFBB08546}"/>
+              </a:ext>
+            </a:extLst>
+          </p:cNvPr>
+          <p:cNvSpPr/>
+          <p:nvPr/>
+        </p:nvSpPr>
+        <p:spPr>
+          <a:xfrm>
+            <a:off x="608250" y="3565582"/>
+            <a:ext cx="7498080" cy="2841674"/>
+          </a:xfrm>
+          <a:custGeom>
+            <a:avLst/>
+            <a:gdLst>
+              <a:gd name="connsiteX0" fmla="*/ 0 w 7498080"/>
+              <a:gd name="connsiteY0" fmla="*/ 473622 h 2841674"/>
+              <a:gd name="connsiteX1" fmla="*/ 473622 w 7498080"/>
+              <a:gd name="connsiteY1" fmla="*/ 0 h 2841674"/>
+              <a:gd name="connsiteX2" fmla="*/ 1134661 w 7498080"/>
+              <a:gd name="connsiteY2" fmla="*/ 0 h 2841674"/>
+              <a:gd name="connsiteX3" fmla="*/ 1730191 w 7498080"/>
+              <a:gd name="connsiteY3" fmla="*/ 0 h 2841674"/>
+              <a:gd name="connsiteX4" fmla="*/ 2260214 w 7498080"/>
+              <a:gd name="connsiteY4" fmla="*/ 0 h 2841674"/>
+              <a:gd name="connsiteX5" fmla="*/ 2921253 w 7498080"/>
+              <a:gd name="connsiteY5" fmla="*/ 0 h 2841674"/>
+              <a:gd name="connsiteX6" fmla="*/ 3320258 w 7498080"/>
+              <a:gd name="connsiteY6" fmla="*/ 0 h 2841674"/>
+              <a:gd name="connsiteX7" fmla="*/ 3784772 w 7498080"/>
+              <a:gd name="connsiteY7" fmla="*/ 0 h 2841674"/>
+              <a:gd name="connsiteX8" fmla="*/ 4380302 w 7498080"/>
+              <a:gd name="connsiteY8" fmla="*/ 0 h 2841674"/>
+              <a:gd name="connsiteX9" fmla="*/ 4844816 w 7498080"/>
+              <a:gd name="connsiteY9" fmla="*/ 0 h 2841674"/>
+              <a:gd name="connsiteX10" fmla="*/ 5374838 w 7498080"/>
+              <a:gd name="connsiteY10" fmla="*/ 0 h 2841674"/>
+              <a:gd name="connsiteX11" fmla="*/ 5839352 w 7498080"/>
+              <a:gd name="connsiteY11" fmla="*/ 0 h 2841674"/>
+              <a:gd name="connsiteX12" fmla="*/ 6500391 w 7498080"/>
+              <a:gd name="connsiteY12" fmla="*/ 0 h 2841674"/>
+              <a:gd name="connsiteX13" fmla="*/ 7024458 w 7498080"/>
+              <a:gd name="connsiteY13" fmla="*/ 0 h 2841674"/>
+              <a:gd name="connsiteX14" fmla="*/ 7498080 w 7498080"/>
+              <a:gd name="connsiteY14" fmla="*/ 473622 h 2841674"/>
+              <a:gd name="connsiteX15" fmla="*/ 7498080 w 7498080"/>
+              <a:gd name="connsiteY15" fmla="*/ 890397 h 2841674"/>
+              <a:gd name="connsiteX16" fmla="*/ 7498080 w 7498080"/>
+              <a:gd name="connsiteY16" fmla="*/ 1364004 h 2841674"/>
+              <a:gd name="connsiteX17" fmla="*/ 7498080 w 7498080"/>
+              <a:gd name="connsiteY17" fmla="*/ 1780779 h 2841674"/>
+              <a:gd name="connsiteX18" fmla="*/ 7498080 w 7498080"/>
+              <a:gd name="connsiteY18" fmla="*/ 2368052 h 2841674"/>
+              <a:gd name="connsiteX19" fmla="*/ 7024458 w 7498080"/>
+              <a:gd name="connsiteY19" fmla="*/ 2841674 h 2841674"/>
+              <a:gd name="connsiteX20" fmla="*/ 6559944 w 7498080"/>
+              <a:gd name="connsiteY20" fmla="*/ 2841674 h 2841674"/>
+              <a:gd name="connsiteX21" fmla="*/ 6029922 w 7498080"/>
+              <a:gd name="connsiteY21" fmla="*/ 2841674 h 2841674"/>
+              <a:gd name="connsiteX22" fmla="*/ 5434391 w 7498080"/>
+              <a:gd name="connsiteY22" fmla="*/ 2841674 h 2841674"/>
+              <a:gd name="connsiteX23" fmla="*/ 4773353 w 7498080"/>
+              <a:gd name="connsiteY23" fmla="*/ 2841674 h 2841674"/>
+              <a:gd name="connsiteX24" fmla="*/ 4243330 w 7498080"/>
+              <a:gd name="connsiteY24" fmla="*/ 2841674 h 2841674"/>
+              <a:gd name="connsiteX25" fmla="*/ 3778817 w 7498080"/>
+              <a:gd name="connsiteY25" fmla="*/ 2841674 h 2841674"/>
+              <a:gd name="connsiteX26" fmla="*/ 3314303 w 7498080"/>
+              <a:gd name="connsiteY26" fmla="*/ 2841674 h 2841674"/>
+              <a:gd name="connsiteX27" fmla="*/ 2915297 w 7498080"/>
+              <a:gd name="connsiteY27" fmla="*/ 2841674 h 2841674"/>
+              <a:gd name="connsiteX28" fmla="*/ 2450783 w 7498080"/>
+              <a:gd name="connsiteY28" fmla="*/ 2841674 h 2841674"/>
+              <a:gd name="connsiteX29" fmla="*/ 1789745 w 7498080"/>
+              <a:gd name="connsiteY29" fmla="*/ 2841674 h 2841674"/>
+              <a:gd name="connsiteX30" fmla="*/ 1128706 w 7498080"/>
+              <a:gd name="connsiteY30" fmla="*/ 2841674 h 2841674"/>
+              <a:gd name="connsiteX31" fmla="*/ 473622 w 7498080"/>
+              <a:gd name="connsiteY31" fmla="*/ 2841674 h 2841674"/>
+              <a:gd name="connsiteX32" fmla="*/ 0 w 7498080"/>
+              <a:gd name="connsiteY32" fmla="*/ 2368052 h 2841674"/>
+              <a:gd name="connsiteX33" fmla="*/ 0 w 7498080"/>
+              <a:gd name="connsiteY33" fmla="*/ 1875500 h 2841674"/>
+              <a:gd name="connsiteX34" fmla="*/ 0 w 7498080"/>
+              <a:gd name="connsiteY34" fmla="*/ 1401893 h 2841674"/>
+              <a:gd name="connsiteX35" fmla="*/ 0 w 7498080"/>
+              <a:gd name="connsiteY35" fmla="*/ 985118 h 2841674"/>
+              <a:gd name="connsiteX36" fmla="*/ 0 w 7498080"/>
+              <a:gd name="connsiteY36" fmla="*/ 473622 h 2841674"/>
+            </a:gdLst>
+            <a:ahLst/>
+            <a:cxnLst>
+              <a:cxn ang="0">
+                <a:pos x="connsiteX0" y="connsiteY0"/>
+              </a:cxn>
+              <a:cxn ang="0">
+                <a:pos x="connsiteX1" y="connsiteY1"/>
+              </a:cxn>
+              <a:cxn ang="0">
+                <a:pos x="connsiteX2" y="connsiteY2"/>
+              </a:cxn>
+              <a:cxn ang="0">
+                <a:pos x="connsiteX3" y="connsiteY3"/>
+              </a:cxn>
+              <a:cxn ang="0">
+                <a:pos x="connsiteX4" y="connsiteY4"/>
+              </a:cxn>
+              <a:cxn ang="0">
+                <a:pos x="connsiteX5" y="connsiteY5"/>
+              </a:cxn>
+              <a:cxn ang="0">
+                <a:pos x="connsiteX6" y="connsiteY6"/>
+              </a:cxn>
+              <a:cxn ang="0">
+                <a:pos x="connsiteX7" y="connsiteY7"/>
+              </a:cxn>
+              <a:cxn ang="0">
+                <a:pos x="connsiteX8" y="connsiteY8"/>
+              </a:cxn>
+              <a:cxn ang="0">
+                <a:pos x="connsiteX9" y="connsiteY9"/>
+              </a:cxn>
+              <a:cxn ang="0">
+                <a:pos x="connsiteX10" y="connsiteY10"/>
+              </a:cxn>
+              <a:cxn ang="0">
+                <a:pos x="connsiteX11" y="connsiteY11"/>
+              </a:cxn>
+              <a:cxn ang="0">
+                <a:pos x="connsiteX12" y="connsiteY12"/>
+              </a:cxn>
+              <a:cxn ang="0">
+                <a:pos x="connsiteX13" y="connsiteY13"/>
+              </a:cxn>
+              <a:cxn ang="0">
+                <a:pos x="connsiteX14" y="connsiteY14"/>
+              </a:cxn>
+              <a:cxn ang="0">
+                <a:pos x="connsiteX15" y="connsiteY15"/>
+              </a:cxn>
+              <a:cxn ang="0">
+                <a:pos x="connsiteX16" y="connsiteY16"/>
+              </a:cxn>
+              <a:cxn ang="0">
+                <a:pos x="connsiteX17" y="connsiteY17"/>
+              </a:cxn>
+              <a:cxn ang="0">
+                <a:pos x="connsiteX18" y="connsiteY18"/>
+              </a:cxn>
+              <a:cxn ang="0">
+                <a:pos x="connsiteX19" y="connsiteY19"/>
+              </a:cxn>
+              <a:cxn ang="0">
+                <a:pos x="connsiteX20" y="connsiteY20"/>
+              </a:cxn>
+              <a:cxn ang="0">
+                <a:pos x="connsiteX21" y="connsiteY21"/>
+              </a:cxn>
+              <a:cxn ang="0">
+                <a:pos x="connsiteX22" y="connsiteY22"/>
+              </a:cxn>
+              <a:cxn ang="0">
+                <a:pos x="connsiteX23" y="connsiteY23"/>
+              </a:cxn>
+              <a:cxn ang="0">
+                <a:pos x="connsiteX24" y="connsiteY24"/>
+              </a:cxn>
+              <a:cxn ang="0">
+                <a:pos x="connsiteX25" y="connsiteY25"/>
+              </a:cxn>
+              <a:cxn ang="0">
+                <a:pos x="connsiteX26" y="connsiteY26"/>
+              </a:cxn>
+              <a:cxn ang="0">
+                <a:pos x="connsiteX27" y="connsiteY27"/>
+              </a:cxn>
+              <a:cxn ang="0">
+                <a:pos x="connsiteX28" y="connsiteY28"/>
+              </a:cxn>
+              <a:cxn ang="0">
+                <a:pos x="connsiteX29" y="connsiteY29"/>
+              </a:cxn>
+              <a:cxn ang="0">
+                <a:pos x="connsiteX30" y="connsiteY30"/>
+              </a:cxn>
+              <a:cxn ang="0">
+                <a:pos x="connsiteX31" y="connsiteY31"/>
+              </a:cxn>
+              <a:cxn ang="0">
+                <a:pos x="connsiteX32" y="connsiteY32"/>
+              </a:cxn>
+              <a:cxn ang="0">
+                <a:pos x="connsiteX33" y="connsiteY33"/>
+              </a:cxn>
+              <a:cxn ang="0">
+                <a:pos x="connsiteX34" y="connsiteY34"/>
+              </a:cxn>
+              <a:cxn ang="0">
+                <a:pos x="connsiteX35" y="connsiteY35"/>
+              </a:cxn>
+              <a:cxn ang="0">
+                <a:pos x="connsiteX36" y="connsiteY36"/>
+              </a:cxn>
+            </a:cxnLst>
+            <a:rect l="l" t="t" r="r" b="b"/>
+            <a:pathLst>
+              <a:path w="7498080" h="2841674" fill="none" extrusionOk="0">
+                <a:moveTo>
+                  <a:pt x="0" y="473622"/>
+                </a:moveTo>
+                <a:cubicBezTo>
+                  <a:pt x="38937" y="167040"/>
+                  <a:pt x="220279" y="-41260"/>
+                  <a:pt x="473622" y="0"/>
+                </a:cubicBezTo>
+                <a:cubicBezTo>
+                  <a:pt x="764155" y="-57616"/>
+                  <a:pt x="970367" y="46203"/>
+                  <a:pt x="1134661" y="0"/>
+                </a:cubicBezTo>
+                <a:cubicBezTo>
+                  <a:pt x="1298955" y="-46203"/>
+                  <a:pt x="1513677" y="70263"/>
+                  <a:pt x="1730191" y="0"/>
+                </a:cubicBezTo>
+                <a:cubicBezTo>
+                  <a:pt x="1946705" y="-70263"/>
+                  <a:pt x="2081045" y="10745"/>
+                  <a:pt x="2260214" y="0"/>
+                </a:cubicBezTo>
+                <a:cubicBezTo>
+                  <a:pt x="2439383" y="-10745"/>
+                  <a:pt x="2701347" y="23279"/>
+                  <a:pt x="2921253" y="0"/>
+                </a:cubicBezTo>
+                <a:cubicBezTo>
+                  <a:pt x="3141159" y="-23279"/>
+                  <a:pt x="3188188" y="20776"/>
+                  <a:pt x="3320258" y="0"/>
+                </a:cubicBezTo>
+                <a:cubicBezTo>
+                  <a:pt x="3452329" y="-20776"/>
+                  <a:pt x="3606351" y="36134"/>
+                  <a:pt x="3784772" y="0"/>
+                </a:cubicBezTo>
+                <a:cubicBezTo>
+                  <a:pt x="3963193" y="-36134"/>
+                  <a:pt x="4190527" y="6182"/>
+                  <a:pt x="4380302" y="0"/>
+                </a:cubicBezTo>
+                <a:cubicBezTo>
+                  <a:pt x="4570077" y="-6182"/>
+                  <a:pt x="4716500" y="7504"/>
+                  <a:pt x="4844816" y="0"/>
+                </a:cubicBezTo>
+                <a:cubicBezTo>
+                  <a:pt x="4973132" y="-7504"/>
+                  <a:pt x="5160078" y="47674"/>
+                  <a:pt x="5374838" y="0"/>
+                </a:cubicBezTo>
+                <a:cubicBezTo>
+                  <a:pt x="5589598" y="-47674"/>
+                  <a:pt x="5655889" y="4731"/>
+                  <a:pt x="5839352" y="0"/>
+                </a:cubicBezTo>
+                <a:cubicBezTo>
+                  <a:pt x="6022815" y="-4731"/>
+                  <a:pt x="6217972" y="12533"/>
+                  <a:pt x="6500391" y="0"/>
+                </a:cubicBezTo>
+                <a:cubicBezTo>
+                  <a:pt x="6782810" y="-12533"/>
+                  <a:pt x="6851124" y="18487"/>
+                  <a:pt x="7024458" y="0"/>
+                </a:cubicBezTo>
+                <a:cubicBezTo>
+                  <a:pt x="7282594" y="9488"/>
+                  <a:pt x="7525705" y="196804"/>
+                  <a:pt x="7498080" y="473622"/>
+                </a:cubicBezTo>
+                <a:cubicBezTo>
+                  <a:pt x="7499009" y="606687"/>
+                  <a:pt x="7459571" y="753336"/>
+                  <a:pt x="7498080" y="890397"/>
+                </a:cubicBezTo>
+                <a:cubicBezTo>
+                  <a:pt x="7536589" y="1027458"/>
+                  <a:pt x="7458316" y="1155393"/>
+                  <a:pt x="7498080" y="1364004"/>
+                </a:cubicBezTo>
+                <a:cubicBezTo>
+                  <a:pt x="7537844" y="1572615"/>
+                  <a:pt x="7487424" y="1655875"/>
+                  <a:pt x="7498080" y="1780779"/>
+                </a:cubicBezTo>
+                <a:cubicBezTo>
+                  <a:pt x="7508736" y="1905684"/>
+                  <a:pt x="7450497" y="2092794"/>
+                  <a:pt x="7498080" y="2368052"/>
+                </a:cubicBezTo>
+                <a:cubicBezTo>
+                  <a:pt x="7502145" y="2639467"/>
+                  <a:pt x="7280719" y="2839693"/>
+                  <a:pt x="7024458" y="2841674"/>
+                </a:cubicBezTo>
+                <a:cubicBezTo>
+                  <a:pt x="6817265" y="2851440"/>
+                  <a:pt x="6681567" y="2811562"/>
+                  <a:pt x="6559944" y="2841674"/>
+                </a:cubicBezTo>
+                <a:cubicBezTo>
+                  <a:pt x="6438321" y="2871786"/>
+                  <a:pt x="6141344" y="2839360"/>
+                  <a:pt x="6029922" y="2841674"/>
+                </a:cubicBezTo>
+                <a:cubicBezTo>
+                  <a:pt x="5918500" y="2843988"/>
+                  <a:pt x="5716467" y="2776185"/>
+                  <a:pt x="5434391" y="2841674"/>
+                </a:cubicBezTo>
+                <a:cubicBezTo>
+                  <a:pt x="5152315" y="2907163"/>
+                  <a:pt x="5053601" y="2839432"/>
+                  <a:pt x="4773353" y="2841674"/>
+                </a:cubicBezTo>
+                <a:cubicBezTo>
+                  <a:pt x="4493105" y="2843916"/>
+                  <a:pt x="4379474" y="2815957"/>
+                  <a:pt x="4243330" y="2841674"/>
+                </a:cubicBezTo>
+                <a:cubicBezTo>
+                  <a:pt x="4107186" y="2867391"/>
+                  <a:pt x="3876000" y="2813300"/>
+                  <a:pt x="3778817" y="2841674"/>
+                </a:cubicBezTo>
+                <a:cubicBezTo>
+                  <a:pt x="3681634" y="2870048"/>
+                  <a:pt x="3475978" y="2805797"/>
+                  <a:pt x="3314303" y="2841674"/>
+                </a:cubicBezTo>
+                <a:cubicBezTo>
+                  <a:pt x="3152628" y="2877551"/>
+                  <a:pt x="3084048" y="2836167"/>
+                  <a:pt x="2915297" y="2841674"/>
+                </a:cubicBezTo>
+                <a:cubicBezTo>
+                  <a:pt x="2746546" y="2847181"/>
+                  <a:pt x="2667107" y="2834218"/>
+                  <a:pt x="2450783" y="2841674"/>
+                </a:cubicBezTo>
+                <a:cubicBezTo>
+                  <a:pt x="2234459" y="2849130"/>
+                  <a:pt x="2112324" y="2826997"/>
+                  <a:pt x="1789745" y="2841674"/>
+                </a:cubicBezTo>
+                <a:cubicBezTo>
+                  <a:pt x="1467166" y="2856351"/>
+                  <a:pt x="1262375" y="2837060"/>
+                  <a:pt x="1128706" y="2841674"/>
+                </a:cubicBezTo>
+                <a:cubicBezTo>
+                  <a:pt x="995037" y="2846288"/>
+                  <a:pt x="790249" y="2766547"/>
+                  <a:pt x="473622" y="2841674"/>
+                </a:cubicBezTo>
+                <a:cubicBezTo>
+                  <a:pt x="254796" y="2797851"/>
+                  <a:pt x="5442" y="2623474"/>
+                  <a:pt x="0" y="2368052"/>
+                </a:cubicBezTo>
+                <a:cubicBezTo>
+                  <a:pt x="-31243" y="2146398"/>
+                  <a:pt x="36807" y="1981405"/>
+                  <a:pt x="0" y="1875500"/>
+                </a:cubicBezTo>
+                <a:cubicBezTo>
+                  <a:pt x="-36807" y="1769595"/>
+                  <a:pt x="55094" y="1626275"/>
+                  <a:pt x="0" y="1401893"/>
+                </a:cubicBezTo>
+                <a:cubicBezTo>
+                  <a:pt x="-55094" y="1177511"/>
+                  <a:pt x="20148" y="1088729"/>
+                  <a:pt x="0" y="985118"/>
+                </a:cubicBezTo>
+                <a:cubicBezTo>
+                  <a:pt x="-20148" y="881508"/>
+                  <a:pt x="43708" y="579178"/>
+                  <a:pt x="0" y="473622"/>
+                </a:cubicBezTo>
+                <a:close/>
+              </a:path>
+              <a:path w="7498080" h="2841674" stroke="0" extrusionOk="0">
+                <a:moveTo>
+                  <a:pt x="0" y="473622"/>
+                </a:moveTo>
+                <a:cubicBezTo>
+                  <a:pt x="24624" y="283457"/>
+                  <a:pt x="148952" y="-17882"/>
+                  <a:pt x="473622" y="0"/>
+                </a:cubicBezTo>
+                <a:cubicBezTo>
+                  <a:pt x="599206" y="-53255"/>
+                  <a:pt x="830935" y="42738"/>
+                  <a:pt x="938136" y="0"/>
+                </a:cubicBezTo>
+                <a:cubicBezTo>
+                  <a:pt x="1045337" y="-42738"/>
+                  <a:pt x="1451872" y="37831"/>
+                  <a:pt x="1599175" y="0"/>
+                </a:cubicBezTo>
+                <a:cubicBezTo>
+                  <a:pt x="1746478" y="-37831"/>
+                  <a:pt x="1937137" y="35184"/>
+                  <a:pt x="2194705" y="0"/>
+                </a:cubicBezTo>
+                <a:cubicBezTo>
+                  <a:pt x="2452273" y="-35184"/>
+                  <a:pt x="2599748" y="16445"/>
+                  <a:pt x="2724727" y="0"/>
+                </a:cubicBezTo>
+                <a:cubicBezTo>
+                  <a:pt x="2849706" y="-16445"/>
+                  <a:pt x="3080184" y="32036"/>
+                  <a:pt x="3254750" y="0"/>
+                </a:cubicBezTo>
+                <a:cubicBezTo>
+                  <a:pt x="3429316" y="-32036"/>
+                  <a:pt x="3582808" y="54826"/>
+                  <a:pt x="3719263" y="0"/>
+                </a:cubicBezTo>
+                <a:cubicBezTo>
+                  <a:pt x="3855718" y="-54826"/>
+                  <a:pt x="4158485" y="25737"/>
+                  <a:pt x="4380302" y="0"/>
+                </a:cubicBezTo>
+                <a:cubicBezTo>
+                  <a:pt x="4602119" y="-25737"/>
+                  <a:pt x="4783922" y="54750"/>
+                  <a:pt x="5041341" y="0"/>
+                </a:cubicBezTo>
+                <a:cubicBezTo>
+                  <a:pt x="5298760" y="-54750"/>
+                  <a:pt x="5301971" y="53319"/>
+                  <a:pt x="5505855" y="0"/>
+                </a:cubicBezTo>
+                <a:cubicBezTo>
+                  <a:pt x="5709739" y="-53319"/>
+                  <a:pt x="5914748" y="59925"/>
+                  <a:pt x="6035877" y="0"/>
+                </a:cubicBezTo>
+                <a:cubicBezTo>
+                  <a:pt x="6157006" y="-59925"/>
+                  <a:pt x="6651700" y="11212"/>
+                  <a:pt x="7024458" y="0"/>
+                </a:cubicBezTo>
+                <a:cubicBezTo>
+                  <a:pt x="7246075" y="4542"/>
+                  <a:pt x="7495419" y="196167"/>
+                  <a:pt x="7498080" y="473622"/>
+                </a:cubicBezTo>
+                <a:cubicBezTo>
+                  <a:pt x="7500491" y="690440"/>
+                  <a:pt x="7470507" y="789645"/>
+                  <a:pt x="7498080" y="909341"/>
+                </a:cubicBezTo>
+                <a:cubicBezTo>
+                  <a:pt x="7525653" y="1029037"/>
+                  <a:pt x="7449163" y="1236954"/>
+                  <a:pt x="7498080" y="1326116"/>
+                </a:cubicBezTo>
+                <a:cubicBezTo>
+                  <a:pt x="7546997" y="1415279"/>
+                  <a:pt x="7485451" y="1602565"/>
+                  <a:pt x="7498080" y="1742890"/>
+                </a:cubicBezTo>
+                <a:cubicBezTo>
+                  <a:pt x="7510709" y="1883215"/>
+                  <a:pt x="7471261" y="2171925"/>
+                  <a:pt x="7498080" y="2368052"/>
+                </a:cubicBezTo>
+                <a:cubicBezTo>
+                  <a:pt x="7491233" y="2625289"/>
+                  <a:pt x="7300145" y="2853102"/>
+                  <a:pt x="7024458" y="2841674"/>
+                </a:cubicBezTo>
+                <a:cubicBezTo>
+                  <a:pt x="6854776" y="2859721"/>
+                  <a:pt x="6708159" y="2817657"/>
+                  <a:pt x="6625453" y="2841674"/>
+                </a:cubicBezTo>
+                <a:cubicBezTo>
+                  <a:pt x="6542748" y="2865691"/>
+                  <a:pt x="6289264" y="2819102"/>
+                  <a:pt x="6095430" y="2841674"/>
+                </a:cubicBezTo>
+                <a:cubicBezTo>
+                  <a:pt x="5901596" y="2864246"/>
+                  <a:pt x="5701681" y="2806533"/>
+                  <a:pt x="5565408" y="2841674"/>
+                </a:cubicBezTo>
+                <a:cubicBezTo>
+                  <a:pt x="5429135" y="2876815"/>
+                  <a:pt x="5173002" y="2832096"/>
+                  <a:pt x="4969878" y="2841674"/>
+                </a:cubicBezTo>
+                <a:cubicBezTo>
+                  <a:pt x="4766754" y="2851252"/>
+                  <a:pt x="4661770" y="2771682"/>
+                  <a:pt x="4374347" y="2841674"/>
+                </a:cubicBezTo>
+                <a:cubicBezTo>
+                  <a:pt x="4086924" y="2911666"/>
+                  <a:pt x="4090390" y="2800514"/>
+                  <a:pt x="3909833" y="2841674"/>
+                </a:cubicBezTo>
+                <a:cubicBezTo>
+                  <a:pt x="3729276" y="2882834"/>
+                  <a:pt x="3530876" y="2806482"/>
+                  <a:pt x="3183286" y="2841674"/>
+                </a:cubicBezTo>
+                <a:cubicBezTo>
+                  <a:pt x="2835696" y="2876866"/>
+                  <a:pt x="2823892" y="2799101"/>
+                  <a:pt x="2718772" y="2841674"/>
+                </a:cubicBezTo>
+                <a:cubicBezTo>
+                  <a:pt x="2613652" y="2884247"/>
+                  <a:pt x="2217237" y="2778699"/>
+                  <a:pt x="2057733" y="2841674"/>
+                </a:cubicBezTo>
+                <a:cubicBezTo>
+                  <a:pt x="1898229" y="2904649"/>
+                  <a:pt x="1806720" y="2789543"/>
+                  <a:pt x="1593219" y="2841674"/>
+                </a:cubicBezTo>
+                <a:cubicBezTo>
+                  <a:pt x="1379718" y="2893805"/>
+                  <a:pt x="1354724" y="2807853"/>
+                  <a:pt x="1194214" y="2841674"/>
+                </a:cubicBezTo>
+                <a:cubicBezTo>
+                  <a:pt x="1033705" y="2875495"/>
+                  <a:pt x="642331" y="2788179"/>
+                  <a:pt x="473622" y="2841674"/>
+                </a:cubicBezTo>
+                <a:cubicBezTo>
+                  <a:pt x="261430" y="2806669"/>
+                  <a:pt x="9248" y="2567672"/>
+                  <a:pt x="0" y="2368052"/>
+                </a:cubicBezTo>
+                <a:cubicBezTo>
+                  <a:pt x="-44685" y="2159981"/>
+                  <a:pt x="14919" y="2111148"/>
+                  <a:pt x="0" y="1951277"/>
+                </a:cubicBezTo>
+                <a:cubicBezTo>
+                  <a:pt x="-14919" y="1791407"/>
+                  <a:pt x="20787" y="1595700"/>
+                  <a:pt x="0" y="1477670"/>
+                </a:cubicBezTo>
+                <a:cubicBezTo>
+                  <a:pt x="-20787" y="1359640"/>
+                  <a:pt x="17323" y="1232108"/>
+                  <a:pt x="0" y="1041951"/>
+                </a:cubicBezTo>
+                <a:cubicBezTo>
+                  <a:pt x="-17323" y="851794"/>
+                  <a:pt x="38344" y="730308"/>
+                  <a:pt x="0" y="473622"/>
+                </a:cubicBezTo>
+                <a:close/>
+              </a:path>
+            </a:pathLst>
+          </a:custGeom>
+          <a:solidFill>
+            <a:schemeClr val="bg1"/>
+          </a:solidFill>
+          <a:ln w="19050">
+            <a:solidFill>
+              <a:schemeClr val="tx1"/>
+            </a:solidFill>
+            <a:extLst>
+              <a:ext uri="{C807C97D-BFC1-408E-A445-0C87EB9F89A2}">
+                <ask:lineSketchStyleProps xmlns:ask="http://schemas.microsoft.com/office/drawing/2018/sketchyshapes" sd="2847000804">
+                  <a:prstGeom prst="roundRect">
+                    <a:avLst/>
+                  </a:prstGeom>
+                  <ask:type>
+                    <ask:lineSketchScribble/>
+                  </ask:type>
+                </ask:lineSketchStyleProps>
+              </a:ext>
+            </a:extLst>
+          </a:ln>
+        </p:spPr>
+        <p:style>
+          <a:lnRef idx="2">
+            <a:schemeClr val="accent1">
+              <a:shade val="50000"/>
+            </a:schemeClr>
+          </a:lnRef>
+          <a:fillRef idx="1">
+            <a:schemeClr val="accent1"/>
+          </a:fillRef>
+          <a:effectRef idx="0">
+            <a:schemeClr val="accent1"/>
+          </a:effectRef>
+          <a:fontRef idx="minor">
+            <a:schemeClr val="lt1"/>
+          </a:fontRef>
+        </p:style>
+        <p:txBody>
+          <a:bodyPr rtlCol="0" anchor="ctr"/>
+          <a:lstStyle/>
+          <a:p>
+            <a:pPr marL="457200" indent="-457200">
+              <a:buFont typeface="+mj-lt"/>
+              <a:buAutoNum type="arabicPeriod"/>
+            </a:pPr>
+            <a:r>
+              <a:rPr lang="es-AR" sz="2400" dirty="0">
+                <a:solidFill>
+                  <a:schemeClr val="tx1"/>
+                </a:solidFill>
+                <a:latin typeface="Segoe Print" panose="02000600000000000000" pitchFamily="2" charset="0"/>
+              </a:rPr>
+              <a:t>Esparcidos: todos los lados con pocas viviendas.</a:t>
+            </a:r>
+          </a:p>
+          <a:p>
+            <a:pPr marL="457200" indent="-457200">
+              <a:buFont typeface="+mj-lt"/>
+              <a:buAutoNum type="arabicPeriod"/>
+            </a:pPr>
+            <a:r>
+              <a:rPr lang="es-AR" sz="2400" dirty="0">
+                <a:solidFill>
+                  <a:schemeClr val="tx1"/>
+                </a:solidFill>
+                <a:latin typeface="Segoe Print" panose="02000600000000000000" pitchFamily="2" charset="0"/>
+              </a:rPr>
+              <a:t>Densos: todas las manzanas con muchas viviendas.</a:t>
+            </a:r>
+          </a:p>
+          <a:p>
+            <a:pPr marL="457200" indent="-457200">
+              <a:buFont typeface="+mj-lt"/>
+              <a:buAutoNum type="arabicPeriod"/>
+            </a:pPr>
+            <a:r>
+              <a:rPr lang="es-AR" sz="2400" dirty="0">
+                <a:solidFill>
+                  <a:schemeClr val="tx1"/>
+                </a:solidFill>
+                <a:latin typeface="Segoe Print" panose="02000600000000000000" pitchFamily="2" charset="0"/>
+              </a:rPr>
+              <a:t>Combinados: situaciones intermedias</a:t>
+            </a:r>
+            <a:br>
+              <a:rPr lang="es-AR" sz="2400" dirty="0">
+                <a:solidFill>
+                  <a:schemeClr val="tx1"/>
+                </a:solidFill>
+                <a:latin typeface="Segoe Print" panose="02000600000000000000" pitchFamily="2" charset="0"/>
+              </a:rPr>
+            </a:br>
+            <a:r>
+              <a:rPr lang="es-AR" sz="2400" dirty="0">
+                <a:solidFill>
+                  <a:schemeClr val="tx1"/>
+                </a:solidFill>
+                <a:latin typeface="Segoe Print" panose="02000600000000000000" pitchFamily="2" charset="0"/>
+              </a:rPr>
+              <a:t>algunas manzanas con pocas viviendas</a:t>
+            </a:r>
+            <a:br>
+              <a:rPr lang="es-AR" sz="2400" dirty="0">
+                <a:solidFill>
+                  <a:schemeClr val="tx1"/>
+                </a:solidFill>
+                <a:latin typeface="Segoe Print" panose="02000600000000000000" pitchFamily="2" charset="0"/>
+              </a:rPr>
+            </a:br>
+            <a:r>
+              <a:rPr lang="es-AR" sz="2400" dirty="0">
+                <a:solidFill>
+                  <a:schemeClr val="tx1"/>
+                </a:solidFill>
+                <a:latin typeface="Segoe Print" panose="02000600000000000000" pitchFamily="2" charset="0"/>
+              </a:rPr>
+              <a:t>o algunos lados con muchas viviendas. </a:t>
+            </a:r>
+          </a:p>
+        </p:txBody>
+      </p:sp>
+    </p:spTree>
+    <p:extLst>
+      <p:ext uri="{BB962C8B-B14F-4D97-AF65-F5344CB8AC3E}">
+        <p14:creationId xmlns:p14="http://schemas.microsoft.com/office/powerpoint/2010/main" val="59448841"/>
+      </p:ext>
+    </p:extLst>
+  </p:cSld>
+  <p:clrMapOvr>
+    <a:masterClrMapping/>
+  </p:clrMapOvr>
+</p:sld>
+</file>
+
+<file path=ppt/tags/tag1.xml><?xml version="1.0" encoding="utf-8"?>
+<p:tagLst xmlns:a="http://schemas.openxmlformats.org/drawingml/2006/main" xmlns:r="http://schemas.openxmlformats.org/officeDocument/2006/relationships" xmlns:p="http://schemas.openxmlformats.org/presentationml/2006/main">
+  <p:tag name="OUTPUTDPI" val="1200"/>
+  <p:tag name="ORIGINALHEIGHT" val="397,4503"/>
+  <p:tag name="ORIGINALWIDTH" val="794,1507"/>
+  <p:tag name="LATEXADDIN" val="\documentclass{article}&#10;\usepackage{amsmath}&#10;\usepackage{amsfonts}&#10;\pagestyle{empty}&#10;\begin{document}&#10;&#10;$$&#10;\begin{array}{ll}&#10;   \mathrm{Min} &amp; f(x) \\&#10;   \mathrm{s. a.} &amp; g(x) = 0\\&#10;   &amp; x \in \mathbb{Z}^n                                                                                                                                                 \end{array}&#10;$$&#10;&#10;&#10;\end{document}"/>
+  <p:tag name="IGUANATEXSIZE" val="20"/>
+  <p:tag name="IGUANATEXCURSOR" val="57"/>
+  <p:tag name="TRANSPARENCY" val="Verdadero"/>
+  <p:tag name="FILENAME" val=""/>
+  <p:tag name="LATEXENGINEID" val="0"/>
+  <p:tag name="TEMPFOLDER" val="c:\temp\"/>
+  <p:tag name="LATEXFORMHEIGHT" val="312"/>
+  <p:tag name="LATEXFORMWIDTH" val="384"/>
+  <p:tag name="LATEXFORMWRAP" val="Verdadero"/>
+  <p:tag name="BITMAPVECTOR" val="0"/>
+</p:tagLst>
 </file>
 
 <file path=ppt/theme/theme1.xml><?xml version="1.0" encoding="utf-8"?>

</xml_diff>